<commit_message>
added routing example figure image
</commit_message>
<xml_diff>
--- a/thesis/figs/ros_component.pptx
+++ b/thesis/figs/ros_component.pptx
@@ -7,6 +7,7 @@
   <p:sldIdLst>
     <p:sldId id="256" r:id="rId2"/>
     <p:sldId id="257" r:id="rId3"/>
+    <p:sldId id="258" r:id="rId4"/>
   </p:sldIdLst>
   <p:sldSz cx="9144000" cy="6858000" type="screen4x3"/>
   <p:notesSz cx="6858000" cy="9144000"/>
@@ -107,7 +108,7 @@
   </p:defaultTextStyle>
   <p:extLst>
     <p:ext uri="{EFAFB233-063F-42B5-8137-9DF3F51BA10A}">
-      <p15:sldGuideLst xmlns:p15="http://schemas.microsoft.com/office/powerpoint/2012/main" xmlns="">
+      <p15:sldGuideLst xmlns:p15="http://schemas.microsoft.com/office/powerpoint/2012/main">
         <p15:guide id="1" orient="horz" pos="2160">
           <p15:clr>
             <a:srgbClr val="A4A3A4"/>
@@ -305,7 +306,7 @@
           <a:p>
             <a:fld id="{07D09854-399E-4080-871F-4892A4C17278}" type="datetimeFigureOut">
               <a:rPr lang="en-US" smtClean="0"/>
-              <a:t>2015-05-05</a:t>
+              <a:t>2015-09-16</a:t>
             </a:fld>
             <a:endParaRPr lang="en-US"/>
           </a:p>
@@ -475,7 +476,7 @@
           <a:p>
             <a:fld id="{07D09854-399E-4080-871F-4892A4C17278}" type="datetimeFigureOut">
               <a:rPr lang="en-US" smtClean="0"/>
-              <a:t>2015-05-05</a:t>
+              <a:t>2015-09-16</a:t>
             </a:fld>
             <a:endParaRPr lang="en-US"/>
           </a:p>
@@ -655,7 +656,7 @@
           <a:p>
             <a:fld id="{07D09854-399E-4080-871F-4892A4C17278}" type="datetimeFigureOut">
               <a:rPr lang="en-US" smtClean="0"/>
-              <a:t>2015-05-05</a:t>
+              <a:t>2015-09-16</a:t>
             </a:fld>
             <a:endParaRPr lang="en-US"/>
           </a:p>
@@ -825,7 +826,7 @@
           <a:p>
             <a:fld id="{07D09854-399E-4080-871F-4892A4C17278}" type="datetimeFigureOut">
               <a:rPr lang="en-US" smtClean="0"/>
-              <a:t>2015-05-05</a:t>
+              <a:t>2015-09-16</a:t>
             </a:fld>
             <a:endParaRPr lang="en-US"/>
           </a:p>
@@ -1071,7 +1072,7 @@
           <a:p>
             <a:fld id="{07D09854-399E-4080-871F-4892A4C17278}" type="datetimeFigureOut">
               <a:rPr lang="en-US" smtClean="0"/>
-              <a:t>2015-05-05</a:t>
+              <a:t>2015-09-16</a:t>
             </a:fld>
             <a:endParaRPr lang="en-US"/>
           </a:p>
@@ -1359,7 +1360,7 @@
           <a:p>
             <a:fld id="{07D09854-399E-4080-871F-4892A4C17278}" type="datetimeFigureOut">
               <a:rPr lang="en-US" smtClean="0"/>
-              <a:t>2015-05-05</a:t>
+              <a:t>2015-09-16</a:t>
             </a:fld>
             <a:endParaRPr lang="en-US"/>
           </a:p>
@@ -1781,7 +1782,7 @@
           <a:p>
             <a:fld id="{07D09854-399E-4080-871F-4892A4C17278}" type="datetimeFigureOut">
               <a:rPr lang="en-US" smtClean="0"/>
-              <a:t>2015-05-05</a:t>
+              <a:t>2015-09-16</a:t>
             </a:fld>
             <a:endParaRPr lang="en-US"/>
           </a:p>
@@ -1899,7 +1900,7 @@
           <a:p>
             <a:fld id="{07D09854-399E-4080-871F-4892A4C17278}" type="datetimeFigureOut">
               <a:rPr lang="en-US" smtClean="0"/>
-              <a:t>2015-05-05</a:t>
+              <a:t>2015-09-16</a:t>
             </a:fld>
             <a:endParaRPr lang="en-US"/>
           </a:p>
@@ -1994,7 +1995,7 @@
           <a:p>
             <a:fld id="{07D09854-399E-4080-871F-4892A4C17278}" type="datetimeFigureOut">
               <a:rPr lang="en-US" smtClean="0"/>
-              <a:t>2015-05-05</a:t>
+              <a:t>2015-09-16</a:t>
             </a:fld>
             <a:endParaRPr lang="en-US"/>
           </a:p>
@@ -2271,7 +2272,7 @@
           <a:p>
             <a:fld id="{07D09854-399E-4080-871F-4892A4C17278}" type="datetimeFigureOut">
               <a:rPr lang="en-US" smtClean="0"/>
-              <a:t>2015-05-05</a:t>
+              <a:t>2015-09-16</a:t>
             </a:fld>
             <a:endParaRPr lang="en-US"/>
           </a:p>
@@ -2524,7 +2525,7 @@
           <a:p>
             <a:fld id="{07D09854-399E-4080-871F-4892A4C17278}" type="datetimeFigureOut">
               <a:rPr lang="en-US" smtClean="0"/>
-              <a:t>2015-05-05</a:t>
+              <a:t>2015-09-16</a:t>
             </a:fld>
             <a:endParaRPr lang="en-US"/>
           </a:p>
@@ -2737,7 +2738,7 @@
           <a:p>
             <a:fld id="{07D09854-399E-4080-871F-4892A4C17278}" type="datetimeFigureOut">
               <a:rPr lang="en-US" smtClean="0"/>
-              <a:t>2015-05-05</a:t>
+              <a:t>2015-09-16</a:t>
             </a:fld>
             <a:endParaRPr lang="en-US"/>
           </a:p>
@@ -3419,26 +3420,22 @@
           <a:p>
             <a:pPr algn="ctr"/>
             <a:r>
-              <a:rPr lang="en-US" smtClean="0"/>
+              <a:rPr lang="en-US" dirty="0" smtClean="0"/>
               <a:t>Timers </a:t>
             </a:r>
           </a:p>
           <a:p>
             <a:pPr algn="ctr"/>
             <a:r>
-              <a:rPr lang="en-US" smtClean="0"/>
+              <a:rPr lang="en-US" dirty="0" smtClean="0"/>
               <a:t>&amp;</a:t>
             </a:r>
           </a:p>
           <a:p>
             <a:pPr algn="ctr"/>
             <a:r>
-              <a:rPr lang="en-US" smtClean="0"/>
-              <a:t>State </a:t>
-            </a:r>
-            <a:r>
               <a:rPr lang="en-US" dirty="0" smtClean="0"/>
-              <a:t>Variables</a:t>
+              <a:t>State Variables</a:t>
             </a:r>
             <a:endParaRPr lang="en-US" dirty="0"/>
           </a:p>
@@ -6261,6 +6258,1066 @@
 </p:sld>
 </file>
 
+<file path=ppt/slides/slide3.xml><?xml version="1.0" encoding="utf-8"?>
+<p:sld xmlns:a="http://schemas.openxmlformats.org/drawingml/2006/main" xmlns:r="http://schemas.openxmlformats.org/officeDocument/2006/relationships" xmlns:p="http://schemas.openxmlformats.org/presentationml/2006/main">
+  <p:cSld>
+    <p:spTree>
+      <p:nvGrpSpPr>
+        <p:cNvPr id="1" name=""/>
+        <p:cNvGrpSpPr/>
+        <p:nvPr/>
+      </p:nvGrpSpPr>
+      <p:grpSpPr>
+        <a:xfrm>
+          <a:off x="0" y="0"/>
+          <a:ext cx="0" cy="0"/>
+          <a:chOff x="0" y="0"/>
+          <a:chExt cx="0" cy="0"/>
+        </a:xfrm>
+      </p:grpSpPr>
+      <p:sp>
+        <p:nvSpPr>
+          <p:cNvPr id="15" name="Rounded Rectangle 14"/>
+          <p:cNvSpPr/>
+          <p:nvPr/>
+        </p:nvSpPr>
+        <p:spPr>
+          <a:xfrm>
+            <a:off x="3429000" y="2133600"/>
+            <a:ext cx="3124200" cy="1362806"/>
+          </a:xfrm>
+          <a:prstGeom prst="roundRect">
+            <a:avLst/>
+          </a:prstGeom>
+        </p:spPr>
+        <p:style>
+          <a:lnRef idx="0">
+            <a:schemeClr val="accent2"/>
+          </a:lnRef>
+          <a:fillRef idx="3">
+            <a:schemeClr val="accent2"/>
+          </a:fillRef>
+          <a:effectRef idx="3">
+            <a:schemeClr val="accent2"/>
+          </a:effectRef>
+          <a:fontRef idx="minor">
+            <a:schemeClr val="lt1"/>
+          </a:fontRef>
+        </p:style>
+        <p:txBody>
+          <a:bodyPr rtlCol="0" anchor="ctr"/>
+          <a:lstStyle/>
+          <a:p>
+            <a:pPr algn="ctr"/>
+            <a:r>
+              <a:rPr lang="en-US" dirty="0" smtClean="0"/>
+              <a:t>Router</a:t>
+            </a:r>
+          </a:p>
+          <a:p>
+            <a:pPr algn="ctr"/>
+            <a:endParaRPr lang="en-US" dirty="0"/>
+          </a:p>
+          <a:p>
+            <a:pPr algn="ctr"/>
+            <a:endParaRPr lang="en-US" dirty="0" smtClean="0"/>
+          </a:p>
+          <a:p>
+            <a:pPr algn="ctr"/>
+            <a:endParaRPr lang="en-US" dirty="0"/>
+          </a:p>
+          <a:p>
+            <a:pPr algn="ctr"/>
+            <a:endParaRPr lang="en-US" dirty="0"/>
+          </a:p>
+        </p:txBody>
+      </p:sp>
+      <p:sp>
+        <p:nvSpPr>
+          <p:cNvPr id="4" name="Rounded Rectangle 3"/>
+          <p:cNvSpPr/>
+          <p:nvPr/>
+        </p:nvSpPr>
+        <p:spPr>
+          <a:xfrm>
+            <a:off x="1238929" y="1988122"/>
+            <a:ext cx="1524000" cy="1676400"/>
+          </a:xfrm>
+          <a:prstGeom prst="roundRect">
+            <a:avLst/>
+          </a:prstGeom>
+        </p:spPr>
+        <p:style>
+          <a:lnRef idx="1">
+            <a:schemeClr val="accent5"/>
+          </a:lnRef>
+          <a:fillRef idx="3">
+            <a:schemeClr val="accent5"/>
+          </a:fillRef>
+          <a:effectRef idx="2">
+            <a:schemeClr val="accent5"/>
+          </a:effectRef>
+          <a:fontRef idx="minor">
+            <a:schemeClr val="lt1"/>
+          </a:fontRef>
+        </p:style>
+        <p:txBody>
+          <a:bodyPr rtlCol="0" anchor="ctr"/>
+          <a:lstStyle/>
+          <a:p>
+            <a:pPr algn="ctr"/>
+            <a:r>
+              <a:rPr lang="en-US" dirty="0" smtClean="0"/>
+              <a:t>Node 1</a:t>
+            </a:r>
+            <a:endParaRPr lang="en-US" dirty="0"/>
+          </a:p>
+          <a:p>
+            <a:pPr algn="ctr"/>
+            <a:endParaRPr lang="en-US" dirty="0"/>
+          </a:p>
+          <a:p>
+            <a:pPr algn="ctr"/>
+            <a:endParaRPr lang="en-US" dirty="0"/>
+          </a:p>
+          <a:p>
+            <a:pPr algn="ctr"/>
+            <a:endParaRPr lang="en-US" dirty="0"/>
+          </a:p>
+          <a:p>
+            <a:pPr algn="ctr"/>
+            <a:endParaRPr lang="en-US" dirty="0" smtClean="0"/>
+          </a:p>
+        </p:txBody>
+      </p:sp>
+      <p:sp>
+        <p:nvSpPr>
+          <p:cNvPr id="8" name="Rounded Rectangle 7"/>
+          <p:cNvSpPr/>
+          <p:nvPr/>
+        </p:nvSpPr>
+        <p:spPr>
+          <a:xfrm>
+            <a:off x="3832516" y="2352598"/>
+            <a:ext cx="2336896" cy="1058279"/>
+          </a:xfrm>
+          <a:prstGeom prst="roundRect">
+            <a:avLst/>
+          </a:prstGeom>
+        </p:spPr>
+        <p:style>
+          <a:lnRef idx="1">
+            <a:schemeClr val="accent1"/>
+          </a:lnRef>
+          <a:fillRef idx="2">
+            <a:schemeClr val="accent1"/>
+          </a:fillRef>
+          <a:effectRef idx="1">
+            <a:schemeClr val="accent1"/>
+          </a:effectRef>
+          <a:fontRef idx="minor">
+            <a:schemeClr val="dk1"/>
+          </a:fontRef>
+        </p:style>
+        <p:txBody>
+          <a:bodyPr rtlCol="0" anchor="ctr"/>
+          <a:lstStyle/>
+          <a:p>
+            <a:r>
+              <a:rPr lang="en-US" sz="1000" dirty="0" smtClean="0"/>
+              <a:t>      High Priority Queue</a:t>
+            </a:r>
+          </a:p>
+          <a:p>
+            <a:endParaRPr lang="en-US" sz="1000" dirty="0" smtClean="0"/>
+          </a:p>
+          <a:p>
+            <a:endParaRPr lang="en-US" sz="1000" dirty="0" smtClean="0"/>
+          </a:p>
+          <a:p>
+            <a:r>
+              <a:rPr lang="en-US" sz="1000" dirty="0" smtClean="0"/>
+              <a:t>      Low </a:t>
+            </a:r>
+            <a:r>
+              <a:rPr lang="en-US" sz="1000" dirty="0"/>
+              <a:t>Priority Queue</a:t>
+            </a:r>
+          </a:p>
+          <a:p>
+            <a:r>
+              <a:rPr lang="en-US" sz="1000" dirty="0" smtClean="0"/>
+              <a:t>      </a:t>
+            </a:r>
+          </a:p>
+          <a:p>
+            <a:endParaRPr lang="en-US" sz="1000" dirty="0" smtClean="0"/>
+          </a:p>
+        </p:txBody>
+      </p:sp>
+      <p:sp>
+        <p:nvSpPr>
+          <p:cNvPr id="34" name="Rounded Rectangle 33"/>
+          <p:cNvSpPr/>
+          <p:nvPr/>
+        </p:nvSpPr>
+        <p:spPr>
+          <a:xfrm>
+            <a:off x="7239000" y="1988122"/>
+            <a:ext cx="1524000" cy="1676400"/>
+          </a:xfrm>
+          <a:prstGeom prst="roundRect">
+            <a:avLst/>
+          </a:prstGeom>
+        </p:spPr>
+        <p:style>
+          <a:lnRef idx="1">
+            <a:schemeClr val="accent5"/>
+          </a:lnRef>
+          <a:fillRef idx="3">
+            <a:schemeClr val="accent5"/>
+          </a:fillRef>
+          <a:effectRef idx="2">
+            <a:schemeClr val="accent5"/>
+          </a:effectRef>
+          <a:fontRef idx="minor">
+            <a:schemeClr val="lt1"/>
+          </a:fontRef>
+        </p:style>
+        <p:txBody>
+          <a:bodyPr rtlCol="0" anchor="ctr"/>
+          <a:lstStyle/>
+          <a:p>
+            <a:pPr algn="ctr"/>
+            <a:r>
+              <a:rPr lang="en-US" dirty="0" smtClean="0"/>
+              <a:t>Node 2</a:t>
+            </a:r>
+            <a:endParaRPr lang="en-US" dirty="0"/>
+          </a:p>
+          <a:p>
+            <a:pPr algn="ctr"/>
+            <a:endParaRPr lang="en-US" dirty="0"/>
+          </a:p>
+          <a:p>
+            <a:pPr algn="ctr"/>
+            <a:endParaRPr lang="en-US" dirty="0"/>
+          </a:p>
+          <a:p>
+            <a:pPr algn="ctr"/>
+            <a:endParaRPr lang="en-US" dirty="0"/>
+          </a:p>
+          <a:p>
+            <a:pPr algn="ctr"/>
+            <a:endParaRPr lang="en-US" dirty="0" smtClean="0"/>
+          </a:p>
+        </p:txBody>
+      </p:sp>
+      <p:sp>
+        <p:nvSpPr>
+          <p:cNvPr id="35" name="Rounded Rectangle 34"/>
+          <p:cNvSpPr/>
+          <p:nvPr/>
+        </p:nvSpPr>
+        <p:spPr>
+          <a:xfrm>
+            <a:off x="4229100" y="3903783"/>
+            <a:ext cx="1524000" cy="1676400"/>
+          </a:xfrm>
+          <a:prstGeom prst="roundRect">
+            <a:avLst/>
+          </a:prstGeom>
+        </p:spPr>
+        <p:style>
+          <a:lnRef idx="1">
+            <a:schemeClr val="accent5"/>
+          </a:lnRef>
+          <a:fillRef idx="3">
+            <a:schemeClr val="accent5"/>
+          </a:fillRef>
+          <a:effectRef idx="2">
+            <a:schemeClr val="accent5"/>
+          </a:effectRef>
+          <a:fontRef idx="minor">
+            <a:schemeClr val="lt1"/>
+          </a:fontRef>
+        </p:style>
+        <p:txBody>
+          <a:bodyPr rtlCol="0" anchor="ctr"/>
+          <a:lstStyle/>
+          <a:p>
+            <a:pPr algn="ctr"/>
+            <a:r>
+              <a:rPr lang="en-US" dirty="0" smtClean="0"/>
+              <a:t>Node </a:t>
+            </a:r>
+            <a:r>
+              <a:rPr lang="en-US" dirty="0"/>
+              <a:t>3</a:t>
+            </a:r>
+            <a:endParaRPr lang="en-US" dirty="0"/>
+          </a:p>
+          <a:p>
+            <a:pPr algn="ctr"/>
+            <a:endParaRPr lang="en-US" dirty="0"/>
+          </a:p>
+          <a:p>
+            <a:pPr algn="ctr"/>
+            <a:endParaRPr lang="en-US" dirty="0"/>
+          </a:p>
+          <a:p>
+            <a:pPr algn="ctr"/>
+            <a:endParaRPr lang="en-US" dirty="0"/>
+          </a:p>
+          <a:p>
+            <a:pPr algn="ctr"/>
+            <a:endParaRPr lang="en-US" dirty="0" smtClean="0"/>
+          </a:p>
+        </p:txBody>
+      </p:sp>
+      <p:sp>
+        <p:nvSpPr>
+          <p:cNvPr id="36" name="Rounded Rectangle 35"/>
+          <p:cNvSpPr/>
+          <p:nvPr/>
+        </p:nvSpPr>
+        <p:spPr>
+          <a:xfrm>
+            <a:off x="4242107" y="89799"/>
+            <a:ext cx="1524000" cy="1676400"/>
+          </a:xfrm>
+          <a:prstGeom prst="roundRect">
+            <a:avLst/>
+          </a:prstGeom>
+        </p:spPr>
+        <p:style>
+          <a:lnRef idx="1">
+            <a:schemeClr val="accent5"/>
+          </a:lnRef>
+          <a:fillRef idx="3">
+            <a:schemeClr val="accent5"/>
+          </a:fillRef>
+          <a:effectRef idx="2">
+            <a:schemeClr val="accent5"/>
+          </a:effectRef>
+          <a:fontRef idx="minor">
+            <a:schemeClr val="lt1"/>
+          </a:fontRef>
+        </p:style>
+        <p:txBody>
+          <a:bodyPr rtlCol="0" anchor="ctr"/>
+          <a:lstStyle/>
+          <a:p>
+            <a:pPr algn="ctr"/>
+            <a:r>
+              <a:rPr lang="en-US" dirty="0" smtClean="0"/>
+              <a:t>Node 4</a:t>
+            </a:r>
+            <a:endParaRPr lang="en-US" dirty="0"/>
+          </a:p>
+          <a:p>
+            <a:pPr algn="ctr"/>
+            <a:endParaRPr lang="en-US" dirty="0"/>
+          </a:p>
+          <a:p>
+            <a:pPr algn="ctr"/>
+            <a:endParaRPr lang="en-US" dirty="0"/>
+          </a:p>
+          <a:p>
+            <a:pPr algn="ctr"/>
+            <a:endParaRPr lang="en-US" dirty="0"/>
+          </a:p>
+          <a:p>
+            <a:pPr algn="ctr"/>
+            <a:endParaRPr lang="en-US" dirty="0" smtClean="0"/>
+          </a:p>
+        </p:txBody>
+      </p:sp>
+      <p:cxnSp>
+        <p:nvCxnSpPr>
+          <p:cNvPr id="42" name="Curved Connector 41"/>
+          <p:cNvCxnSpPr>
+            <a:stCxn id="102" idx="3"/>
+            <a:endCxn id="52" idx="1"/>
+          </p:cNvCxnSpPr>
+          <p:nvPr/>
+        </p:nvCxnSpPr>
+        <p:spPr>
+          <a:xfrm>
+            <a:off x="5366284" y="2742126"/>
+            <a:ext cx="2047632" cy="301477"/>
+          </a:xfrm>
+          <a:prstGeom prst="curvedConnector3">
+            <a:avLst>
+              <a:gd name="adj1" fmla="val 50000"/>
+            </a:avLst>
+          </a:prstGeom>
+          <a:ln w="44450" cmpd="sng">
+            <a:solidFill>
+              <a:srgbClr val="002060"/>
+            </a:solidFill>
+            <a:headEnd type="oval"/>
+            <a:tailEnd type="triangle"/>
+          </a:ln>
+        </p:spPr>
+        <p:style>
+          <a:lnRef idx="1">
+            <a:schemeClr val="accent1"/>
+          </a:lnRef>
+          <a:fillRef idx="0">
+            <a:schemeClr val="accent1"/>
+          </a:fillRef>
+          <a:effectRef idx="0">
+            <a:schemeClr val="accent1"/>
+          </a:effectRef>
+          <a:fontRef idx="minor">
+            <a:schemeClr val="tx1"/>
+          </a:fontRef>
+        </p:style>
+      </p:cxnSp>
+      <p:sp>
+        <p:nvSpPr>
+          <p:cNvPr id="5" name="Rounded Rectangle 4"/>
+          <p:cNvSpPr/>
+          <p:nvPr/>
+        </p:nvSpPr>
+        <p:spPr>
+          <a:xfrm>
+            <a:off x="4404017" y="4500043"/>
+            <a:ext cx="1174167" cy="905607"/>
+          </a:xfrm>
+          <a:prstGeom prst="roundRect">
+            <a:avLst/>
+          </a:prstGeom>
+        </p:spPr>
+        <p:style>
+          <a:lnRef idx="1">
+            <a:schemeClr val="accent5"/>
+          </a:lnRef>
+          <a:fillRef idx="2">
+            <a:schemeClr val="accent5"/>
+          </a:fillRef>
+          <a:effectRef idx="1">
+            <a:schemeClr val="accent5"/>
+          </a:effectRef>
+          <a:fontRef idx="minor">
+            <a:schemeClr val="dk1"/>
+          </a:fontRef>
+        </p:style>
+        <p:txBody>
+          <a:bodyPr rtlCol="0" anchor="ctr"/>
+          <a:lstStyle/>
+          <a:p>
+            <a:pPr algn="ctr"/>
+            <a:r>
+              <a:rPr lang="en-US" sz="1400" dirty="0" smtClean="0"/>
+              <a:t>Source 2</a:t>
+            </a:r>
+          </a:p>
+          <a:p>
+            <a:pPr algn="ctr"/>
+            <a:endParaRPr lang="en-US" sz="1400" dirty="0" smtClean="0"/>
+          </a:p>
+          <a:p>
+            <a:pPr algn="ctr"/>
+            <a:endParaRPr lang="en-US" sz="1400" dirty="0"/>
+          </a:p>
+          <a:p>
+            <a:pPr algn="ctr"/>
+            <a:endParaRPr lang="en-US" sz="1400" dirty="0"/>
+          </a:p>
+        </p:txBody>
+      </p:sp>
+      <p:sp>
+        <p:nvSpPr>
+          <p:cNvPr id="50" name="Rounded Rectangle 49"/>
+          <p:cNvSpPr/>
+          <p:nvPr/>
+        </p:nvSpPr>
+        <p:spPr>
+          <a:xfrm>
+            <a:off x="4429603" y="676198"/>
+            <a:ext cx="1174167" cy="905607"/>
+          </a:xfrm>
+          <a:prstGeom prst="roundRect">
+            <a:avLst/>
+          </a:prstGeom>
+        </p:spPr>
+        <p:style>
+          <a:lnRef idx="1">
+            <a:schemeClr val="accent5"/>
+          </a:lnRef>
+          <a:fillRef idx="2">
+            <a:schemeClr val="accent5"/>
+          </a:fillRef>
+          <a:effectRef idx="1">
+            <a:schemeClr val="accent5"/>
+          </a:effectRef>
+          <a:fontRef idx="minor">
+            <a:schemeClr val="dk1"/>
+          </a:fontRef>
+        </p:style>
+        <p:txBody>
+          <a:bodyPr rtlCol="0" anchor="ctr"/>
+          <a:lstStyle/>
+          <a:p>
+            <a:pPr algn="ctr"/>
+            <a:r>
+              <a:rPr lang="en-US" sz="1400" dirty="0" smtClean="0"/>
+              <a:t>Sink 2</a:t>
+            </a:r>
+          </a:p>
+          <a:p>
+            <a:pPr algn="ctr"/>
+            <a:endParaRPr lang="en-US" sz="1400" dirty="0" smtClean="0"/>
+          </a:p>
+          <a:p>
+            <a:pPr algn="ctr"/>
+            <a:endParaRPr lang="en-US" sz="1400" dirty="0" smtClean="0"/>
+          </a:p>
+          <a:p>
+            <a:pPr algn="ctr"/>
+            <a:endParaRPr lang="en-US" sz="1400" dirty="0"/>
+          </a:p>
+        </p:txBody>
+      </p:sp>
+      <p:sp>
+        <p:nvSpPr>
+          <p:cNvPr id="51" name="Rounded Rectangle 50"/>
+          <p:cNvSpPr/>
+          <p:nvPr/>
+        </p:nvSpPr>
+        <p:spPr>
+          <a:xfrm>
+            <a:off x="1413846" y="2590800"/>
+            <a:ext cx="1174167" cy="905607"/>
+          </a:xfrm>
+          <a:prstGeom prst="roundRect">
+            <a:avLst/>
+          </a:prstGeom>
+        </p:spPr>
+        <p:style>
+          <a:lnRef idx="1">
+            <a:schemeClr val="accent5"/>
+          </a:lnRef>
+          <a:fillRef idx="2">
+            <a:schemeClr val="accent5"/>
+          </a:fillRef>
+          <a:effectRef idx="1">
+            <a:schemeClr val="accent5"/>
+          </a:effectRef>
+          <a:fontRef idx="minor">
+            <a:schemeClr val="dk1"/>
+          </a:fontRef>
+        </p:style>
+        <p:txBody>
+          <a:bodyPr rtlCol="0" anchor="ctr"/>
+          <a:lstStyle/>
+          <a:p>
+            <a:pPr algn="ctr"/>
+            <a:r>
+              <a:rPr lang="en-US" sz="1400" dirty="0" smtClean="0"/>
+              <a:t>Source 1</a:t>
+            </a:r>
+          </a:p>
+          <a:p>
+            <a:pPr algn="ctr"/>
+            <a:endParaRPr lang="en-US" sz="1400" dirty="0"/>
+          </a:p>
+          <a:p>
+            <a:pPr algn="ctr"/>
+            <a:endParaRPr lang="en-US" sz="1400" dirty="0" smtClean="0"/>
+          </a:p>
+          <a:p>
+            <a:pPr algn="ctr"/>
+            <a:endParaRPr lang="en-US" sz="1400" dirty="0"/>
+          </a:p>
+        </p:txBody>
+      </p:sp>
+      <p:sp>
+        <p:nvSpPr>
+          <p:cNvPr id="52" name="Rounded Rectangle 51"/>
+          <p:cNvSpPr/>
+          <p:nvPr/>
+        </p:nvSpPr>
+        <p:spPr>
+          <a:xfrm>
+            <a:off x="7413916" y="2590799"/>
+            <a:ext cx="1174167" cy="905607"/>
+          </a:xfrm>
+          <a:prstGeom prst="roundRect">
+            <a:avLst/>
+          </a:prstGeom>
+        </p:spPr>
+        <p:style>
+          <a:lnRef idx="1">
+            <a:schemeClr val="accent5"/>
+          </a:lnRef>
+          <a:fillRef idx="2">
+            <a:schemeClr val="accent5"/>
+          </a:fillRef>
+          <a:effectRef idx="1">
+            <a:schemeClr val="accent5"/>
+          </a:effectRef>
+          <a:fontRef idx="minor">
+            <a:schemeClr val="dk1"/>
+          </a:fontRef>
+        </p:style>
+        <p:txBody>
+          <a:bodyPr rtlCol="0" anchor="ctr"/>
+          <a:lstStyle/>
+          <a:p>
+            <a:pPr algn="ctr"/>
+            <a:r>
+              <a:rPr lang="en-US" sz="1400" dirty="0" smtClean="0"/>
+              <a:t>Sink 1</a:t>
+            </a:r>
+          </a:p>
+          <a:p>
+            <a:pPr algn="ctr"/>
+            <a:endParaRPr lang="en-US" sz="1400" dirty="0"/>
+          </a:p>
+          <a:p>
+            <a:pPr algn="ctr"/>
+            <a:endParaRPr lang="en-US" sz="1400" dirty="0" smtClean="0"/>
+          </a:p>
+          <a:p>
+            <a:pPr algn="ctr"/>
+            <a:endParaRPr lang="en-US" sz="1400" dirty="0"/>
+          </a:p>
+        </p:txBody>
+      </p:sp>
+      <p:cxnSp>
+        <p:nvCxnSpPr>
+          <p:cNvPr id="84" name="Curved Connector 83"/>
+          <p:cNvCxnSpPr>
+            <a:stCxn id="51" idx="3"/>
+            <a:endCxn id="102" idx="1"/>
+          </p:cNvCxnSpPr>
+          <p:nvPr/>
+        </p:nvCxnSpPr>
+        <p:spPr>
+          <a:xfrm flipV="1">
+            <a:off x="2588013" y="2742126"/>
+            <a:ext cx="1532656" cy="301478"/>
+          </a:xfrm>
+          <a:prstGeom prst="curvedConnector3">
+            <a:avLst>
+              <a:gd name="adj1" fmla="val 50000"/>
+            </a:avLst>
+          </a:prstGeom>
+          <a:ln w="44450" cmpd="sng">
+            <a:solidFill>
+              <a:srgbClr val="002060"/>
+            </a:solidFill>
+            <a:headEnd type="oval"/>
+            <a:tailEnd type="triangle"/>
+          </a:ln>
+        </p:spPr>
+        <p:style>
+          <a:lnRef idx="1">
+            <a:schemeClr val="accent1"/>
+          </a:lnRef>
+          <a:fillRef idx="0">
+            <a:schemeClr val="accent1"/>
+          </a:fillRef>
+          <a:effectRef idx="0">
+            <a:schemeClr val="accent1"/>
+          </a:effectRef>
+          <a:fontRef idx="minor">
+            <a:schemeClr val="tx1"/>
+          </a:fontRef>
+        </p:style>
+      </p:cxnSp>
+      <p:pic>
+        <p:nvPicPr>
+          <p:cNvPr id="91" name="Picture 90"/>
+          <p:cNvPicPr>
+            <a:picLocks noChangeAspect="1"/>
+          </p:cNvPicPr>
+          <p:nvPr/>
+        </p:nvPicPr>
+        <p:blipFill>
+          <a:blip r:embed="rId2"/>
+          <a:stretch>
+            <a:fillRect/>
+          </a:stretch>
+        </p:blipFill>
+        <p:spPr>
+          <a:xfrm>
+            <a:off x="4114647" y="3058999"/>
+            <a:ext cx="1245615" cy="315448"/>
+          </a:xfrm>
+          <a:prstGeom prst="rect">
+            <a:avLst/>
+          </a:prstGeom>
+        </p:spPr>
+      </p:pic>
+      <p:pic>
+        <p:nvPicPr>
+          <p:cNvPr id="102" name="Picture 101"/>
+          <p:cNvPicPr>
+            <a:picLocks noChangeAspect="1"/>
+          </p:cNvPicPr>
+          <p:nvPr/>
+        </p:nvPicPr>
+        <p:blipFill>
+          <a:blip r:embed="rId2"/>
+          <a:stretch>
+            <a:fillRect/>
+          </a:stretch>
+        </p:blipFill>
+        <p:spPr>
+          <a:xfrm>
+            <a:off x="4120669" y="2584402"/>
+            <a:ext cx="1245615" cy="315448"/>
+          </a:xfrm>
+          <a:prstGeom prst="rect">
+            <a:avLst/>
+          </a:prstGeom>
+        </p:spPr>
+      </p:pic>
+      <p:cxnSp>
+        <p:nvCxnSpPr>
+          <p:cNvPr id="103" name="Curved Connector 102"/>
+          <p:cNvCxnSpPr>
+            <a:stCxn id="91" idx="3"/>
+            <a:endCxn id="50" idx="2"/>
+          </p:cNvCxnSpPr>
+          <p:nvPr/>
+        </p:nvCxnSpPr>
+        <p:spPr>
+          <a:xfrm flipH="1" flipV="1">
+            <a:off x="5016687" y="1581805"/>
+            <a:ext cx="343575" cy="1634918"/>
+          </a:xfrm>
+          <a:prstGeom prst="curvedConnector4">
+            <a:avLst>
+              <a:gd name="adj1" fmla="val -110040"/>
+              <a:gd name="adj2" fmla="val 70958"/>
+            </a:avLst>
+          </a:prstGeom>
+          <a:ln w="44450" cmpd="sng">
+            <a:solidFill>
+              <a:srgbClr val="002060"/>
+            </a:solidFill>
+            <a:headEnd type="oval"/>
+            <a:tailEnd type="triangle"/>
+          </a:ln>
+        </p:spPr>
+        <p:style>
+          <a:lnRef idx="1">
+            <a:schemeClr val="accent1"/>
+          </a:lnRef>
+          <a:fillRef idx="0">
+            <a:schemeClr val="accent1"/>
+          </a:fillRef>
+          <a:effectRef idx="0">
+            <a:schemeClr val="accent1"/>
+          </a:effectRef>
+          <a:fontRef idx="minor">
+            <a:schemeClr val="tx1"/>
+          </a:fontRef>
+        </p:style>
+      </p:cxnSp>
+      <p:cxnSp>
+        <p:nvCxnSpPr>
+          <p:cNvPr id="121" name="Curved Connector 120"/>
+          <p:cNvCxnSpPr>
+            <a:stCxn id="5" idx="0"/>
+            <a:endCxn id="91" idx="1"/>
+          </p:cNvCxnSpPr>
+          <p:nvPr/>
+        </p:nvCxnSpPr>
+        <p:spPr>
+          <a:xfrm rot="16200000" flipV="1">
+            <a:off x="3911214" y="3420156"/>
+            <a:ext cx="1283320" cy="876454"/>
+          </a:xfrm>
+          <a:prstGeom prst="curvedConnector4">
+            <a:avLst>
+              <a:gd name="adj1" fmla="val 13024"/>
+              <a:gd name="adj2" fmla="val 182259"/>
+            </a:avLst>
+          </a:prstGeom>
+          <a:ln w="44450" cmpd="sng">
+            <a:solidFill>
+              <a:srgbClr val="002060"/>
+            </a:solidFill>
+            <a:headEnd type="oval"/>
+            <a:tailEnd type="triangle"/>
+          </a:ln>
+        </p:spPr>
+        <p:style>
+          <a:lnRef idx="1">
+            <a:schemeClr val="accent1"/>
+          </a:lnRef>
+          <a:fillRef idx="0">
+            <a:schemeClr val="accent1"/>
+          </a:fillRef>
+          <a:effectRef idx="0">
+            <a:schemeClr val="accent1"/>
+          </a:effectRef>
+          <a:fontRef idx="minor">
+            <a:schemeClr val="tx1"/>
+          </a:fontRef>
+        </p:style>
+      </p:cxnSp>
+      <p:sp>
+        <p:nvSpPr>
+          <p:cNvPr id="136" name="Rounded Rectangle 135"/>
+          <p:cNvSpPr/>
+          <p:nvPr/>
+        </p:nvSpPr>
+        <p:spPr>
+          <a:xfrm>
+            <a:off x="6302224" y="4018083"/>
+            <a:ext cx="2142104" cy="1447800"/>
+          </a:xfrm>
+          <a:prstGeom prst="roundRect">
+            <a:avLst/>
+          </a:prstGeom>
+        </p:spPr>
+        <p:style>
+          <a:lnRef idx="1">
+            <a:schemeClr val="accent1"/>
+          </a:lnRef>
+          <a:fillRef idx="2">
+            <a:schemeClr val="accent1"/>
+          </a:fillRef>
+          <a:effectRef idx="1">
+            <a:schemeClr val="accent1"/>
+          </a:effectRef>
+          <a:fontRef idx="minor">
+            <a:schemeClr val="dk1"/>
+          </a:fontRef>
+        </p:style>
+        <p:txBody>
+          <a:bodyPr rtlCol="0" anchor="ctr"/>
+          <a:lstStyle/>
+          <a:p>
+            <a:pPr marL="285750" indent="-285750">
+              <a:buFont typeface="Arial" panose="020B0604020202020204" pitchFamily="34" charset="0"/>
+              <a:buChar char="•"/>
+            </a:pPr>
+            <a:r>
+              <a:rPr lang="en-US" sz="1200" dirty="0" smtClean="0"/>
+              <a:t>Flow 1:</a:t>
+            </a:r>
+          </a:p>
+          <a:p>
+            <a:pPr marL="742950" lvl="1" indent="-285750">
+              <a:buFont typeface="Arial" panose="020B0604020202020204" pitchFamily="34" charset="0"/>
+              <a:buChar char="•"/>
+            </a:pPr>
+            <a:r>
+              <a:rPr lang="en-US" sz="1200" dirty="0" smtClean="0"/>
+              <a:t>High Priority</a:t>
+            </a:r>
+          </a:p>
+          <a:p>
+            <a:pPr marL="742950" lvl="1" indent="-285750">
+              <a:buFont typeface="Arial" panose="020B0604020202020204" pitchFamily="34" charset="0"/>
+              <a:buChar char="•"/>
+            </a:pPr>
+            <a:r>
+              <a:rPr lang="en-US" sz="1200" dirty="0" smtClean="0"/>
+              <a:t>From Source 1 </a:t>
+            </a:r>
+          </a:p>
+          <a:p>
+            <a:pPr marL="742950" lvl="1" indent="-285750">
+              <a:buFont typeface="Arial" panose="020B0604020202020204" pitchFamily="34" charset="0"/>
+              <a:buChar char="•"/>
+            </a:pPr>
+            <a:r>
+              <a:rPr lang="en-US" sz="1200" dirty="0" smtClean="0"/>
+              <a:t>To Sink 1</a:t>
+            </a:r>
+          </a:p>
+          <a:p>
+            <a:pPr marL="285750" indent="-285750">
+              <a:buFont typeface="Arial" panose="020B0604020202020204" pitchFamily="34" charset="0"/>
+              <a:buChar char="•"/>
+            </a:pPr>
+            <a:r>
+              <a:rPr lang="en-US" sz="1200" dirty="0" smtClean="0"/>
+              <a:t>Flow 2:</a:t>
+            </a:r>
+          </a:p>
+          <a:p>
+            <a:pPr marL="742950" lvl="1" indent="-285750">
+              <a:buFont typeface="Arial" panose="020B0604020202020204" pitchFamily="34" charset="0"/>
+              <a:buChar char="•"/>
+            </a:pPr>
+            <a:r>
+              <a:rPr lang="en-US" sz="1200" dirty="0" smtClean="0"/>
+              <a:t>Low Priority</a:t>
+            </a:r>
+          </a:p>
+          <a:p>
+            <a:pPr marL="742950" lvl="1" indent="-285750">
+              <a:buFont typeface="Arial" panose="020B0604020202020204" pitchFamily="34" charset="0"/>
+              <a:buChar char="•"/>
+            </a:pPr>
+            <a:r>
+              <a:rPr lang="en-US" sz="1200" dirty="0" smtClean="0"/>
+              <a:t>From Source 2</a:t>
+            </a:r>
+          </a:p>
+          <a:p>
+            <a:pPr marL="742950" lvl="1" indent="-285750">
+              <a:buFont typeface="Arial" panose="020B0604020202020204" pitchFamily="34" charset="0"/>
+              <a:buChar char="•"/>
+            </a:pPr>
+            <a:r>
+              <a:rPr lang="en-US" sz="1200" dirty="0" smtClean="0"/>
+              <a:t>To Sink 2</a:t>
+            </a:r>
+            <a:endParaRPr lang="en-US" sz="1200" dirty="0"/>
+          </a:p>
+        </p:txBody>
+      </p:sp>
+      <p:pic>
+        <p:nvPicPr>
+          <p:cNvPr id="1032" name="Picture 1031"/>
+          <p:cNvPicPr>
+            <a:picLocks noChangeAspect="1"/>
+          </p:cNvPicPr>
+          <p:nvPr/>
+        </p:nvPicPr>
+        <p:blipFill>
+          <a:blip r:embed="rId3" cstate="print">
+            <a:extLst>
+              <a:ext uri="{28A0092B-C50C-407E-A947-70E740481C1C}">
+                <a14:useLocalDpi xmlns:a14="http://schemas.microsoft.com/office/drawing/2010/main" val="0"/>
+              </a:ext>
+            </a:extLst>
+          </a:blip>
+          <a:stretch>
+            <a:fillRect/>
+          </a:stretch>
+        </p:blipFill>
+        <p:spPr>
+          <a:xfrm>
+            <a:off x="1652121" y="2885753"/>
+            <a:ext cx="697615" cy="525788"/>
+          </a:xfrm>
+          <a:prstGeom prst="rect">
+            <a:avLst/>
+          </a:prstGeom>
+        </p:spPr>
+      </p:pic>
+      <p:pic>
+        <p:nvPicPr>
+          <p:cNvPr id="138" name="Picture 137"/>
+          <p:cNvPicPr>
+            <a:picLocks noChangeAspect="1"/>
+          </p:cNvPicPr>
+          <p:nvPr/>
+        </p:nvPicPr>
+        <p:blipFill>
+          <a:blip r:embed="rId3" cstate="print">
+            <a:extLst>
+              <a:ext uri="{28A0092B-C50C-407E-A947-70E740481C1C}">
+                <a14:useLocalDpi xmlns:a14="http://schemas.microsoft.com/office/drawing/2010/main" val="0"/>
+              </a:ext>
+            </a:extLst>
+          </a:blip>
+          <a:stretch>
+            <a:fillRect/>
+          </a:stretch>
+        </p:blipFill>
+        <p:spPr>
+          <a:xfrm>
+            <a:off x="4642293" y="4791219"/>
+            <a:ext cx="697615" cy="525788"/>
+          </a:xfrm>
+          <a:prstGeom prst="rect">
+            <a:avLst/>
+          </a:prstGeom>
+        </p:spPr>
+      </p:pic>
+      <p:pic>
+        <p:nvPicPr>
+          <p:cNvPr id="1036" name="Picture 1035"/>
+          <p:cNvPicPr>
+            <a:picLocks noChangeAspect="1"/>
+          </p:cNvPicPr>
+          <p:nvPr/>
+        </p:nvPicPr>
+        <p:blipFill>
+          <a:blip r:embed="rId4" cstate="print">
+            <a:extLst>
+              <a:ext uri="{28A0092B-C50C-407E-A947-70E740481C1C}">
+                <a14:useLocalDpi xmlns:a14="http://schemas.microsoft.com/office/drawing/2010/main" val="0"/>
+              </a:ext>
+            </a:extLst>
+          </a:blip>
+          <a:stretch>
+            <a:fillRect/>
+          </a:stretch>
+        </p:blipFill>
+        <p:spPr>
+          <a:xfrm>
+            <a:off x="4654183" y="987501"/>
+            <a:ext cx="693562" cy="522734"/>
+          </a:xfrm>
+          <a:prstGeom prst="rect">
+            <a:avLst/>
+          </a:prstGeom>
+        </p:spPr>
+      </p:pic>
+      <p:pic>
+        <p:nvPicPr>
+          <p:cNvPr id="1037" name="Picture 1036"/>
+          <p:cNvPicPr>
+            <a:picLocks noChangeAspect="1"/>
+          </p:cNvPicPr>
+          <p:nvPr/>
+        </p:nvPicPr>
+        <p:blipFill>
+          <a:blip r:embed="rId5" cstate="print">
+            <a:extLst>
+              <a:ext uri="{28A0092B-C50C-407E-A947-70E740481C1C}">
+                <a14:useLocalDpi xmlns:a14="http://schemas.microsoft.com/office/drawing/2010/main" val="0"/>
+              </a:ext>
+            </a:extLst>
+          </a:blip>
+          <a:stretch>
+            <a:fillRect/>
+          </a:stretch>
+        </p:blipFill>
+        <p:spPr>
+          <a:xfrm>
+            <a:off x="7649260" y="2885753"/>
+            <a:ext cx="703477" cy="530207"/>
+          </a:xfrm>
+          <a:prstGeom prst="rect">
+            <a:avLst/>
+          </a:prstGeom>
+        </p:spPr>
+      </p:pic>
+    </p:spTree>
+    <p:extLst>
+      <p:ext uri="{BB962C8B-B14F-4D97-AF65-F5344CB8AC3E}">
+        <p14:creationId xmlns:p14="http://schemas.microsoft.com/office/powerpoint/2010/main" val="1904022698"/>
+      </p:ext>
+    </p:extLst>
+  </p:cSld>
+  <p:clrMapOvr>
+    <a:masterClrMapping/>
+  </p:clrMapOvr>
+  <p:timing>
+    <p:tnLst>
+      <p:par>
+        <p:cTn id="1" dur="indefinite" restart="never" nodeType="tmRoot"/>
+      </p:par>
+    </p:tnLst>
+  </p:timing>
+</p:sld>
+</file>
+
 <file path=ppt/theme/theme1.xml><?xml version="1.0" encoding="utf-8"?>
 <a:theme xmlns:a="http://schemas.openxmlformats.org/drawingml/2006/main" name="Office Theme">
   <a:themeElements>

</xml_diff>

<commit_message>
updated routing example images
</commit_message>
<xml_diff>
--- a/thesis/figs/ros_component.pptx
+++ b/thesis/figs/ros_component.pptx
@@ -6311,8 +6311,9 @@
             <a:pPr algn="ctr"/>
             <a:r>
               <a:rPr lang="en-US" dirty="0" smtClean="0"/>
-              <a:t>Router</a:t>
-            </a:r>
+              <a:t>Routing Node</a:t>
+            </a:r>
+            <a:endParaRPr lang="en-US" dirty="0" smtClean="0"/>
           </a:p>
           <a:p>
             <a:pPr algn="ctr"/>
@@ -6398,8 +6399,8 @@
         </p:nvSpPr>
         <p:spPr>
           <a:xfrm>
-            <a:off x="3832516" y="2352598"/>
-            <a:ext cx="2336896" cy="1058279"/>
+            <a:off x="3832516" y="2415842"/>
+            <a:ext cx="2336896" cy="995035"/>
           </a:xfrm>
           <a:prstGeom prst="roundRect">
             <a:avLst/>
@@ -6424,34 +6425,34 @@
           <a:lstStyle/>
           <a:p>
             <a:r>
-              <a:rPr lang="en-US" sz="1000" dirty="0" smtClean="0"/>
+              <a:rPr lang="en-US" sz="1050" b="1" dirty="0" smtClean="0"/>
               <a:t>      High Priority Queue</a:t>
             </a:r>
           </a:p>
           <a:p>
-            <a:endParaRPr lang="en-US" sz="1000" dirty="0" smtClean="0"/>
-          </a:p>
-          <a:p>
-            <a:endParaRPr lang="en-US" sz="1000" dirty="0" smtClean="0"/>
-          </a:p>
-          <a:p>
-            <a:r>
-              <a:rPr lang="en-US" sz="1000" dirty="0" smtClean="0"/>
+            <a:endParaRPr lang="en-US" sz="1050" b="1" dirty="0" smtClean="0"/>
+          </a:p>
+          <a:p>
+            <a:endParaRPr lang="en-US" sz="1050" b="1" dirty="0" smtClean="0"/>
+          </a:p>
+          <a:p>
+            <a:r>
+              <a:rPr lang="en-US" sz="1050" b="1" dirty="0" smtClean="0"/>
               <a:t>      Low </a:t>
             </a:r>
             <a:r>
-              <a:rPr lang="en-US" sz="1000" dirty="0"/>
+              <a:rPr lang="en-US" sz="1050" b="1" dirty="0"/>
               <a:t>Priority Queue</a:t>
             </a:r>
           </a:p>
           <a:p>
             <a:r>
-              <a:rPr lang="en-US" sz="1000" dirty="0" smtClean="0"/>
+              <a:rPr lang="en-US" sz="1050" b="1" dirty="0" smtClean="0"/>
               <a:t>      </a:t>
             </a:r>
           </a:p>
           <a:p>
-            <a:endParaRPr lang="en-US" sz="1000" dirty="0" smtClean="0"/>
+            <a:endParaRPr lang="en-US" sz="1050" b="1" dirty="0" smtClean="0"/>
           </a:p>
         </p:txBody>
       </p:sp>
@@ -6555,7 +6556,6 @@
               <a:rPr lang="en-US" dirty="0"/>
               <a:t>3</a:t>
             </a:r>
-            <a:endParaRPr lang="en-US" dirty="0"/>
           </a:p>
           <a:p>
             <a:pPr algn="ctr"/>
@@ -6644,8 +6644,8 @@
         </p:nvCxnSpPr>
         <p:spPr>
           <a:xfrm>
-            <a:off x="5366284" y="2742126"/>
-            <a:ext cx="2047632" cy="301477"/>
+            <a:off x="5766107" y="2742126"/>
+            <a:ext cx="1647809" cy="301477"/>
           </a:xfrm>
           <a:prstGeom prst="curvedConnector3">
             <a:avLst>
@@ -6946,7 +6946,7 @@
         <p:spPr>
           <a:xfrm>
             <a:off x="4114647" y="3058999"/>
-            <a:ext cx="1245615" cy="315448"/>
+            <a:ext cx="1638453" cy="315448"/>
           </a:xfrm>
           <a:prstGeom prst="rect">
             <a:avLst/>
@@ -6970,7 +6970,7 @@
         <p:spPr>
           <a:xfrm>
             <a:off x="4120669" y="2584402"/>
-            <a:ext cx="1245615" cy="315448"/>
+            <a:ext cx="1645438" cy="315448"/>
           </a:xfrm>
           <a:prstGeom prst="rect">
             <a:avLst/>
@@ -6989,12 +6989,12 @@
         <p:spPr>
           <a:xfrm flipH="1" flipV="1">
             <a:off x="5016687" y="1581805"/>
-            <a:ext cx="343575" cy="1634918"/>
+            <a:ext cx="736413" cy="1634918"/>
           </a:xfrm>
           <a:prstGeom prst="curvedConnector4">
             <a:avLst>
-              <a:gd name="adj1" fmla="val -110040"/>
-              <a:gd name="adj2" fmla="val 70958"/>
+              <a:gd name="adj1" fmla="val -83575"/>
+              <a:gd name="adj2" fmla="val 74184"/>
             </a:avLst>
           </a:prstGeom>
           <a:ln w="44450" cmpd="sng">
@@ -7036,8 +7036,8 @@
           </a:xfrm>
           <a:prstGeom prst="curvedConnector4">
             <a:avLst>
-              <a:gd name="adj1" fmla="val 13024"/>
-              <a:gd name="adj2" fmla="val 182259"/>
+              <a:gd name="adj1" fmla="val 10284"/>
+              <a:gd name="adj2" fmla="val 181256"/>
             </a:avLst>
           </a:prstGeom>
           <a:ln w="44450" cmpd="sng">

</xml_diff>

<commit_message>
made simpler diagram for network traffic filtering
</commit_message>
<xml_diff>
--- a/thesis/figs/ros_component.pptx
+++ b/thesis/figs/ros_component.pptx
@@ -9,6 +9,7 @@
     <p:sldId id="257" r:id="rId3"/>
     <p:sldId id="258" r:id="rId4"/>
     <p:sldId id="259" r:id="rId5"/>
+    <p:sldId id="260" r:id="rId6"/>
   </p:sldIdLst>
   <p:sldSz cx="9144000" cy="6858000" type="screen4x3"/>
   <p:notesSz cx="6858000" cy="9144000"/>
@@ -307,7 +308,7 @@
           <a:p>
             <a:fld id="{07D09854-399E-4080-871F-4892A4C17278}" type="datetimeFigureOut">
               <a:rPr lang="en-US" smtClean="0"/>
-              <a:t>2015-09-23</a:t>
+              <a:t>2015-09-24</a:t>
             </a:fld>
             <a:endParaRPr lang="en-US"/>
           </a:p>
@@ -477,7 +478,7 @@
           <a:p>
             <a:fld id="{07D09854-399E-4080-871F-4892A4C17278}" type="datetimeFigureOut">
               <a:rPr lang="en-US" smtClean="0"/>
-              <a:t>2015-09-23</a:t>
+              <a:t>2015-09-24</a:t>
             </a:fld>
             <a:endParaRPr lang="en-US"/>
           </a:p>
@@ -657,7 +658,7 @@
           <a:p>
             <a:fld id="{07D09854-399E-4080-871F-4892A4C17278}" type="datetimeFigureOut">
               <a:rPr lang="en-US" smtClean="0"/>
-              <a:t>2015-09-23</a:t>
+              <a:t>2015-09-24</a:t>
             </a:fld>
             <a:endParaRPr lang="en-US"/>
           </a:p>
@@ -827,7 +828,7 @@
           <a:p>
             <a:fld id="{07D09854-399E-4080-871F-4892A4C17278}" type="datetimeFigureOut">
               <a:rPr lang="en-US" smtClean="0"/>
-              <a:t>2015-09-23</a:t>
+              <a:t>2015-09-24</a:t>
             </a:fld>
             <a:endParaRPr lang="en-US"/>
           </a:p>
@@ -1073,7 +1074,7 @@
           <a:p>
             <a:fld id="{07D09854-399E-4080-871F-4892A4C17278}" type="datetimeFigureOut">
               <a:rPr lang="en-US" smtClean="0"/>
-              <a:t>2015-09-23</a:t>
+              <a:t>2015-09-24</a:t>
             </a:fld>
             <a:endParaRPr lang="en-US"/>
           </a:p>
@@ -1361,7 +1362,7 @@
           <a:p>
             <a:fld id="{07D09854-399E-4080-871F-4892A4C17278}" type="datetimeFigureOut">
               <a:rPr lang="en-US" smtClean="0"/>
-              <a:t>2015-09-23</a:t>
+              <a:t>2015-09-24</a:t>
             </a:fld>
             <a:endParaRPr lang="en-US"/>
           </a:p>
@@ -1783,7 +1784,7 @@
           <a:p>
             <a:fld id="{07D09854-399E-4080-871F-4892A4C17278}" type="datetimeFigureOut">
               <a:rPr lang="en-US" smtClean="0"/>
-              <a:t>2015-09-23</a:t>
+              <a:t>2015-09-24</a:t>
             </a:fld>
             <a:endParaRPr lang="en-US"/>
           </a:p>
@@ -1901,7 +1902,7 @@
           <a:p>
             <a:fld id="{07D09854-399E-4080-871F-4892A4C17278}" type="datetimeFigureOut">
               <a:rPr lang="en-US" smtClean="0"/>
-              <a:t>2015-09-23</a:t>
+              <a:t>2015-09-24</a:t>
             </a:fld>
             <a:endParaRPr lang="en-US"/>
           </a:p>
@@ -1996,7 +1997,7 @@
           <a:p>
             <a:fld id="{07D09854-399E-4080-871F-4892A4C17278}" type="datetimeFigureOut">
               <a:rPr lang="en-US" smtClean="0"/>
-              <a:t>2015-09-23</a:t>
+              <a:t>2015-09-24</a:t>
             </a:fld>
             <a:endParaRPr lang="en-US"/>
           </a:p>
@@ -2273,7 +2274,7 @@
           <a:p>
             <a:fld id="{07D09854-399E-4080-871F-4892A4C17278}" type="datetimeFigureOut">
               <a:rPr lang="en-US" smtClean="0"/>
-              <a:t>2015-09-23</a:t>
+              <a:t>2015-09-24</a:t>
             </a:fld>
             <a:endParaRPr lang="en-US"/>
           </a:p>
@@ -2526,7 +2527,7 @@
           <a:p>
             <a:fld id="{07D09854-399E-4080-871F-4892A4C17278}" type="datetimeFigureOut">
               <a:rPr lang="en-US" smtClean="0"/>
-              <a:t>2015-09-23</a:t>
+              <a:t>2015-09-24</a:t>
             </a:fld>
             <a:endParaRPr lang="en-US"/>
           </a:p>
@@ -2739,7 +2740,7 @@
           <a:p>
             <a:fld id="{07D09854-399E-4080-871F-4892A4C17278}" type="datetimeFigureOut">
               <a:rPr lang="en-US" smtClean="0"/>
-              <a:t>2015-09-23</a:t>
+              <a:t>2015-09-24</a:t>
             </a:fld>
             <a:endParaRPr lang="en-US"/>
           </a:p>
@@ -6934,7 +6935,6 @@
                 <a:rPr lang="en-US" dirty="0" smtClean="0"/>
                 <a:t>`</a:t>
               </a:r>
-              <a:endParaRPr lang="en-US" dirty="0" smtClean="0"/>
             </a:p>
           </p:txBody>
         </p:sp>
@@ -8020,7 +8020,6 @@
               <a:rPr lang="en-US" dirty="0" smtClean="0"/>
               <a:t>Priority QDISC</a:t>
             </a:r>
-            <a:endParaRPr lang="en-US" dirty="0" smtClean="0"/>
           </a:p>
         </p:txBody>
       </p:sp>
@@ -8060,13 +8059,8 @@
             <a:pPr algn="ctr"/>
             <a:r>
               <a:rPr lang="en-US" dirty="0" smtClean="0"/>
-              <a:t>Traffic Shaping</a:t>
-            </a:r>
-            <a:r>
-              <a:rPr lang="en-US" dirty="0" smtClean="0"/>
-              <a:t> QDISC</a:t>
-            </a:r>
-            <a:endParaRPr lang="en-US" dirty="0" smtClean="0"/>
+              <a:t>Traffic Shaping QDISC</a:t>
+            </a:r>
           </a:p>
         </p:txBody>
       </p:sp>
@@ -8129,7 +8123,6 @@
                 <a:rPr lang="en-US" dirty="0" smtClean="0"/>
                 <a:t>QDISC</a:t>
               </a:r>
-              <a:endParaRPr lang="en-US" dirty="0" smtClean="0"/>
             </a:p>
           </p:txBody>
         </p:sp>
@@ -8178,7 +8171,6 @@
                 <a:rPr lang="en-US" dirty="0" smtClean="0"/>
                 <a:t>QDISC</a:t>
               </a:r>
-              <a:endParaRPr lang="en-US" dirty="0" smtClean="0"/>
             </a:p>
           </p:txBody>
         </p:sp>
@@ -8242,7 +8234,6 @@
                 <a:rPr lang="en-US" dirty="0" smtClean="0"/>
                 <a:t>QDISC</a:t>
               </a:r>
-              <a:endParaRPr lang="en-US" dirty="0" smtClean="0"/>
             </a:p>
           </p:txBody>
         </p:sp>
@@ -8291,7 +8282,6 @@
                 <a:rPr lang="en-US" dirty="0" smtClean="0"/>
                 <a:t>QDISC</a:t>
               </a:r>
-              <a:endParaRPr lang="en-US" dirty="0" smtClean="0"/>
             </a:p>
           </p:txBody>
         </p:sp>
@@ -9183,11 +9173,7 @@
             </a:r>
             <a:r>
               <a:rPr lang="en-US" sz="1200" dirty="0" smtClean="0"/>
-              <a:t> into the QDISC’s parent QDISC.  If the parent is the </a:t>
-            </a:r>
-            <a:r>
-              <a:rPr lang="en-US" sz="1200" dirty="0" smtClean="0"/>
-              <a:t> root, it is transmitted.</a:t>
+              <a:t> into the QDISC’s parent QDISC.  If the parent is the  root, it is transmitted.</a:t>
             </a:r>
             <a:endParaRPr lang="en-US" sz="1200" dirty="0"/>
           </a:p>
@@ -9228,11 +9214,7 @@
           <a:p>
             <a:r>
               <a:rPr lang="en-US" sz="1200" dirty="0" smtClean="0"/>
-              <a:t>Traffic produced by the application is </a:t>
-            </a:r>
-            <a:r>
-              <a:rPr lang="en-US" sz="1200" dirty="0" smtClean="0"/>
-              <a:t>received by the Linux TC in the Kernel and filtered into QDISCs where it awaits transmission.</a:t>
+              <a:t>Traffic produced by the application is received by the Linux TC in the Kernel and filtered into QDISCs where it awaits transmission.</a:t>
             </a:r>
             <a:endParaRPr lang="en-US" sz="1200" dirty="0"/>
           </a:p>
@@ -9242,6 +9224,803 @@
     <p:extLst>
       <p:ext uri="{BB962C8B-B14F-4D97-AF65-F5344CB8AC3E}">
         <p14:creationId xmlns:p14="http://schemas.microsoft.com/office/powerpoint/2010/main" val="750679001"/>
+      </p:ext>
+    </p:extLst>
+  </p:cSld>
+  <p:clrMapOvr>
+    <a:masterClrMapping/>
+  </p:clrMapOvr>
+  <p:timing>
+    <p:tnLst>
+      <p:par>
+        <p:cTn id="1" dur="indefinite" restart="never" nodeType="tmRoot"/>
+      </p:par>
+    </p:tnLst>
+  </p:timing>
+</p:sld>
+</file>
+
+<file path=ppt/slides/slide5.xml><?xml version="1.0" encoding="utf-8"?>
+<p:sld xmlns:a="http://schemas.openxmlformats.org/drawingml/2006/main" xmlns:r="http://schemas.openxmlformats.org/officeDocument/2006/relationships" xmlns:p="http://schemas.openxmlformats.org/presentationml/2006/main">
+  <p:cSld>
+    <p:spTree>
+      <p:nvGrpSpPr>
+        <p:cNvPr id="1" name=""/>
+        <p:cNvGrpSpPr/>
+        <p:nvPr/>
+      </p:nvGrpSpPr>
+      <p:grpSpPr>
+        <a:xfrm>
+          <a:off x="0" y="0"/>
+          <a:ext cx="0" cy="0"/>
+          <a:chOff x="0" y="0"/>
+          <a:chExt cx="0" cy="0"/>
+        </a:xfrm>
+      </p:grpSpPr>
+      <p:sp>
+        <p:nvSpPr>
+          <p:cNvPr id="2" name="Rounded Rectangle 1"/>
+          <p:cNvSpPr/>
+          <p:nvPr/>
+        </p:nvSpPr>
+        <p:spPr>
+          <a:xfrm>
+            <a:off x="5029200" y="5948248"/>
+            <a:ext cx="1288125" cy="648526"/>
+          </a:xfrm>
+          <a:prstGeom prst="roundRect">
+            <a:avLst/>
+          </a:prstGeom>
+        </p:spPr>
+        <p:style>
+          <a:lnRef idx="1">
+            <a:schemeClr val="accent5"/>
+          </a:lnRef>
+          <a:fillRef idx="2">
+            <a:schemeClr val="accent5"/>
+          </a:fillRef>
+          <a:effectRef idx="1">
+            <a:schemeClr val="accent5"/>
+          </a:effectRef>
+          <a:fontRef idx="minor">
+            <a:schemeClr val="dk1"/>
+          </a:fontRef>
+        </p:style>
+        <p:txBody>
+          <a:bodyPr rtlCol="0" anchor="ctr"/>
+          <a:lstStyle/>
+          <a:p>
+            <a:pPr algn="ctr"/>
+            <a:r>
+              <a:rPr lang="en-US" sz="1400" dirty="0" smtClean="0"/>
+              <a:t>Network </a:t>
+            </a:r>
+          </a:p>
+          <a:p>
+            <a:pPr algn="ctr"/>
+            <a:r>
+              <a:rPr lang="en-US" sz="1400" dirty="0" smtClean="0"/>
+              <a:t>Interface</a:t>
+            </a:r>
+            <a:endParaRPr lang="en-US" sz="1400" dirty="0"/>
+          </a:p>
+        </p:txBody>
+      </p:sp>
+      <p:sp>
+        <p:nvSpPr>
+          <p:cNvPr id="6" name="Rounded Rectangle 5"/>
+          <p:cNvSpPr/>
+          <p:nvPr/>
+        </p:nvSpPr>
+        <p:spPr>
+          <a:xfrm>
+            <a:off x="381000" y="2955523"/>
+            <a:ext cx="1219200" cy="733620"/>
+          </a:xfrm>
+          <a:prstGeom prst="roundRect">
+            <a:avLst/>
+          </a:prstGeom>
+        </p:spPr>
+        <p:style>
+          <a:lnRef idx="0">
+            <a:schemeClr val="accent6"/>
+          </a:lnRef>
+          <a:fillRef idx="3">
+            <a:schemeClr val="accent6"/>
+          </a:fillRef>
+          <a:effectRef idx="3">
+            <a:schemeClr val="accent6"/>
+          </a:effectRef>
+          <a:fontRef idx="minor">
+            <a:schemeClr val="lt1"/>
+          </a:fontRef>
+        </p:style>
+        <p:txBody>
+          <a:bodyPr rtlCol="0" anchor="ctr"/>
+          <a:lstStyle/>
+          <a:p>
+            <a:pPr algn="ctr"/>
+            <a:r>
+              <a:rPr lang="en-US" dirty="0" smtClean="0"/>
+              <a:t>Network Traffic</a:t>
+            </a:r>
+            <a:endParaRPr lang="en-US" dirty="0" smtClean="0"/>
+          </a:p>
+        </p:txBody>
+      </p:sp>
+      <p:sp>
+        <p:nvSpPr>
+          <p:cNvPr id="5" name="Rounded Rectangle 4"/>
+          <p:cNvSpPr/>
+          <p:nvPr/>
+        </p:nvSpPr>
+        <p:spPr>
+          <a:xfrm>
+            <a:off x="6553200" y="3505200"/>
+            <a:ext cx="1031477" cy="614281"/>
+          </a:xfrm>
+          <a:prstGeom prst="roundRect">
+            <a:avLst/>
+          </a:prstGeom>
+        </p:spPr>
+        <p:style>
+          <a:lnRef idx="0">
+            <a:schemeClr val="accent1"/>
+          </a:lnRef>
+          <a:fillRef idx="3">
+            <a:schemeClr val="accent1"/>
+          </a:fillRef>
+          <a:effectRef idx="3">
+            <a:schemeClr val="accent1"/>
+          </a:effectRef>
+          <a:fontRef idx="minor">
+            <a:schemeClr val="lt1"/>
+          </a:fontRef>
+        </p:style>
+        <p:txBody>
+          <a:bodyPr rtlCol="0" anchor="ctr"/>
+          <a:lstStyle/>
+          <a:p>
+            <a:pPr algn="ctr"/>
+            <a:r>
+              <a:rPr lang="en-US" dirty="0" smtClean="0"/>
+              <a:t>Shaper</a:t>
+            </a:r>
+            <a:endParaRPr lang="en-US" dirty="0" smtClean="0"/>
+          </a:p>
+        </p:txBody>
+      </p:sp>
+      <p:sp>
+        <p:nvSpPr>
+          <p:cNvPr id="7" name="Rounded Rectangle 6"/>
+          <p:cNvSpPr/>
+          <p:nvPr/>
+        </p:nvSpPr>
+        <p:spPr>
+          <a:xfrm>
+            <a:off x="6659650" y="4478781"/>
+            <a:ext cx="818579" cy="596970"/>
+          </a:xfrm>
+          <a:prstGeom prst="roundRect">
+            <a:avLst/>
+          </a:prstGeom>
+        </p:spPr>
+        <p:style>
+          <a:lnRef idx="0">
+            <a:schemeClr val="accent4"/>
+          </a:lnRef>
+          <a:fillRef idx="3">
+            <a:schemeClr val="accent4"/>
+          </a:fillRef>
+          <a:effectRef idx="3">
+            <a:schemeClr val="accent4"/>
+          </a:effectRef>
+          <a:fontRef idx="minor">
+            <a:schemeClr val="lt1"/>
+          </a:fontRef>
+        </p:style>
+        <p:txBody>
+          <a:bodyPr rtlCol="0" anchor="ctr"/>
+          <a:lstStyle/>
+          <a:p>
+            <a:pPr algn="ctr"/>
+            <a:r>
+              <a:rPr lang="en-US" dirty="0" smtClean="0"/>
+              <a:t>Delay</a:t>
+            </a:r>
+            <a:endParaRPr lang="en-US" dirty="0" smtClean="0"/>
+          </a:p>
+        </p:txBody>
+      </p:sp>
+      <p:cxnSp>
+        <p:nvCxnSpPr>
+          <p:cNvPr id="15" name="Elbow Connector 14"/>
+          <p:cNvCxnSpPr/>
+          <p:nvPr/>
+        </p:nvCxnSpPr>
+        <p:spPr>
+          <a:xfrm>
+            <a:off x="5076130" y="3322332"/>
+            <a:ext cx="1734940" cy="182868"/>
+          </a:xfrm>
+          <a:prstGeom prst="bentConnector2">
+            <a:avLst/>
+          </a:prstGeom>
+          <a:ln>
+            <a:tailEnd type="triangle"/>
+          </a:ln>
+        </p:spPr>
+        <p:style>
+          <a:lnRef idx="2">
+            <a:schemeClr val="dk1"/>
+          </a:lnRef>
+          <a:fillRef idx="0">
+            <a:schemeClr val="dk1"/>
+          </a:fillRef>
+          <a:effectRef idx="1">
+            <a:schemeClr val="dk1"/>
+          </a:effectRef>
+          <a:fontRef idx="minor">
+            <a:schemeClr val="tx1"/>
+          </a:fontRef>
+        </p:style>
+      </p:cxnSp>
+      <p:cxnSp>
+        <p:nvCxnSpPr>
+          <p:cNvPr id="19" name="Elbow Connector 18"/>
+          <p:cNvCxnSpPr>
+            <a:stCxn id="3" idx="3"/>
+            <a:endCxn id="5" idx="0"/>
+          </p:cNvCxnSpPr>
+          <p:nvPr/>
+        </p:nvCxnSpPr>
+        <p:spPr>
+          <a:xfrm>
+            <a:off x="5333999" y="2350224"/>
+            <a:ext cx="1734940" cy="1154976"/>
+          </a:xfrm>
+          <a:prstGeom prst="bentConnector2">
+            <a:avLst/>
+          </a:prstGeom>
+          <a:ln>
+            <a:tailEnd type="triangle"/>
+          </a:ln>
+        </p:spPr>
+        <p:style>
+          <a:lnRef idx="2">
+            <a:schemeClr val="dk1"/>
+          </a:lnRef>
+          <a:fillRef idx="0">
+            <a:schemeClr val="dk1"/>
+          </a:fillRef>
+          <a:effectRef idx="1">
+            <a:schemeClr val="dk1"/>
+          </a:effectRef>
+          <a:fontRef idx="minor">
+            <a:schemeClr val="tx1"/>
+          </a:fontRef>
+        </p:style>
+      </p:cxnSp>
+      <p:sp>
+        <p:nvSpPr>
+          <p:cNvPr id="34" name="Flowchart: Decision 33"/>
+          <p:cNvSpPr/>
+          <p:nvPr/>
+        </p:nvSpPr>
+        <p:spPr>
+          <a:xfrm>
+            <a:off x="1905000" y="3009394"/>
+            <a:ext cx="1363526" cy="625877"/>
+          </a:xfrm>
+          <a:prstGeom prst="flowChartDecision">
+            <a:avLst/>
+          </a:prstGeom>
+        </p:spPr>
+        <p:style>
+          <a:lnRef idx="0">
+            <a:schemeClr val="accent3"/>
+          </a:lnRef>
+          <a:fillRef idx="3">
+            <a:schemeClr val="accent3"/>
+          </a:fillRef>
+          <a:effectRef idx="3">
+            <a:schemeClr val="accent3"/>
+          </a:effectRef>
+          <a:fontRef idx="minor">
+            <a:schemeClr val="lt1"/>
+          </a:fontRef>
+        </p:style>
+        <p:txBody>
+          <a:bodyPr rtlCol="0" anchor="ctr"/>
+          <a:lstStyle/>
+          <a:p>
+            <a:pPr algn="ctr"/>
+            <a:r>
+              <a:rPr lang="en-US" dirty="0" smtClean="0"/>
+              <a:t>Filter</a:t>
+            </a:r>
+            <a:endParaRPr lang="en-US" dirty="0"/>
+          </a:p>
+        </p:txBody>
+      </p:sp>
+      <p:cxnSp>
+        <p:nvCxnSpPr>
+          <p:cNvPr id="72" name="Straight Arrow Connector 71"/>
+          <p:cNvCxnSpPr>
+            <a:stCxn id="5" idx="2"/>
+            <a:endCxn id="7" idx="0"/>
+          </p:cNvCxnSpPr>
+          <p:nvPr/>
+        </p:nvCxnSpPr>
+        <p:spPr>
+          <a:xfrm>
+            <a:off x="7068939" y="4119481"/>
+            <a:ext cx="1" cy="359300"/>
+          </a:xfrm>
+          <a:prstGeom prst="straightConnector1">
+            <a:avLst/>
+          </a:prstGeom>
+          <a:ln>
+            <a:tailEnd type="triangle"/>
+          </a:ln>
+        </p:spPr>
+        <p:style>
+          <a:lnRef idx="2">
+            <a:schemeClr val="dk1"/>
+          </a:lnRef>
+          <a:fillRef idx="0">
+            <a:schemeClr val="dk1"/>
+          </a:fillRef>
+          <a:effectRef idx="1">
+            <a:schemeClr val="dk1"/>
+          </a:effectRef>
+          <a:fontRef idx="minor">
+            <a:schemeClr val="tx1"/>
+          </a:fontRef>
+        </p:style>
+      </p:cxnSp>
+      <p:grpSp>
+        <p:nvGrpSpPr>
+          <p:cNvPr id="4" name="Group 3"/>
+          <p:cNvGrpSpPr/>
+          <p:nvPr/>
+        </p:nvGrpSpPr>
+        <p:grpSpPr>
+          <a:xfrm>
+            <a:off x="3959970" y="2016157"/>
+            <a:ext cx="1374029" cy="2612349"/>
+            <a:chOff x="4038599" y="1731051"/>
+            <a:chExt cx="1374029" cy="2612349"/>
+          </a:xfrm>
+        </p:grpSpPr>
+        <p:sp>
+          <p:nvSpPr>
+            <p:cNvPr id="3" name="Rounded Rectangle 2"/>
+            <p:cNvSpPr/>
+            <p:nvPr/>
+          </p:nvSpPr>
+          <p:spPr>
+            <a:xfrm>
+              <a:off x="4038600" y="1731051"/>
+              <a:ext cx="1374028" cy="668133"/>
+            </a:xfrm>
+            <a:prstGeom prst="roundRect">
+              <a:avLst/>
+            </a:prstGeom>
+          </p:spPr>
+          <p:style>
+            <a:lnRef idx="0">
+              <a:schemeClr val="accent2"/>
+            </a:lnRef>
+            <a:fillRef idx="3">
+              <a:schemeClr val="accent2"/>
+            </a:fillRef>
+            <a:effectRef idx="3">
+              <a:schemeClr val="accent2"/>
+            </a:effectRef>
+            <a:fontRef idx="minor">
+              <a:schemeClr val="lt1"/>
+            </a:fontRef>
+          </p:style>
+          <p:txBody>
+            <a:bodyPr rtlCol="0" anchor="ctr"/>
+            <a:lstStyle/>
+            <a:p>
+              <a:pPr algn="ctr"/>
+              <a:r>
+                <a:rPr lang="en-US" dirty="0" smtClean="0"/>
+                <a:t>High </a:t>
+              </a:r>
+            </a:p>
+            <a:p>
+              <a:pPr algn="ctr"/>
+              <a:r>
+                <a:rPr lang="en-US" dirty="0" smtClean="0"/>
+                <a:t>priority</a:t>
+              </a:r>
+              <a:endParaRPr lang="en-US" dirty="0" smtClean="0"/>
+            </a:p>
+          </p:txBody>
+        </p:sp>
+        <p:sp>
+          <p:nvSpPr>
+            <p:cNvPr id="38" name="Rounded Rectangle 37"/>
+            <p:cNvSpPr/>
+            <p:nvPr/>
+          </p:nvSpPr>
+          <p:spPr>
+            <a:xfrm>
+              <a:off x="4038600" y="2703159"/>
+              <a:ext cx="1374028" cy="668133"/>
+            </a:xfrm>
+            <a:prstGeom prst="roundRect">
+              <a:avLst/>
+            </a:prstGeom>
+            <a:solidFill>
+              <a:srgbClr val="00B050"/>
+            </a:solidFill>
+          </p:spPr>
+          <p:style>
+            <a:lnRef idx="0">
+              <a:schemeClr val="accent2"/>
+            </a:lnRef>
+            <a:fillRef idx="3">
+              <a:schemeClr val="accent2"/>
+            </a:fillRef>
+            <a:effectRef idx="3">
+              <a:schemeClr val="accent2"/>
+            </a:effectRef>
+            <a:fontRef idx="minor">
+              <a:schemeClr val="lt1"/>
+            </a:fontRef>
+          </p:style>
+          <p:txBody>
+            <a:bodyPr rtlCol="0" anchor="ctr"/>
+            <a:lstStyle/>
+            <a:p>
+              <a:pPr algn="ctr"/>
+              <a:r>
+                <a:rPr lang="en-US" dirty="0" smtClean="0"/>
+                <a:t>Medium </a:t>
+              </a:r>
+            </a:p>
+            <a:p>
+              <a:pPr algn="ctr"/>
+              <a:r>
+                <a:rPr lang="en-US" dirty="0" smtClean="0"/>
+                <a:t>priority</a:t>
+              </a:r>
+              <a:endParaRPr lang="en-US" dirty="0" smtClean="0"/>
+            </a:p>
+          </p:txBody>
+        </p:sp>
+        <p:sp>
+          <p:nvSpPr>
+            <p:cNvPr id="39" name="Rounded Rectangle 38"/>
+            <p:cNvSpPr/>
+            <p:nvPr/>
+          </p:nvSpPr>
+          <p:spPr>
+            <a:xfrm>
+              <a:off x="4038599" y="3675267"/>
+              <a:ext cx="1374029" cy="668133"/>
+            </a:xfrm>
+            <a:prstGeom prst="roundRect">
+              <a:avLst/>
+            </a:prstGeom>
+            <a:solidFill>
+              <a:schemeClr val="tx2">
+                <a:lumMod val="60000"/>
+                <a:lumOff val="40000"/>
+              </a:schemeClr>
+            </a:solidFill>
+          </p:spPr>
+          <p:style>
+            <a:lnRef idx="0">
+              <a:schemeClr val="accent2"/>
+            </a:lnRef>
+            <a:fillRef idx="3">
+              <a:schemeClr val="accent2"/>
+            </a:fillRef>
+            <a:effectRef idx="3">
+              <a:schemeClr val="accent2"/>
+            </a:effectRef>
+            <a:fontRef idx="minor">
+              <a:schemeClr val="lt1"/>
+            </a:fontRef>
+          </p:style>
+          <p:txBody>
+            <a:bodyPr rtlCol="0" anchor="ctr"/>
+            <a:lstStyle/>
+            <a:p>
+              <a:pPr algn="ctr"/>
+              <a:r>
+                <a:rPr lang="en-US" dirty="0" smtClean="0"/>
+                <a:t>Non Application</a:t>
+              </a:r>
+              <a:endParaRPr lang="en-US" dirty="0" smtClean="0"/>
+            </a:p>
+          </p:txBody>
+        </p:sp>
+      </p:grpSp>
+      <p:cxnSp>
+        <p:nvCxnSpPr>
+          <p:cNvPr id="41" name="Straight Arrow Connector 40"/>
+          <p:cNvCxnSpPr>
+            <a:stCxn id="6" idx="3"/>
+            <a:endCxn id="34" idx="1"/>
+          </p:cNvCxnSpPr>
+          <p:nvPr/>
+        </p:nvCxnSpPr>
+        <p:spPr>
+          <a:xfrm>
+            <a:off x="1600200" y="3322333"/>
+            <a:ext cx="304800" cy="0"/>
+          </a:xfrm>
+          <a:prstGeom prst="straightConnector1">
+            <a:avLst/>
+          </a:prstGeom>
+          <a:ln>
+            <a:tailEnd type="triangle"/>
+          </a:ln>
+        </p:spPr>
+        <p:style>
+          <a:lnRef idx="2">
+            <a:schemeClr val="dk1"/>
+          </a:lnRef>
+          <a:fillRef idx="0">
+            <a:schemeClr val="dk1"/>
+          </a:fillRef>
+          <a:effectRef idx="1">
+            <a:schemeClr val="dk1"/>
+          </a:effectRef>
+          <a:fontRef idx="minor">
+            <a:schemeClr val="tx1"/>
+          </a:fontRef>
+        </p:style>
+      </p:cxnSp>
+      <p:cxnSp>
+        <p:nvCxnSpPr>
+          <p:cNvPr id="43" name="Elbow Connector 42"/>
+          <p:cNvCxnSpPr>
+            <a:stCxn id="34" idx="3"/>
+            <a:endCxn id="39" idx="1"/>
+          </p:cNvCxnSpPr>
+          <p:nvPr/>
+        </p:nvCxnSpPr>
+        <p:spPr>
+          <a:xfrm>
+            <a:off x="3268526" y="3322333"/>
+            <a:ext cx="691444" cy="972107"/>
+          </a:xfrm>
+          <a:prstGeom prst="bentConnector3">
+            <a:avLst>
+              <a:gd name="adj1" fmla="val 50000"/>
+            </a:avLst>
+          </a:prstGeom>
+          <a:ln>
+            <a:tailEnd type="triangle"/>
+          </a:ln>
+        </p:spPr>
+        <p:style>
+          <a:lnRef idx="2">
+            <a:schemeClr val="dk1"/>
+          </a:lnRef>
+          <a:fillRef idx="0">
+            <a:schemeClr val="dk1"/>
+          </a:fillRef>
+          <a:effectRef idx="1">
+            <a:schemeClr val="dk1"/>
+          </a:effectRef>
+          <a:fontRef idx="minor">
+            <a:schemeClr val="tx1"/>
+          </a:fontRef>
+        </p:style>
+      </p:cxnSp>
+      <p:cxnSp>
+        <p:nvCxnSpPr>
+          <p:cNvPr id="44" name="Elbow Connector 43"/>
+          <p:cNvCxnSpPr>
+            <a:stCxn id="34" idx="3"/>
+            <a:endCxn id="3" idx="1"/>
+          </p:cNvCxnSpPr>
+          <p:nvPr/>
+        </p:nvCxnSpPr>
+        <p:spPr>
+          <a:xfrm flipV="1">
+            <a:off x="3268526" y="2350224"/>
+            <a:ext cx="691445" cy="972109"/>
+          </a:xfrm>
+          <a:prstGeom prst="bentConnector3">
+            <a:avLst>
+              <a:gd name="adj1" fmla="val 50000"/>
+            </a:avLst>
+          </a:prstGeom>
+          <a:ln>
+            <a:tailEnd type="triangle"/>
+          </a:ln>
+        </p:spPr>
+        <p:style>
+          <a:lnRef idx="2">
+            <a:schemeClr val="dk1"/>
+          </a:lnRef>
+          <a:fillRef idx="0">
+            <a:schemeClr val="dk1"/>
+          </a:fillRef>
+          <a:effectRef idx="1">
+            <a:schemeClr val="dk1"/>
+          </a:effectRef>
+          <a:fontRef idx="minor">
+            <a:schemeClr val="tx1"/>
+          </a:fontRef>
+        </p:style>
+      </p:cxnSp>
+      <p:cxnSp>
+        <p:nvCxnSpPr>
+          <p:cNvPr id="50" name="Straight Arrow Connector 49"/>
+          <p:cNvCxnSpPr>
+            <a:stCxn id="34" idx="3"/>
+            <a:endCxn id="38" idx="1"/>
+          </p:cNvCxnSpPr>
+          <p:nvPr/>
+        </p:nvCxnSpPr>
+        <p:spPr>
+          <a:xfrm flipV="1">
+            <a:off x="3268526" y="3322332"/>
+            <a:ext cx="691445" cy="1"/>
+          </a:xfrm>
+          <a:prstGeom prst="straightConnector1">
+            <a:avLst/>
+          </a:prstGeom>
+          <a:ln>
+            <a:tailEnd type="triangle"/>
+          </a:ln>
+        </p:spPr>
+        <p:style>
+          <a:lnRef idx="2">
+            <a:schemeClr val="dk1"/>
+          </a:lnRef>
+          <a:fillRef idx="0">
+            <a:schemeClr val="dk1"/>
+          </a:fillRef>
+          <a:effectRef idx="1">
+            <a:schemeClr val="dk1"/>
+          </a:effectRef>
+          <a:fontRef idx="minor">
+            <a:schemeClr val="tx1"/>
+          </a:fontRef>
+        </p:style>
+      </p:cxnSp>
+      <p:cxnSp>
+        <p:nvCxnSpPr>
+          <p:cNvPr id="67" name="Elbow Connector 66"/>
+          <p:cNvCxnSpPr>
+            <a:stCxn id="39" idx="3"/>
+            <a:endCxn id="2" idx="0"/>
+          </p:cNvCxnSpPr>
+          <p:nvPr/>
+        </p:nvCxnSpPr>
+        <p:spPr>
+          <a:xfrm>
+            <a:off x="5333999" y="4294440"/>
+            <a:ext cx="339264" cy="1653808"/>
+          </a:xfrm>
+          <a:prstGeom prst="bentConnector2">
+            <a:avLst/>
+          </a:prstGeom>
+          <a:ln>
+            <a:tailEnd type="triangle"/>
+          </a:ln>
+        </p:spPr>
+        <p:style>
+          <a:lnRef idx="2">
+            <a:schemeClr val="dk1"/>
+          </a:lnRef>
+          <a:fillRef idx="0">
+            <a:schemeClr val="dk1"/>
+          </a:fillRef>
+          <a:effectRef idx="1">
+            <a:schemeClr val="dk1"/>
+          </a:effectRef>
+          <a:fontRef idx="minor">
+            <a:schemeClr val="tx1"/>
+          </a:fontRef>
+        </p:style>
+      </p:cxnSp>
+      <p:cxnSp>
+        <p:nvCxnSpPr>
+          <p:cNvPr id="68" name="Elbow Connector 67"/>
+          <p:cNvCxnSpPr>
+            <a:stCxn id="7" idx="2"/>
+            <a:endCxn id="2" idx="0"/>
+          </p:cNvCxnSpPr>
+          <p:nvPr/>
+        </p:nvCxnSpPr>
+        <p:spPr>
+          <a:xfrm rot="5400000">
+            <a:off x="5934854" y="4814161"/>
+            <a:ext cx="872497" cy="1395677"/>
+          </a:xfrm>
+          <a:prstGeom prst="bentConnector3">
+            <a:avLst>
+              <a:gd name="adj1" fmla="val 50000"/>
+            </a:avLst>
+          </a:prstGeom>
+          <a:ln>
+            <a:tailEnd type="triangle"/>
+          </a:ln>
+        </p:spPr>
+        <p:style>
+          <a:lnRef idx="2">
+            <a:schemeClr val="dk1"/>
+          </a:lnRef>
+          <a:fillRef idx="0">
+            <a:schemeClr val="dk1"/>
+          </a:fillRef>
+          <a:effectRef idx="1">
+            <a:schemeClr val="dk1"/>
+          </a:effectRef>
+          <a:fontRef idx="minor">
+            <a:schemeClr val="tx1"/>
+          </a:fontRef>
+        </p:style>
+      </p:cxnSp>
+      <p:sp>
+        <p:nvSpPr>
+          <p:cNvPr id="70" name="Rounded Rectangle 69"/>
+          <p:cNvSpPr/>
+          <p:nvPr/>
+        </p:nvSpPr>
+        <p:spPr>
+          <a:xfrm>
+            <a:off x="455575" y="4603106"/>
+            <a:ext cx="2752779" cy="1873894"/>
+          </a:xfrm>
+          <a:prstGeom prst="roundRect">
+            <a:avLst/>
+          </a:prstGeom>
+        </p:spPr>
+        <p:style>
+          <a:lnRef idx="1">
+            <a:schemeClr val="accent1"/>
+          </a:lnRef>
+          <a:fillRef idx="2">
+            <a:schemeClr val="accent1"/>
+          </a:fillRef>
+          <a:effectRef idx="1">
+            <a:schemeClr val="accent1"/>
+          </a:effectRef>
+          <a:fontRef idx="minor">
+            <a:schemeClr val="dk1"/>
+          </a:fontRef>
+        </p:style>
+        <p:txBody>
+          <a:bodyPr rtlCol="0" anchor="ctr"/>
+          <a:lstStyle/>
+          <a:p>
+            <a:r>
+              <a:rPr lang="en-US" sz="1200" b="1" dirty="0" smtClean="0"/>
+              <a:t>Network Traffic</a:t>
+            </a:r>
+            <a:r>
+              <a:rPr lang="en-US" sz="1200" dirty="0" smtClean="0"/>
+              <a:t>:</a:t>
+            </a:r>
+            <a:endParaRPr lang="en-US" sz="1200" dirty="0" smtClean="0"/>
+          </a:p>
+          <a:p>
+            <a:r>
+              <a:rPr lang="en-US" sz="1200" dirty="0" smtClean="0"/>
+              <a:t>Outbound traffic destined for the network interface is first filtered into three queues.  Application traffic is filtered by priority into the high and medium priority queues, where it will be shaped and delayed according to the link profile.  Non application traffic is sent to the lowest priority queue and not shaped.</a:t>
+            </a:r>
+            <a:endParaRPr lang="en-US" sz="1200" dirty="0"/>
+          </a:p>
+        </p:txBody>
+      </p:sp>
+    </p:spTree>
+    <p:extLst>
+      <p:ext uri="{BB962C8B-B14F-4D97-AF65-F5344CB8AC3E}">
+        <p14:creationId xmlns:p14="http://schemas.microsoft.com/office/powerpoint/2010/main" val="4186897059"/>
       </p:ext>
     </p:extLst>
   </p:cSld>

</xml_diff>

<commit_message>
updated ros comp image
removed network arbiter
</commit_message>
<xml_diff>
--- a/thesis/figs/ros_component.pptx
+++ b/thesis/figs/ros_component.pptx
@@ -6,10 +6,11 @@
   </p:sldMasterIdLst>
   <p:sldIdLst>
     <p:sldId id="256" r:id="rId2"/>
-    <p:sldId id="257" r:id="rId3"/>
-    <p:sldId id="258" r:id="rId4"/>
-    <p:sldId id="259" r:id="rId5"/>
-    <p:sldId id="260" r:id="rId6"/>
+    <p:sldId id="261" r:id="rId3"/>
+    <p:sldId id="257" r:id="rId4"/>
+    <p:sldId id="258" r:id="rId5"/>
+    <p:sldId id="259" r:id="rId6"/>
+    <p:sldId id="260" r:id="rId7"/>
   </p:sldIdLst>
   <p:sldSz cx="9144000" cy="6858000" type="screen4x3"/>
   <p:notesSz cx="6858000" cy="9144000"/>
@@ -308,7 +309,7 @@
           <a:p>
             <a:fld id="{07D09854-399E-4080-871F-4892A4C17278}" type="datetimeFigureOut">
               <a:rPr lang="en-US" smtClean="0"/>
-              <a:t>2015-09-24</a:t>
+              <a:t>2015-09-27</a:t>
             </a:fld>
             <a:endParaRPr lang="en-US"/>
           </a:p>
@@ -478,7 +479,7 @@
           <a:p>
             <a:fld id="{07D09854-399E-4080-871F-4892A4C17278}" type="datetimeFigureOut">
               <a:rPr lang="en-US" smtClean="0"/>
-              <a:t>2015-09-24</a:t>
+              <a:t>2015-09-27</a:t>
             </a:fld>
             <a:endParaRPr lang="en-US"/>
           </a:p>
@@ -658,7 +659,7 @@
           <a:p>
             <a:fld id="{07D09854-399E-4080-871F-4892A4C17278}" type="datetimeFigureOut">
               <a:rPr lang="en-US" smtClean="0"/>
-              <a:t>2015-09-24</a:t>
+              <a:t>2015-09-27</a:t>
             </a:fld>
             <a:endParaRPr lang="en-US"/>
           </a:p>
@@ -828,7 +829,7 @@
           <a:p>
             <a:fld id="{07D09854-399E-4080-871F-4892A4C17278}" type="datetimeFigureOut">
               <a:rPr lang="en-US" smtClean="0"/>
-              <a:t>2015-09-24</a:t>
+              <a:t>2015-09-27</a:t>
             </a:fld>
             <a:endParaRPr lang="en-US"/>
           </a:p>
@@ -1074,7 +1075,7 @@
           <a:p>
             <a:fld id="{07D09854-399E-4080-871F-4892A4C17278}" type="datetimeFigureOut">
               <a:rPr lang="en-US" smtClean="0"/>
-              <a:t>2015-09-24</a:t>
+              <a:t>2015-09-27</a:t>
             </a:fld>
             <a:endParaRPr lang="en-US"/>
           </a:p>
@@ -1362,7 +1363,7 @@
           <a:p>
             <a:fld id="{07D09854-399E-4080-871F-4892A4C17278}" type="datetimeFigureOut">
               <a:rPr lang="en-US" smtClean="0"/>
-              <a:t>2015-09-24</a:t>
+              <a:t>2015-09-27</a:t>
             </a:fld>
             <a:endParaRPr lang="en-US"/>
           </a:p>
@@ -1784,7 +1785,7 @@
           <a:p>
             <a:fld id="{07D09854-399E-4080-871F-4892A4C17278}" type="datetimeFigureOut">
               <a:rPr lang="en-US" smtClean="0"/>
-              <a:t>2015-09-24</a:t>
+              <a:t>2015-09-27</a:t>
             </a:fld>
             <a:endParaRPr lang="en-US"/>
           </a:p>
@@ -1902,7 +1903,7 @@
           <a:p>
             <a:fld id="{07D09854-399E-4080-871F-4892A4C17278}" type="datetimeFigureOut">
               <a:rPr lang="en-US" smtClean="0"/>
-              <a:t>2015-09-24</a:t>
+              <a:t>2015-09-27</a:t>
             </a:fld>
             <a:endParaRPr lang="en-US"/>
           </a:p>
@@ -1997,7 +1998,7 @@
           <a:p>
             <a:fld id="{07D09854-399E-4080-871F-4892A4C17278}" type="datetimeFigureOut">
               <a:rPr lang="en-US" smtClean="0"/>
-              <a:t>2015-09-24</a:t>
+              <a:t>2015-09-27</a:t>
             </a:fld>
             <a:endParaRPr lang="en-US"/>
           </a:p>
@@ -2274,7 +2275,7 @@
           <a:p>
             <a:fld id="{07D09854-399E-4080-871F-4892A4C17278}" type="datetimeFigureOut">
               <a:rPr lang="en-US" smtClean="0"/>
-              <a:t>2015-09-24</a:t>
+              <a:t>2015-09-27</a:t>
             </a:fld>
             <a:endParaRPr lang="en-US"/>
           </a:p>
@@ -2527,7 +2528,7 @@
           <a:p>
             <a:fld id="{07D09854-399E-4080-871F-4892A4C17278}" type="datetimeFigureOut">
               <a:rPr lang="en-US" smtClean="0"/>
-              <a:t>2015-09-24</a:t>
+              <a:t>2015-09-27</a:t>
             </a:fld>
             <a:endParaRPr lang="en-US"/>
           </a:p>
@@ -2740,7 +2741,7 @@
           <a:p>
             <a:fld id="{07D09854-399E-4080-871F-4892A4C17278}" type="datetimeFigureOut">
               <a:rPr lang="en-US" smtClean="0"/>
-              <a:t>2015-09-24</a:t>
+              <a:t>2015-09-27</a:t>
             </a:fld>
             <a:endParaRPr lang="en-US"/>
           </a:p>
@@ -4375,6 +4376,1277 @@
 </file>
 
 <file path=ppt/slides/slide2.xml><?xml version="1.0" encoding="utf-8"?>
+<p:sld xmlns:a="http://schemas.openxmlformats.org/drawingml/2006/main" xmlns:r="http://schemas.openxmlformats.org/officeDocument/2006/relationships" xmlns:p="http://schemas.openxmlformats.org/presentationml/2006/main">
+  <p:cSld>
+    <p:spTree>
+      <p:nvGrpSpPr>
+        <p:cNvPr id="1" name=""/>
+        <p:cNvGrpSpPr/>
+        <p:nvPr/>
+      </p:nvGrpSpPr>
+      <p:grpSpPr>
+        <a:xfrm>
+          <a:off x="0" y="0"/>
+          <a:ext cx="0" cy="0"/>
+          <a:chOff x="0" y="0"/>
+          <a:chExt cx="0" cy="0"/>
+        </a:xfrm>
+      </p:grpSpPr>
+      <p:sp>
+        <p:nvSpPr>
+          <p:cNvPr id="15" name="Rounded Rectangle 14"/>
+          <p:cNvSpPr/>
+          <p:nvPr/>
+        </p:nvSpPr>
+        <p:spPr>
+          <a:xfrm>
+            <a:off x="2494871" y="881352"/>
+            <a:ext cx="4191000" cy="5181599"/>
+          </a:xfrm>
+          <a:prstGeom prst="roundRect">
+            <a:avLst/>
+          </a:prstGeom>
+        </p:spPr>
+        <p:style>
+          <a:lnRef idx="0">
+            <a:schemeClr val="accent2"/>
+          </a:lnRef>
+          <a:fillRef idx="3">
+            <a:schemeClr val="accent2"/>
+          </a:fillRef>
+          <a:effectRef idx="3">
+            <a:schemeClr val="accent2"/>
+          </a:effectRef>
+          <a:fontRef idx="minor">
+            <a:schemeClr val="lt1"/>
+          </a:fontRef>
+        </p:style>
+        <p:txBody>
+          <a:bodyPr rtlCol="0" anchor="ctr"/>
+          <a:lstStyle/>
+          <a:p>
+            <a:pPr algn="ctr"/>
+            <a:endParaRPr lang="en-US" dirty="0" smtClean="0"/>
+          </a:p>
+          <a:p>
+            <a:pPr algn="ctr"/>
+            <a:endParaRPr lang="en-US" dirty="0"/>
+          </a:p>
+          <a:p>
+            <a:pPr algn="ctr"/>
+            <a:endParaRPr lang="en-US" dirty="0" smtClean="0"/>
+          </a:p>
+          <a:p>
+            <a:pPr algn="ctr"/>
+            <a:endParaRPr lang="en-US" dirty="0"/>
+          </a:p>
+          <a:p>
+            <a:pPr algn="ctr"/>
+            <a:endParaRPr lang="en-US" dirty="0" smtClean="0"/>
+          </a:p>
+          <a:p>
+            <a:pPr algn="ctr"/>
+            <a:endParaRPr lang="en-US" dirty="0"/>
+          </a:p>
+          <a:p>
+            <a:pPr algn="ctr"/>
+            <a:endParaRPr lang="en-US" dirty="0" smtClean="0"/>
+          </a:p>
+          <a:p>
+            <a:pPr algn="ctr"/>
+            <a:endParaRPr lang="en-US" dirty="0"/>
+          </a:p>
+          <a:p>
+            <a:pPr algn="ctr"/>
+            <a:endParaRPr lang="en-US" dirty="0" smtClean="0"/>
+          </a:p>
+          <a:p>
+            <a:pPr algn="ctr"/>
+            <a:endParaRPr lang="en-US" dirty="0"/>
+          </a:p>
+          <a:p>
+            <a:pPr algn="ctr"/>
+            <a:endParaRPr lang="en-US" dirty="0" smtClean="0"/>
+          </a:p>
+          <a:p>
+            <a:pPr algn="ctr"/>
+            <a:endParaRPr lang="en-US" dirty="0"/>
+          </a:p>
+          <a:p>
+            <a:pPr algn="ctr"/>
+            <a:endParaRPr lang="en-US" dirty="0" smtClean="0"/>
+          </a:p>
+          <a:p>
+            <a:pPr algn="ctr"/>
+            <a:endParaRPr lang="en-US" dirty="0"/>
+          </a:p>
+          <a:p>
+            <a:pPr algn="ctr"/>
+            <a:endParaRPr lang="en-US" dirty="0" smtClean="0"/>
+          </a:p>
+          <a:p>
+            <a:pPr algn="ctr"/>
+            <a:endParaRPr lang="en-US" dirty="0"/>
+          </a:p>
+          <a:p>
+            <a:pPr algn="ctr"/>
+            <a:endParaRPr lang="en-US" dirty="0" smtClean="0"/>
+          </a:p>
+          <a:p>
+            <a:pPr algn="ctr"/>
+            <a:r>
+              <a:rPr lang="en-US" dirty="0" smtClean="0"/>
+              <a:t>Middleware Framework</a:t>
+            </a:r>
+            <a:endParaRPr lang="en-US" dirty="0"/>
+          </a:p>
+        </p:txBody>
+      </p:sp>
+      <p:sp>
+        <p:nvSpPr>
+          <p:cNvPr id="4" name="Rounded Rectangle 3"/>
+          <p:cNvSpPr/>
+          <p:nvPr/>
+        </p:nvSpPr>
+        <p:spPr>
+          <a:xfrm>
+            <a:off x="2769143" y="985853"/>
+            <a:ext cx="3657600" cy="4543697"/>
+          </a:xfrm>
+          <a:prstGeom prst="roundRect">
+            <a:avLst/>
+          </a:prstGeom>
+        </p:spPr>
+        <p:style>
+          <a:lnRef idx="1">
+            <a:schemeClr val="accent5"/>
+          </a:lnRef>
+          <a:fillRef idx="3">
+            <a:schemeClr val="accent5"/>
+          </a:fillRef>
+          <a:effectRef idx="2">
+            <a:schemeClr val="accent5"/>
+          </a:effectRef>
+          <a:fontRef idx="minor">
+            <a:schemeClr val="lt1"/>
+          </a:fontRef>
+        </p:style>
+        <p:txBody>
+          <a:bodyPr rtlCol="0" anchor="ctr"/>
+          <a:lstStyle/>
+          <a:p>
+            <a:pPr algn="ctr"/>
+            <a:endParaRPr lang="en-US" dirty="0" smtClean="0"/>
+          </a:p>
+          <a:p>
+            <a:pPr algn="ctr"/>
+            <a:endParaRPr lang="en-US" dirty="0"/>
+          </a:p>
+          <a:p>
+            <a:pPr algn="ctr"/>
+            <a:endParaRPr lang="en-US" dirty="0" smtClean="0"/>
+          </a:p>
+          <a:p>
+            <a:pPr algn="ctr"/>
+            <a:endParaRPr lang="en-US" dirty="0"/>
+          </a:p>
+          <a:p>
+            <a:pPr algn="ctr"/>
+            <a:endParaRPr lang="en-US" dirty="0" smtClean="0"/>
+          </a:p>
+          <a:p>
+            <a:pPr algn="ctr"/>
+            <a:endParaRPr lang="en-US" dirty="0"/>
+          </a:p>
+          <a:p>
+            <a:pPr algn="ctr"/>
+            <a:endParaRPr lang="en-US" dirty="0" smtClean="0"/>
+          </a:p>
+          <a:p>
+            <a:pPr algn="ctr"/>
+            <a:endParaRPr lang="en-US" dirty="0"/>
+          </a:p>
+          <a:p>
+            <a:pPr algn="ctr"/>
+            <a:endParaRPr lang="en-US" dirty="0" smtClean="0"/>
+          </a:p>
+          <a:p>
+            <a:pPr algn="ctr"/>
+            <a:endParaRPr lang="en-US" dirty="0"/>
+          </a:p>
+          <a:p>
+            <a:pPr algn="ctr"/>
+            <a:endParaRPr lang="en-US" dirty="0" smtClean="0"/>
+          </a:p>
+          <a:p>
+            <a:pPr algn="ctr"/>
+            <a:endParaRPr lang="en-US" dirty="0"/>
+          </a:p>
+          <a:p>
+            <a:pPr algn="ctr"/>
+            <a:endParaRPr lang="en-US" dirty="0" smtClean="0"/>
+          </a:p>
+          <a:p>
+            <a:pPr algn="ctr"/>
+            <a:endParaRPr lang="en-US" dirty="0"/>
+          </a:p>
+          <a:p>
+            <a:pPr algn="ctr"/>
+            <a:endParaRPr lang="en-US" dirty="0" smtClean="0"/>
+          </a:p>
+          <a:p>
+            <a:pPr algn="ctr"/>
+            <a:r>
+              <a:rPr lang="en-US" dirty="0" smtClean="0"/>
+              <a:t>Component</a:t>
+            </a:r>
+            <a:endParaRPr lang="en-US" dirty="0"/>
+          </a:p>
+        </p:txBody>
+      </p:sp>
+      <p:sp>
+        <p:nvSpPr>
+          <p:cNvPr id="5" name="Rounded Rectangle 4"/>
+          <p:cNvSpPr/>
+          <p:nvPr/>
+        </p:nvSpPr>
+        <p:spPr>
+          <a:xfrm>
+            <a:off x="2959643" y="1214454"/>
+            <a:ext cx="3276600" cy="1066800"/>
+          </a:xfrm>
+          <a:prstGeom prst="roundRect">
+            <a:avLst/>
+          </a:prstGeom>
+        </p:spPr>
+        <p:style>
+          <a:lnRef idx="1">
+            <a:schemeClr val="accent5"/>
+          </a:lnRef>
+          <a:fillRef idx="2">
+            <a:schemeClr val="accent5"/>
+          </a:fillRef>
+          <a:effectRef idx="1">
+            <a:schemeClr val="accent5"/>
+          </a:effectRef>
+          <a:fontRef idx="minor">
+            <a:schemeClr val="dk1"/>
+          </a:fontRef>
+        </p:style>
+        <p:txBody>
+          <a:bodyPr rtlCol="0" anchor="ctr"/>
+          <a:lstStyle/>
+          <a:p>
+            <a:pPr algn="ctr"/>
+            <a:r>
+              <a:rPr lang="en-US" smtClean="0"/>
+              <a:t>Component Operation</a:t>
+            </a:r>
+          </a:p>
+          <a:p>
+            <a:pPr algn="ctr"/>
+            <a:r>
+              <a:rPr lang="en-US" smtClean="0"/>
+              <a:t> </a:t>
+            </a:r>
+            <a:r>
+              <a:rPr lang="en-US" dirty="0" smtClean="0"/>
+              <a:t>Executor Code</a:t>
+            </a:r>
+          </a:p>
+          <a:p>
+            <a:pPr algn="ctr"/>
+            <a:r>
+              <a:rPr lang="en-US" dirty="0" smtClean="0"/>
+              <a:t>[Business Logic]</a:t>
+            </a:r>
+            <a:endParaRPr lang="en-US" dirty="0"/>
+          </a:p>
+        </p:txBody>
+      </p:sp>
+      <p:sp>
+        <p:nvSpPr>
+          <p:cNvPr id="6" name="Rounded Rectangle 5"/>
+          <p:cNvSpPr/>
+          <p:nvPr/>
+        </p:nvSpPr>
+        <p:spPr>
+          <a:xfrm>
+            <a:off x="4506734" y="3700751"/>
+            <a:ext cx="1673707" cy="1447800"/>
+          </a:xfrm>
+          <a:prstGeom prst="roundRect">
+            <a:avLst/>
+          </a:prstGeom>
+        </p:spPr>
+        <p:style>
+          <a:lnRef idx="1">
+            <a:schemeClr val="accent1"/>
+          </a:lnRef>
+          <a:fillRef idx="2">
+            <a:schemeClr val="accent1"/>
+          </a:fillRef>
+          <a:effectRef idx="1">
+            <a:schemeClr val="accent1"/>
+          </a:effectRef>
+          <a:fontRef idx="minor">
+            <a:schemeClr val="dk1"/>
+          </a:fontRef>
+        </p:style>
+        <p:txBody>
+          <a:bodyPr rtlCol="0" anchor="ctr"/>
+          <a:lstStyle/>
+          <a:p>
+            <a:pPr algn="ctr"/>
+            <a:r>
+              <a:rPr lang="en-US" dirty="0" smtClean="0"/>
+              <a:t>Timers </a:t>
+            </a:r>
+          </a:p>
+          <a:p>
+            <a:pPr algn="ctr"/>
+            <a:r>
+              <a:rPr lang="en-US" dirty="0" smtClean="0"/>
+              <a:t>&amp;</a:t>
+            </a:r>
+          </a:p>
+          <a:p>
+            <a:pPr algn="ctr"/>
+            <a:r>
+              <a:rPr lang="en-US" dirty="0" smtClean="0"/>
+              <a:t>State Variables</a:t>
+            </a:r>
+            <a:endParaRPr lang="en-US" dirty="0"/>
+          </a:p>
+        </p:txBody>
+      </p:sp>
+      <p:sp>
+        <p:nvSpPr>
+          <p:cNvPr id="8" name="Rounded Rectangle 7"/>
+          <p:cNvSpPr/>
+          <p:nvPr/>
+        </p:nvSpPr>
+        <p:spPr>
+          <a:xfrm>
+            <a:off x="3019820" y="2425890"/>
+            <a:ext cx="3127083" cy="1066800"/>
+          </a:xfrm>
+          <a:prstGeom prst="roundRect">
+            <a:avLst/>
+          </a:prstGeom>
+        </p:spPr>
+        <p:style>
+          <a:lnRef idx="1">
+            <a:schemeClr val="accent1"/>
+          </a:lnRef>
+          <a:fillRef idx="2">
+            <a:schemeClr val="accent1"/>
+          </a:fillRef>
+          <a:effectRef idx="1">
+            <a:schemeClr val="accent1"/>
+          </a:effectRef>
+          <a:fontRef idx="minor">
+            <a:schemeClr val="dk1"/>
+          </a:fontRef>
+        </p:style>
+        <p:txBody>
+          <a:bodyPr rtlCol="0" anchor="ctr"/>
+          <a:lstStyle/>
+          <a:p>
+            <a:pPr algn="ctr"/>
+            <a:r>
+              <a:rPr lang="en-US" dirty="0" smtClean="0"/>
+              <a:t>Component Operation </a:t>
+            </a:r>
+            <a:r>
+              <a:rPr lang="en-US" dirty="0" smtClean="0"/>
+              <a:t>Scheduling Queue</a:t>
+            </a:r>
+          </a:p>
+          <a:p>
+            <a:pPr algn="ctr"/>
+            <a:endParaRPr lang="en-US" dirty="0" smtClean="0"/>
+          </a:p>
+          <a:p>
+            <a:pPr algn="ctr"/>
+            <a:endParaRPr lang="en-US" dirty="0"/>
+          </a:p>
+        </p:txBody>
+      </p:sp>
+      <p:sp>
+        <p:nvSpPr>
+          <p:cNvPr id="18" name="Chevron 17"/>
+          <p:cNvSpPr/>
+          <p:nvPr/>
+        </p:nvSpPr>
+        <p:spPr>
+          <a:xfrm>
+            <a:off x="7156086" y="1948151"/>
+            <a:ext cx="762000" cy="485503"/>
+          </a:xfrm>
+          <a:prstGeom prst="chevron">
+            <a:avLst/>
+          </a:prstGeom>
+        </p:spPr>
+        <p:style>
+          <a:lnRef idx="2">
+            <a:schemeClr val="dk1">
+              <a:shade val="50000"/>
+            </a:schemeClr>
+          </a:lnRef>
+          <a:fillRef idx="1">
+            <a:schemeClr val="dk1"/>
+          </a:fillRef>
+          <a:effectRef idx="0">
+            <a:schemeClr val="dk1"/>
+          </a:effectRef>
+          <a:fontRef idx="minor">
+            <a:schemeClr val="lt1"/>
+          </a:fontRef>
+        </p:style>
+        <p:txBody>
+          <a:bodyPr rtlCol="0" anchor="ctr"/>
+          <a:lstStyle/>
+          <a:p>
+            <a:pPr algn="ctr"/>
+            <a:endParaRPr lang="en-US">
+              <a:solidFill>
+                <a:schemeClr val="tx1"/>
+              </a:solidFill>
+            </a:endParaRPr>
+          </a:p>
+        </p:txBody>
+      </p:sp>
+      <p:sp>
+        <p:nvSpPr>
+          <p:cNvPr id="19" name="Pentagon 18"/>
+          <p:cNvSpPr/>
+          <p:nvPr/>
+        </p:nvSpPr>
+        <p:spPr>
+          <a:xfrm>
+            <a:off x="1074237" y="1948150"/>
+            <a:ext cx="838200" cy="485504"/>
+          </a:xfrm>
+          <a:prstGeom prst="homePlate">
+            <a:avLst/>
+          </a:prstGeom>
+        </p:spPr>
+        <p:style>
+          <a:lnRef idx="2">
+            <a:schemeClr val="dk1">
+              <a:shade val="50000"/>
+            </a:schemeClr>
+          </a:lnRef>
+          <a:fillRef idx="1">
+            <a:schemeClr val="dk1"/>
+          </a:fillRef>
+          <a:effectRef idx="0">
+            <a:schemeClr val="dk1"/>
+          </a:effectRef>
+          <a:fontRef idx="minor">
+            <a:schemeClr val="lt1"/>
+          </a:fontRef>
+        </p:style>
+        <p:txBody>
+          <a:bodyPr rtlCol="0" anchor="ctr"/>
+          <a:lstStyle/>
+          <a:p>
+            <a:pPr algn="ctr"/>
+            <a:endParaRPr lang="en-US"/>
+          </a:p>
+        </p:txBody>
+      </p:sp>
+      <p:sp>
+        <p:nvSpPr>
+          <p:cNvPr id="20" name="Flowchart: Connector 19"/>
+          <p:cNvSpPr/>
+          <p:nvPr/>
+        </p:nvSpPr>
+        <p:spPr>
+          <a:xfrm>
+            <a:off x="1272359" y="4491054"/>
+            <a:ext cx="419100" cy="457200"/>
+          </a:xfrm>
+          <a:prstGeom prst="flowChartConnector">
+            <a:avLst/>
+          </a:prstGeom>
+        </p:spPr>
+        <p:style>
+          <a:lnRef idx="2">
+            <a:schemeClr val="dk1">
+              <a:shade val="50000"/>
+            </a:schemeClr>
+          </a:lnRef>
+          <a:fillRef idx="1">
+            <a:schemeClr val="dk1"/>
+          </a:fillRef>
+          <a:effectRef idx="0">
+            <a:schemeClr val="dk1"/>
+          </a:effectRef>
+          <a:fontRef idx="minor">
+            <a:schemeClr val="lt1"/>
+          </a:fontRef>
+        </p:style>
+        <p:txBody>
+          <a:bodyPr rtlCol="0" anchor="ctr"/>
+          <a:lstStyle/>
+          <a:p>
+            <a:pPr algn="ctr"/>
+            <a:endParaRPr lang="en-US"/>
+          </a:p>
+        </p:txBody>
+      </p:sp>
+      <p:pic>
+        <p:nvPicPr>
+          <p:cNvPr id="1026" name="Picture 2"/>
+          <p:cNvPicPr>
+            <a:picLocks noChangeAspect="1" noChangeArrowheads="1"/>
+          </p:cNvPicPr>
+          <p:nvPr/>
+        </p:nvPicPr>
+        <p:blipFill>
+          <a:blip r:embed="rId2">
+            <a:extLst>
+              <a:ext uri="{BEBA8EAE-BF5A-486C-A8C5-ECC9F3942E4B}">
+                <a14:imgProps xmlns:a14="http://schemas.microsoft.com/office/drawing/2010/main">
+                  <a14:imgLayer r:embed="rId3">
+                    <a14:imgEffect>
+                      <a14:artisticPhotocopy/>
+                    </a14:imgEffect>
+                  </a14:imgLayer>
+                </a14:imgProps>
+              </a:ext>
+              <a:ext uri="{28A0092B-C50C-407E-A947-70E740481C1C}">
+                <a14:useLocalDpi xmlns:a14="http://schemas.microsoft.com/office/drawing/2010/main" val="0"/>
+              </a:ext>
+            </a:extLst>
+          </a:blip>
+          <a:srcRect/>
+          <a:stretch>
+            <a:fillRect/>
+          </a:stretch>
+        </p:blipFill>
+        <p:spPr bwMode="auto">
+          <a:xfrm>
+            <a:off x="6698886" y="4216734"/>
+            <a:ext cx="1352550" cy="762000"/>
+          </a:xfrm>
+          <a:prstGeom prst="rect">
+            <a:avLst/>
+          </a:prstGeom>
+          <a:noFill/>
+          <a:ln>
+            <a:noFill/>
+          </a:ln>
+          <a:effectLst/>
+          <a:extLst>
+            <a:ext uri="{909E8E84-426E-40DD-AFC4-6F175D3DCCD1}">
+              <a14:hiddenFill xmlns:a14="http://schemas.microsoft.com/office/drawing/2010/main">
+                <a:solidFill>
+                  <a:schemeClr val="accent1"/>
+                </a:solidFill>
+              </a14:hiddenFill>
+            </a:ext>
+            <a:ext uri="{91240B29-F687-4F45-9708-019B960494DF}">
+              <a14:hiddenLine xmlns:a14="http://schemas.microsoft.com/office/drawing/2010/main" w="9525">
+                <a:solidFill>
+                  <a:schemeClr val="tx1"/>
+                </a:solidFill>
+                <a:miter lim="800000"/>
+                <a:headEnd/>
+                <a:tailEnd/>
+              </a14:hiddenLine>
+            </a:ext>
+            <a:ext uri="{AF507438-7753-43E0-B8FC-AC1667EBCBE1}">
+              <a14:hiddenEffects xmlns:a14="http://schemas.microsoft.com/office/drawing/2010/main">
+                <a:effectLst>
+                  <a:outerShdw dist="35921" dir="2700000" algn="ctr" rotWithShape="0">
+                    <a:schemeClr val="bg2"/>
+                  </a:outerShdw>
+                </a:effectLst>
+              </a14:hiddenEffects>
+            </a:ext>
+          </a:extLst>
+        </p:spPr>
+      </p:pic>
+      <p:cxnSp>
+        <p:nvCxnSpPr>
+          <p:cNvPr id="22" name="Straight Connector 21"/>
+          <p:cNvCxnSpPr>
+            <a:stCxn id="19" idx="3"/>
+          </p:cNvCxnSpPr>
+          <p:nvPr/>
+        </p:nvCxnSpPr>
+        <p:spPr>
+          <a:xfrm>
+            <a:off x="1912437" y="2190902"/>
+            <a:ext cx="856706" cy="0"/>
+          </a:xfrm>
+          <a:prstGeom prst="line">
+            <a:avLst/>
+          </a:prstGeom>
+        </p:spPr>
+        <p:style>
+          <a:lnRef idx="2">
+            <a:schemeClr val="dk1"/>
+          </a:lnRef>
+          <a:fillRef idx="0">
+            <a:schemeClr val="dk1"/>
+          </a:fillRef>
+          <a:effectRef idx="1">
+            <a:schemeClr val="dk1"/>
+          </a:effectRef>
+          <a:fontRef idx="minor">
+            <a:schemeClr val="tx1"/>
+          </a:fontRef>
+        </p:style>
+      </p:cxnSp>
+      <p:cxnSp>
+        <p:nvCxnSpPr>
+          <p:cNvPr id="26" name="Straight Connector 25"/>
+          <p:cNvCxnSpPr>
+            <a:stCxn id="20" idx="6"/>
+          </p:cNvCxnSpPr>
+          <p:nvPr/>
+        </p:nvCxnSpPr>
+        <p:spPr>
+          <a:xfrm>
+            <a:off x="1691459" y="4719654"/>
+            <a:ext cx="1077684" cy="0"/>
+          </a:xfrm>
+          <a:prstGeom prst="line">
+            <a:avLst/>
+          </a:prstGeom>
+        </p:spPr>
+        <p:style>
+          <a:lnRef idx="2">
+            <a:schemeClr val="dk1"/>
+          </a:lnRef>
+          <a:fillRef idx="0">
+            <a:schemeClr val="dk1"/>
+          </a:fillRef>
+          <a:effectRef idx="1">
+            <a:schemeClr val="dk1"/>
+          </a:effectRef>
+          <a:fontRef idx="minor">
+            <a:schemeClr val="tx1"/>
+          </a:fontRef>
+        </p:style>
+      </p:cxnSp>
+      <p:cxnSp>
+        <p:nvCxnSpPr>
+          <p:cNvPr id="29" name="Straight Connector 28"/>
+          <p:cNvCxnSpPr/>
+          <p:nvPr/>
+        </p:nvCxnSpPr>
+        <p:spPr>
+          <a:xfrm flipH="1">
+            <a:off x="6426744" y="4606443"/>
+            <a:ext cx="1186542" cy="0"/>
+          </a:xfrm>
+          <a:prstGeom prst="line">
+            <a:avLst/>
+          </a:prstGeom>
+          <a:ln w="44450"/>
+        </p:spPr>
+        <p:style>
+          <a:lnRef idx="3">
+            <a:schemeClr val="dk1"/>
+          </a:lnRef>
+          <a:fillRef idx="0">
+            <a:schemeClr val="dk1"/>
+          </a:fillRef>
+          <a:effectRef idx="2">
+            <a:schemeClr val="dk1"/>
+          </a:effectRef>
+          <a:fontRef idx="minor">
+            <a:schemeClr val="tx1"/>
+          </a:fontRef>
+        </p:style>
+      </p:cxnSp>
+      <p:cxnSp>
+        <p:nvCxnSpPr>
+          <p:cNvPr id="1027" name="Straight Connector 1026"/>
+          <p:cNvCxnSpPr>
+            <a:stCxn id="18" idx="1"/>
+          </p:cNvCxnSpPr>
+          <p:nvPr/>
+        </p:nvCxnSpPr>
+        <p:spPr>
+          <a:xfrm flipH="1" flipV="1">
+            <a:off x="6426743" y="2190902"/>
+            <a:ext cx="972095" cy="1"/>
+          </a:xfrm>
+          <a:prstGeom prst="line">
+            <a:avLst/>
+          </a:prstGeom>
+        </p:spPr>
+        <p:style>
+          <a:lnRef idx="2">
+            <a:schemeClr val="dk1"/>
+          </a:lnRef>
+          <a:fillRef idx="0">
+            <a:schemeClr val="dk1"/>
+          </a:fillRef>
+          <a:effectRef idx="1">
+            <a:schemeClr val="dk1"/>
+          </a:effectRef>
+          <a:fontRef idx="minor">
+            <a:schemeClr val="tx1"/>
+          </a:fontRef>
+        </p:style>
+      </p:cxnSp>
+      <p:sp>
+        <p:nvSpPr>
+          <p:cNvPr id="1029" name="TextBox 1028"/>
+          <p:cNvSpPr txBox="1"/>
+          <p:nvPr/>
+        </p:nvSpPr>
+        <p:spPr>
+          <a:xfrm>
+            <a:off x="6775086" y="1338551"/>
+            <a:ext cx="1676400" cy="369332"/>
+          </a:xfrm>
+          <a:prstGeom prst="rect">
+            <a:avLst/>
+          </a:prstGeom>
+          <a:noFill/>
+        </p:spPr>
+        <p:txBody>
+          <a:bodyPr wrap="square" rtlCol="0">
+            <a:spAutoFit/>
+          </a:bodyPr>
+          <a:lstStyle/>
+          <a:p>
+            <a:pPr algn="ctr"/>
+            <a:r>
+              <a:rPr lang="en-US" dirty="0" smtClean="0"/>
+              <a:t>Data Publisher</a:t>
+            </a:r>
+            <a:endParaRPr lang="en-US" dirty="0"/>
+          </a:p>
+        </p:txBody>
+      </p:sp>
+      <p:sp>
+        <p:nvSpPr>
+          <p:cNvPr id="38" name="TextBox 37"/>
+          <p:cNvSpPr txBox="1"/>
+          <p:nvPr/>
+        </p:nvSpPr>
+        <p:spPr>
+          <a:xfrm>
+            <a:off x="664390" y="1338551"/>
+            <a:ext cx="1676400" cy="369332"/>
+          </a:xfrm>
+          <a:prstGeom prst="rect">
+            <a:avLst/>
+          </a:prstGeom>
+          <a:noFill/>
+        </p:spPr>
+        <p:txBody>
+          <a:bodyPr wrap="square" rtlCol="0">
+            <a:spAutoFit/>
+          </a:bodyPr>
+          <a:lstStyle/>
+          <a:p>
+            <a:pPr algn="ctr"/>
+            <a:r>
+              <a:rPr lang="en-US" dirty="0" smtClean="0"/>
+              <a:t>Data Subscriber</a:t>
+            </a:r>
+            <a:endParaRPr lang="en-US" dirty="0"/>
+          </a:p>
+        </p:txBody>
+      </p:sp>
+      <p:sp>
+        <p:nvSpPr>
+          <p:cNvPr id="39" name="TextBox 38"/>
+          <p:cNvSpPr txBox="1"/>
+          <p:nvPr/>
+        </p:nvSpPr>
+        <p:spPr>
+          <a:xfrm>
+            <a:off x="655137" y="3907971"/>
+            <a:ext cx="1676400" cy="369332"/>
+          </a:xfrm>
+          <a:prstGeom prst="rect">
+            <a:avLst/>
+          </a:prstGeom>
+          <a:noFill/>
+        </p:spPr>
+        <p:txBody>
+          <a:bodyPr wrap="square" rtlCol="0">
+            <a:spAutoFit/>
+          </a:bodyPr>
+          <a:lstStyle/>
+          <a:p>
+            <a:pPr algn="ctr"/>
+            <a:r>
+              <a:rPr lang="en-US" smtClean="0"/>
+              <a:t>Server</a:t>
+            </a:r>
+          </a:p>
+        </p:txBody>
+      </p:sp>
+      <p:sp>
+        <p:nvSpPr>
+          <p:cNvPr id="40" name="TextBox 39"/>
+          <p:cNvSpPr txBox="1"/>
+          <p:nvPr/>
+        </p:nvSpPr>
+        <p:spPr>
+          <a:xfrm>
+            <a:off x="6840400" y="3846007"/>
+            <a:ext cx="1676400" cy="369332"/>
+          </a:xfrm>
+          <a:prstGeom prst="rect">
+            <a:avLst/>
+          </a:prstGeom>
+          <a:noFill/>
+        </p:spPr>
+        <p:txBody>
+          <a:bodyPr wrap="square" rtlCol="0">
+            <a:spAutoFit/>
+          </a:bodyPr>
+          <a:lstStyle/>
+          <a:p>
+            <a:pPr algn="ctr"/>
+            <a:r>
+              <a:rPr lang="en-US" smtClean="0"/>
+              <a:t>Client</a:t>
+            </a:r>
+          </a:p>
+        </p:txBody>
+      </p:sp>
+      <p:sp>
+        <p:nvSpPr>
+          <p:cNvPr id="27" name="Right Arrow 26"/>
+          <p:cNvSpPr/>
+          <p:nvPr/>
+        </p:nvSpPr>
+        <p:spPr>
+          <a:xfrm>
+            <a:off x="3340573" y="3013894"/>
+            <a:ext cx="358279" cy="239818"/>
+          </a:xfrm>
+          <a:prstGeom prst="rightArrow">
+            <a:avLst/>
+          </a:prstGeom>
+        </p:spPr>
+        <p:style>
+          <a:lnRef idx="2">
+            <a:schemeClr val="dk1">
+              <a:shade val="50000"/>
+            </a:schemeClr>
+          </a:lnRef>
+          <a:fillRef idx="1">
+            <a:schemeClr val="dk1"/>
+          </a:fillRef>
+          <a:effectRef idx="0">
+            <a:schemeClr val="dk1"/>
+          </a:effectRef>
+          <a:fontRef idx="minor">
+            <a:schemeClr val="lt1"/>
+          </a:fontRef>
+        </p:style>
+        <p:txBody>
+          <a:bodyPr rtlCol="0" anchor="ctr"/>
+          <a:lstStyle/>
+          <a:p>
+            <a:pPr algn="ctr"/>
+            <a:endParaRPr lang="en-US"/>
+          </a:p>
+        </p:txBody>
+      </p:sp>
+      <p:grpSp>
+        <p:nvGrpSpPr>
+          <p:cNvPr id="9" name="Group 8"/>
+          <p:cNvGrpSpPr/>
+          <p:nvPr/>
+        </p:nvGrpSpPr>
+        <p:grpSpPr>
+          <a:xfrm>
+            <a:off x="3692810" y="2951814"/>
+            <a:ext cx="1778820" cy="363978"/>
+            <a:chOff x="3683543" y="2951814"/>
+            <a:chExt cx="1778820" cy="363978"/>
+          </a:xfrm>
+        </p:grpSpPr>
+        <p:cxnSp>
+          <p:nvCxnSpPr>
+            <p:cNvPr id="3" name="Straight Connector 2"/>
+            <p:cNvCxnSpPr/>
+            <p:nvPr/>
+          </p:nvCxnSpPr>
+          <p:spPr>
+            <a:xfrm flipH="1">
+              <a:off x="3683543" y="2951814"/>
+              <a:ext cx="1778820" cy="0"/>
+            </a:xfrm>
+            <a:prstGeom prst="line">
+              <a:avLst/>
+            </a:prstGeom>
+          </p:spPr>
+          <p:style>
+            <a:lnRef idx="2">
+              <a:schemeClr val="accent1"/>
+            </a:lnRef>
+            <a:fillRef idx="0">
+              <a:schemeClr val="accent1"/>
+            </a:fillRef>
+            <a:effectRef idx="1">
+              <a:schemeClr val="accent1"/>
+            </a:effectRef>
+            <a:fontRef idx="minor">
+              <a:schemeClr val="tx1"/>
+            </a:fontRef>
+          </p:style>
+        </p:cxnSp>
+        <p:cxnSp>
+          <p:nvCxnSpPr>
+            <p:cNvPr id="33" name="Straight Connector 32"/>
+            <p:cNvCxnSpPr/>
+            <p:nvPr/>
+          </p:nvCxnSpPr>
+          <p:spPr>
+            <a:xfrm flipH="1">
+              <a:off x="3683543" y="3315792"/>
+              <a:ext cx="1778820" cy="0"/>
+            </a:xfrm>
+            <a:prstGeom prst="line">
+              <a:avLst/>
+            </a:prstGeom>
+          </p:spPr>
+          <p:style>
+            <a:lnRef idx="2">
+              <a:schemeClr val="accent1"/>
+            </a:lnRef>
+            <a:fillRef idx="0">
+              <a:schemeClr val="accent1"/>
+            </a:fillRef>
+            <a:effectRef idx="1">
+              <a:schemeClr val="accent1"/>
+            </a:effectRef>
+            <a:fontRef idx="minor">
+              <a:schemeClr val="tx1"/>
+            </a:fontRef>
+          </p:style>
+        </p:cxnSp>
+        <p:grpSp>
+          <p:nvGrpSpPr>
+            <p:cNvPr id="2" name="Group 1"/>
+            <p:cNvGrpSpPr/>
+            <p:nvPr/>
+          </p:nvGrpSpPr>
+          <p:grpSpPr>
+            <a:xfrm>
+              <a:off x="3849907" y="2969641"/>
+              <a:ext cx="1446091" cy="338515"/>
+              <a:chOff x="3867326" y="2964620"/>
+              <a:chExt cx="1446091" cy="338515"/>
+            </a:xfrm>
+          </p:grpSpPr>
+          <p:sp>
+            <p:nvSpPr>
+              <p:cNvPr id="43" name="Rectangle 42"/>
+              <p:cNvSpPr/>
+              <p:nvPr/>
+            </p:nvSpPr>
+            <p:spPr>
+              <a:xfrm>
+                <a:off x="3867326" y="2964620"/>
+                <a:ext cx="291371" cy="338515"/>
+              </a:xfrm>
+              <a:prstGeom prst="rect">
+                <a:avLst/>
+              </a:prstGeom>
+            </p:spPr>
+            <p:style>
+              <a:lnRef idx="0">
+                <a:schemeClr val="accent5"/>
+              </a:lnRef>
+              <a:fillRef idx="3">
+                <a:schemeClr val="accent5"/>
+              </a:fillRef>
+              <a:effectRef idx="3">
+                <a:schemeClr val="accent5"/>
+              </a:effectRef>
+              <a:fontRef idx="minor">
+                <a:schemeClr val="lt1"/>
+              </a:fontRef>
+            </p:style>
+            <p:txBody>
+              <a:bodyPr rtlCol="0" anchor="ctr"/>
+              <a:lstStyle/>
+              <a:p>
+                <a:pPr algn="ctr"/>
+                <a:endParaRPr lang="en-US"/>
+              </a:p>
+            </p:txBody>
+          </p:sp>
+          <p:sp>
+            <p:nvSpPr>
+              <p:cNvPr id="44" name="Rectangle 43"/>
+              <p:cNvSpPr/>
+              <p:nvPr/>
+            </p:nvSpPr>
+            <p:spPr>
+              <a:xfrm>
+                <a:off x="4156006" y="2964620"/>
+                <a:ext cx="291371" cy="338515"/>
+              </a:xfrm>
+              <a:prstGeom prst="rect">
+                <a:avLst/>
+              </a:prstGeom>
+            </p:spPr>
+            <p:style>
+              <a:lnRef idx="0">
+                <a:schemeClr val="accent5"/>
+              </a:lnRef>
+              <a:fillRef idx="3">
+                <a:schemeClr val="accent5"/>
+              </a:fillRef>
+              <a:effectRef idx="3">
+                <a:schemeClr val="accent5"/>
+              </a:effectRef>
+              <a:fontRef idx="minor">
+                <a:schemeClr val="lt1"/>
+              </a:fontRef>
+            </p:style>
+            <p:txBody>
+              <a:bodyPr rtlCol="0" anchor="ctr"/>
+              <a:lstStyle/>
+              <a:p>
+                <a:pPr algn="ctr"/>
+                <a:endParaRPr lang="en-US"/>
+              </a:p>
+            </p:txBody>
+          </p:sp>
+          <p:sp>
+            <p:nvSpPr>
+              <p:cNvPr id="45" name="Rectangle 44"/>
+              <p:cNvSpPr/>
+              <p:nvPr/>
+            </p:nvSpPr>
+            <p:spPr>
+              <a:xfrm>
+                <a:off x="4444686" y="2964620"/>
+                <a:ext cx="291371" cy="338515"/>
+              </a:xfrm>
+              <a:prstGeom prst="rect">
+                <a:avLst/>
+              </a:prstGeom>
+            </p:spPr>
+            <p:style>
+              <a:lnRef idx="0">
+                <a:schemeClr val="accent5"/>
+              </a:lnRef>
+              <a:fillRef idx="3">
+                <a:schemeClr val="accent5"/>
+              </a:fillRef>
+              <a:effectRef idx="3">
+                <a:schemeClr val="accent5"/>
+              </a:effectRef>
+              <a:fontRef idx="minor">
+                <a:schemeClr val="lt1"/>
+              </a:fontRef>
+            </p:style>
+            <p:txBody>
+              <a:bodyPr rtlCol="0" anchor="ctr"/>
+              <a:lstStyle/>
+              <a:p>
+                <a:pPr algn="ctr"/>
+                <a:endParaRPr lang="en-US"/>
+              </a:p>
+            </p:txBody>
+          </p:sp>
+          <p:sp>
+            <p:nvSpPr>
+              <p:cNvPr id="46" name="Rectangle 45"/>
+              <p:cNvSpPr/>
+              <p:nvPr/>
+            </p:nvSpPr>
+            <p:spPr>
+              <a:xfrm>
+                <a:off x="4733366" y="2964620"/>
+                <a:ext cx="291371" cy="338515"/>
+              </a:xfrm>
+              <a:prstGeom prst="rect">
+                <a:avLst/>
+              </a:prstGeom>
+            </p:spPr>
+            <p:style>
+              <a:lnRef idx="0">
+                <a:schemeClr val="accent5"/>
+              </a:lnRef>
+              <a:fillRef idx="3">
+                <a:schemeClr val="accent5"/>
+              </a:fillRef>
+              <a:effectRef idx="3">
+                <a:schemeClr val="accent5"/>
+              </a:effectRef>
+              <a:fontRef idx="minor">
+                <a:schemeClr val="lt1"/>
+              </a:fontRef>
+            </p:style>
+            <p:txBody>
+              <a:bodyPr rtlCol="0" anchor="ctr"/>
+              <a:lstStyle/>
+              <a:p>
+                <a:pPr algn="ctr"/>
+                <a:endParaRPr lang="en-US"/>
+              </a:p>
+            </p:txBody>
+          </p:sp>
+          <p:sp>
+            <p:nvSpPr>
+              <p:cNvPr id="47" name="Rectangle 46"/>
+              <p:cNvSpPr/>
+              <p:nvPr/>
+            </p:nvSpPr>
+            <p:spPr>
+              <a:xfrm>
+                <a:off x="5022046" y="2964620"/>
+                <a:ext cx="291371" cy="338515"/>
+              </a:xfrm>
+              <a:prstGeom prst="rect">
+                <a:avLst/>
+              </a:prstGeom>
+            </p:spPr>
+            <p:style>
+              <a:lnRef idx="0">
+                <a:schemeClr val="accent5"/>
+              </a:lnRef>
+              <a:fillRef idx="3">
+                <a:schemeClr val="accent5"/>
+              </a:fillRef>
+              <a:effectRef idx="3">
+                <a:schemeClr val="accent5"/>
+              </a:effectRef>
+              <a:fontRef idx="minor">
+                <a:schemeClr val="lt1"/>
+              </a:fontRef>
+            </p:style>
+            <p:txBody>
+              <a:bodyPr rtlCol="0" anchor="ctr"/>
+              <a:lstStyle/>
+              <a:p>
+                <a:pPr algn="ctr"/>
+                <a:endParaRPr lang="en-US"/>
+              </a:p>
+            </p:txBody>
+          </p:sp>
+        </p:grpSp>
+      </p:grpSp>
+      <p:sp>
+        <p:nvSpPr>
+          <p:cNvPr id="31" name="Rounded Rectangle 30"/>
+          <p:cNvSpPr/>
+          <p:nvPr/>
+        </p:nvSpPr>
+        <p:spPr>
+          <a:xfrm>
+            <a:off x="2908113" y="3701924"/>
+            <a:ext cx="1435287" cy="1446627"/>
+          </a:xfrm>
+          <a:prstGeom prst="roundRect">
+            <a:avLst/>
+          </a:prstGeom>
+          <a:ln/>
+        </p:spPr>
+        <p:style>
+          <a:lnRef idx="1">
+            <a:schemeClr val="accent1"/>
+          </a:lnRef>
+          <a:fillRef idx="2">
+            <a:schemeClr val="accent1"/>
+          </a:fillRef>
+          <a:effectRef idx="1">
+            <a:schemeClr val="accent1"/>
+          </a:effectRef>
+          <a:fontRef idx="minor">
+            <a:schemeClr val="dk1"/>
+          </a:fontRef>
+        </p:style>
+        <p:txBody>
+          <a:bodyPr rtlCol="0" anchor="ctr"/>
+          <a:lstStyle/>
+          <a:p>
+            <a:pPr algn="ctr"/>
+            <a:r>
+              <a:rPr lang="en-US" dirty="0" smtClean="0"/>
+              <a:t>Component Operation </a:t>
+            </a:r>
+            <a:r>
+              <a:rPr lang="en-US" dirty="0" smtClean="0"/>
+              <a:t>Deadline Monitor</a:t>
+            </a:r>
+            <a:endParaRPr lang="en-US" dirty="0"/>
+          </a:p>
+        </p:txBody>
+      </p:sp>
+      <p:sp>
+        <p:nvSpPr>
+          <p:cNvPr id="32" name="Right Arrow 31"/>
+          <p:cNvSpPr/>
+          <p:nvPr/>
+        </p:nvSpPr>
+        <p:spPr>
+          <a:xfrm>
+            <a:off x="5465588" y="3013894"/>
+            <a:ext cx="358279" cy="239818"/>
+          </a:xfrm>
+          <a:prstGeom prst="rightArrow">
+            <a:avLst/>
+          </a:prstGeom>
+        </p:spPr>
+        <p:style>
+          <a:lnRef idx="2">
+            <a:schemeClr val="dk1">
+              <a:shade val="50000"/>
+            </a:schemeClr>
+          </a:lnRef>
+          <a:fillRef idx="1">
+            <a:schemeClr val="dk1"/>
+          </a:fillRef>
+          <a:effectRef idx="0">
+            <a:schemeClr val="dk1"/>
+          </a:effectRef>
+          <a:fontRef idx="minor">
+            <a:schemeClr val="lt1"/>
+          </a:fontRef>
+        </p:style>
+        <p:txBody>
+          <a:bodyPr rtlCol="0" anchor="ctr"/>
+          <a:lstStyle/>
+          <a:p>
+            <a:pPr algn="ctr"/>
+            <a:endParaRPr lang="en-US"/>
+          </a:p>
+        </p:txBody>
+      </p:sp>
+    </p:spTree>
+    <p:extLst>
+      <p:ext uri="{BB962C8B-B14F-4D97-AF65-F5344CB8AC3E}">
+        <p14:creationId xmlns:p14="http://schemas.microsoft.com/office/powerpoint/2010/main" val="2439565521"/>
+      </p:ext>
+    </p:extLst>
+  </p:cSld>
+  <p:clrMapOvr>
+    <a:masterClrMapping/>
+  </p:clrMapOvr>
+  <p:timing>
+    <p:tnLst>
+      <p:par>
+        <p:cTn id="1" dur="indefinite" restart="never" nodeType="tmRoot"/>
+      </p:par>
+    </p:tnLst>
+  </p:timing>
+</p:sld>
+</file>
+
+<file path=ppt/slides/slide3.xml><?xml version="1.0" encoding="utf-8"?>
 <p:sld xmlns:a="http://schemas.openxmlformats.org/drawingml/2006/main" xmlns:r="http://schemas.openxmlformats.org/officeDocument/2006/relationships" xmlns:p="http://schemas.openxmlformats.org/presentationml/2006/main">
   <p:cSld>
     <p:spTree>
@@ -6260,7 +7532,7 @@
 </p:sld>
 </file>
 
-<file path=ppt/slides/slide3.xml><?xml version="1.0" encoding="utf-8"?>
+<file path=ppt/slides/slide4.xml><?xml version="1.0" encoding="utf-8"?>
 <p:sld xmlns:a="http://schemas.openxmlformats.org/drawingml/2006/main" xmlns:r="http://schemas.openxmlformats.org/officeDocument/2006/relationships" xmlns:p="http://schemas.openxmlformats.org/presentationml/2006/main">
   <p:cSld>
     <p:spTree>
@@ -7916,7 +9188,7 @@
 </p:sld>
 </file>
 
-<file path=ppt/slides/slide4.xml><?xml version="1.0" encoding="utf-8"?>
+<file path=ppt/slides/slide5.xml><?xml version="1.0" encoding="utf-8"?>
 <p:sld xmlns:a="http://schemas.openxmlformats.org/drawingml/2006/main" xmlns:r="http://schemas.openxmlformats.org/officeDocument/2006/relationships" xmlns:p="http://schemas.openxmlformats.org/presentationml/2006/main">
   <p:cSld>
     <p:spTree>
@@ -9240,7 +10512,7 @@
 </p:sld>
 </file>
 
-<file path=ppt/slides/slide5.xml><?xml version="1.0" encoding="utf-8"?>
+<file path=ppt/slides/slide6.xml><?xml version="1.0" encoding="utf-8"?>
 <p:sld xmlns:a="http://schemas.openxmlformats.org/drawingml/2006/main" xmlns:r="http://schemas.openxmlformats.org/officeDocument/2006/relationships" xmlns:p="http://schemas.openxmlformats.org/presentationml/2006/main">
   <p:cSld>
     <p:spTree>
@@ -9344,7 +10616,6 @@
               <a:rPr lang="en-US" dirty="0" smtClean="0"/>
               <a:t>Network Traffic</a:t>
             </a:r>
-            <a:endParaRPr lang="en-US" dirty="0" smtClean="0"/>
           </a:p>
         </p:txBody>
       </p:sp>
@@ -9386,7 +10657,6 @@
               <a:rPr lang="en-US" dirty="0" smtClean="0"/>
               <a:t>Shaper</a:t>
             </a:r>
-            <a:endParaRPr lang="en-US" dirty="0" smtClean="0"/>
           </a:p>
         </p:txBody>
       </p:sp>
@@ -9428,7 +10698,6 @@
               <a:rPr lang="en-US" dirty="0" smtClean="0"/>
               <a:t>Delay</a:t>
             </a:r>
-            <a:endParaRPr lang="en-US" dirty="0" smtClean="0"/>
           </a:p>
         </p:txBody>
       </p:sp>
@@ -9638,7 +10907,6 @@
                 <a:rPr lang="en-US" dirty="0" smtClean="0"/>
                 <a:t>priority</a:t>
               </a:r>
-              <a:endParaRPr lang="en-US" dirty="0" smtClean="0"/>
             </a:p>
           </p:txBody>
         </p:sp>
@@ -9690,7 +10958,6 @@
                 <a:rPr lang="en-US" dirty="0" smtClean="0"/>
                 <a:t>priority</a:t>
               </a:r>
-              <a:endParaRPr lang="en-US" dirty="0" smtClean="0"/>
             </a:p>
           </p:txBody>
         </p:sp>
@@ -9738,7 +11005,6 @@
                 <a:rPr lang="en-US" dirty="0" smtClean="0"/>
                 <a:t>Non Application</a:t>
               </a:r>
-              <a:endParaRPr lang="en-US" dirty="0" smtClean="0"/>
             </a:p>
           </p:txBody>
         </p:sp>
@@ -10006,7 +11272,6 @@
               <a:rPr lang="en-US" sz="1200" dirty="0" smtClean="0"/>
               <a:t>:</a:t>
             </a:r>
-            <a:endParaRPr lang="en-US" sz="1200" dirty="0" smtClean="0"/>
           </a:p>
           <a:p>
             <a:r>

</xml_diff>

<commit_message>
Updated figures according to DK's comments
</commit_message>
<xml_diff>
--- a/thesis/figs/ros_component.pptx
+++ b/thesis/figs/ros_component.pptx
@@ -4,13 +4,18 @@
   <p:sldMasterIdLst>
     <p:sldMasterId id="2147483648" r:id="rId1"/>
   </p:sldMasterIdLst>
+  <p:notesMasterIdLst>
+    <p:notesMasterId r:id="rId10"/>
+  </p:notesMasterIdLst>
   <p:sldIdLst>
     <p:sldId id="256" r:id="rId2"/>
     <p:sldId id="261" r:id="rId3"/>
     <p:sldId id="257" r:id="rId4"/>
     <p:sldId id="258" r:id="rId5"/>
-    <p:sldId id="259" r:id="rId6"/>
-    <p:sldId id="260" r:id="rId7"/>
+    <p:sldId id="263" r:id="rId6"/>
+    <p:sldId id="262" r:id="rId7"/>
+    <p:sldId id="259" r:id="rId8"/>
+    <p:sldId id="260" r:id="rId9"/>
   </p:sldIdLst>
   <p:sldSz cx="9144000" cy="6858000" type="screen4x3"/>
   <p:notesSz cx="6858000" cy="9144000"/>
@@ -126,6 +131,440 @@
     </p:ext>
   </p:extLst>
 </p:presentation>
+</file>
+
+<file path=ppt/notesMasters/notesMaster1.xml><?xml version="1.0" encoding="utf-8"?>
+<p:notesMaster xmlns:a="http://schemas.openxmlformats.org/drawingml/2006/main" xmlns:r="http://schemas.openxmlformats.org/officeDocument/2006/relationships" xmlns:p="http://schemas.openxmlformats.org/presentationml/2006/main">
+  <p:cSld>
+    <p:bg>
+      <p:bgRef idx="1001">
+        <a:schemeClr val="bg1"/>
+      </p:bgRef>
+    </p:bg>
+    <p:spTree>
+      <p:nvGrpSpPr>
+        <p:cNvPr id="1" name=""/>
+        <p:cNvGrpSpPr/>
+        <p:nvPr/>
+      </p:nvGrpSpPr>
+      <p:grpSpPr>
+        <a:xfrm>
+          <a:off x="0" y="0"/>
+          <a:ext cx="0" cy="0"/>
+          <a:chOff x="0" y="0"/>
+          <a:chExt cx="0" cy="0"/>
+        </a:xfrm>
+      </p:grpSpPr>
+      <p:sp>
+        <p:nvSpPr>
+          <p:cNvPr id="2" name="Header Placeholder 1"/>
+          <p:cNvSpPr>
+            <a:spLocks noGrp="1"/>
+          </p:cNvSpPr>
+          <p:nvPr>
+            <p:ph type="hdr" sz="quarter"/>
+          </p:nvPr>
+        </p:nvSpPr>
+        <p:spPr>
+          <a:xfrm>
+            <a:off x="0" y="0"/>
+            <a:ext cx="2971800" cy="458788"/>
+          </a:xfrm>
+          <a:prstGeom prst="rect">
+            <a:avLst/>
+          </a:prstGeom>
+        </p:spPr>
+        <p:txBody>
+          <a:bodyPr vert="horz" lIns="91440" tIns="45720" rIns="91440" bIns="45720" rtlCol="0"/>
+          <a:lstStyle>
+            <a:lvl1pPr algn="l">
+              <a:defRPr sz="1200"/>
+            </a:lvl1pPr>
+          </a:lstStyle>
+          <a:p>
+            <a:endParaRPr lang="en-US"/>
+          </a:p>
+        </p:txBody>
+      </p:sp>
+      <p:sp>
+        <p:nvSpPr>
+          <p:cNvPr id="3" name="Date Placeholder 2"/>
+          <p:cNvSpPr>
+            <a:spLocks noGrp="1"/>
+          </p:cNvSpPr>
+          <p:nvPr>
+            <p:ph type="dt" idx="1"/>
+          </p:nvPr>
+        </p:nvSpPr>
+        <p:spPr>
+          <a:xfrm>
+            <a:off x="3884613" y="0"/>
+            <a:ext cx="2971800" cy="458788"/>
+          </a:xfrm>
+          <a:prstGeom prst="rect">
+            <a:avLst/>
+          </a:prstGeom>
+        </p:spPr>
+        <p:txBody>
+          <a:bodyPr vert="horz" lIns="91440" tIns="45720" rIns="91440" bIns="45720" rtlCol="0"/>
+          <a:lstStyle>
+            <a:lvl1pPr algn="r">
+              <a:defRPr sz="1200"/>
+            </a:lvl1pPr>
+          </a:lstStyle>
+          <a:p>
+            <a:fld id="{3659E05F-E9F7-4137-91DF-35016ACA06CB}" type="datetimeFigureOut">
+              <a:rPr lang="en-US" smtClean="0"/>
+              <a:t>2015-09-27</a:t>
+            </a:fld>
+            <a:endParaRPr lang="en-US"/>
+          </a:p>
+        </p:txBody>
+      </p:sp>
+      <p:sp>
+        <p:nvSpPr>
+          <p:cNvPr id="4" name="Slide Image Placeholder 3"/>
+          <p:cNvSpPr>
+            <a:spLocks noGrp="1" noRot="1" noChangeAspect="1"/>
+          </p:cNvSpPr>
+          <p:nvPr>
+            <p:ph type="sldImg" idx="2"/>
+          </p:nvPr>
+        </p:nvSpPr>
+        <p:spPr>
+          <a:xfrm>
+            <a:off x="1371600" y="1143000"/>
+            <a:ext cx="4114800" cy="3086100"/>
+          </a:xfrm>
+          <a:prstGeom prst="rect">
+            <a:avLst/>
+          </a:prstGeom>
+          <a:noFill/>
+          <a:ln w="12700">
+            <a:solidFill>
+              <a:prstClr val="black"/>
+            </a:solidFill>
+          </a:ln>
+        </p:spPr>
+        <p:txBody>
+          <a:bodyPr vert="horz" lIns="91440" tIns="45720" rIns="91440" bIns="45720" rtlCol="0" anchor="ctr"/>
+          <a:lstStyle/>
+          <a:p>
+            <a:endParaRPr lang="en-US"/>
+          </a:p>
+        </p:txBody>
+      </p:sp>
+      <p:sp>
+        <p:nvSpPr>
+          <p:cNvPr id="5" name="Notes Placeholder 4"/>
+          <p:cNvSpPr>
+            <a:spLocks noGrp="1"/>
+          </p:cNvSpPr>
+          <p:nvPr>
+            <p:ph type="body" sz="quarter" idx="3"/>
+          </p:nvPr>
+        </p:nvSpPr>
+        <p:spPr>
+          <a:xfrm>
+            <a:off x="685800" y="4400550"/>
+            <a:ext cx="5486400" cy="3600450"/>
+          </a:xfrm>
+          <a:prstGeom prst="rect">
+            <a:avLst/>
+          </a:prstGeom>
+        </p:spPr>
+        <p:txBody>
+          <a:bodyPr vert="horz" lIns="91440" tIns="45720" rIns="91440" bIns="45720" rtlCol="0"/>
+          <a:lstStyle/>
+          <a:p>
+            <a:pPr lvl="0"/>
+            <a:r>
+              <a:rPr lang="en-US" smtClean="0"/>
+              <a:t>Edit Master text styles</a:t>
+            </a:r>
+          </a:p>
+          <a:p>
+            <a:pPr lvl="1"/>
+            <a:r>
+              <a:rPr lang="en-US" smtClean="0"/>
+              <a:t>Second level</a:t>
+            </a:r>
+          </a:p>
+          <a:p>
+            <a:pPr lvl="2"/>
+            <a:r>
+              <a:rPr lang="en-US" smtClean="0"/>
+              <a:t>Third level</a:t>
+            </a:r>
+          </a:p>
+          <a:p>
+            <a:pPr lvl="3"/>
+            <a:r>
+              <a:rPr lang="en-US" smtClean="0"/>
+              <a:t>Fourth level</a:t>
+            </a:r>
+          </a:p>
+          <a:p>
+            <a:pPr lvl="4"/>
+            <a:r>
+              <a:rPr lang="en-US" smtClean="0"/>
+              <a:t>Fifth level</a:t>
+            </a:r>
+            <a:endParaRPr lang="en-US"/>
+          </a:p>
+        </p:txBody>
+      </p:sp>
+      <p:sp>
+        <p:nvSpPr>
+          <p:cNvPr id="6" name="Footer Placeholder 5"/>
+          <p:cNvSpPr>
+            <a:spLocks noGrp="1"/>
+          </p:cNvSpPr>
+          <p:nvPr>
+            <p:ph type="ftr" sz="quarter" idx="4"/>
+          </p:nvPr>
+        </p:nvSpPr>
+        <p:spPr>
+          <a:xfrm>
+            <a:off x="0" y="8685213"/>
+            <a:ext cx="2971800" cy="458787"/>
+          </a:xfrm>
+          <a:prstGeom prst="rect">
+            <a:avLst/>
+          </a:prstGeom>
+        </p:spPr>
+        <p:txBody>
+          <a:bodyPr vert="horz" lIns="91440" tIns="45720" rIns="91440" bIns="45720" rtlCol="0" anchor="b"/>
+          <a:lstStyle>
+            <a:lvl1pPr algn="l">
+              <a:defRPr sz="1200"/>
+            </a:lvl1pPr>
+          </a:lstStyle>
+          <a:p>
+            <a:endParaRPr lang="en-US"/>
+          </a:p>
+        </p:txBody>
+      </p:sp>
+      <p:sp>
+        <p:nvSpPr>
+          <p:cNvPr id="7" name="Slide Number Placeholder 6"/>
+          <p:cNvSpPr>
+            <a:spLocks noGrp="1"/>
+          </p:cNvSpPr>
+          <p:nvPr>
+            <p:ph type="sldNum" sz="quarter" idx="5"/>
+          </p:nvPr>
+        </p:nvSpPr>
+        <p:spPr>
+          <a:xfrm>
+            <a:off x="3884613" y="8685213"/>
+            <a:ext cx="2971800" cy="458787"/>
+          </a:xfrm>
+          <a:prstGeom prst="rect">
+            <a:avLst/>
+          </a:prstGeom>
+        </p:spPr>
+        <p:txBody>
+          <a:bodyPr vert="horz" lIns="91440" tIns="45720" rIns="91440" bIns="45720" rtlCol="0" anchor="b"/>
+          <a:lstStyle>
+            <a:lvl1pPr algn="r">
+              <a:defRPr sz="1200"/>
+            </a:lvl1pPr>
+          </a:lstStyle>
+          <a:p>
+            <a:fld id="{F92890B8-42CD-4507-9FCA-8237A13F0D55}" type="slidenum">
+              <a:rPr lang="en-US" smtClean="0"/>
+              <a:t>‹#›</a:t>
+            </a:fld>
+            <a:endParaRPr lang="en-US"/>
+          </a:p>
+        </p:txBody>
+      </p:sp>
+    </p:spTree>
+    <p:extLst>
+      <p:ext uri="{BB962C8B-B14F-4D97-AF65-F5344CB8AC3E}">
+        <p14:creationId xmlns:p14="http://schemas.microsoft.com/office/powerpoint/2010/main" val="1556145789"/>
+      </p:ext>
+    </p:extLst>
+  </p:cSld>
+  <p:clrMap bg1="lt1" tx1="dk1" bg2="lt2" tx2="dk2" accent1="accent1" accent2="accent2" accent3="accent3" accent4="accent4" accent5="accent5" accent6="accent6" hlink="hlink" folHlink="folHlink"/>
+  <p:notesStyle>
+    <a:lvl1pPr marL="0" algn="l" defTabSz="914400" rtl="0" eaLnBrk="1" latinLnBrk="0" hangingPunct="1">
+      <a:defRPr sz="1200" kern="1200">
+        <a:solidFill>
+          <a:schemeClr val="tx1"/>
+        </a:solidFill>
+        <a:latin typeface="+mn-lt"/>
+        <a:ea typeface="+mn-ea"/>
+        <a:cs typeface="+mn-cs"/>
+      </a:defRPr>
+    </a:lvl1pPr>
+    <a:lvl2pPr marL="457200" algn="l" defTabSz="914400" rtl="0" eaLnBrk="1" latinLnBrk="0" hangingPunct="1">
+      <a:defRPr sz="1200" kern="1200">
+        <a:solidFill>
+          <a:schemeClr val="tx1"/>
+        </a:solidFill>
+        <a:latin typeface="+mn-lt"/>
+        <a:ea typeface="+mn-ea"/>
+        <a:cs typeface="+mn-cs"/>
+      </a:defRPr>
+    </a:lvl2pPr>
+    <a:lvl3pPr marL="914400" algn="l" defTabSz="914400" rtl="0" eaLnBrk="1" latinLnBrk="0" hangingPunct="1">
+      <a:defRPr sz="1200" kern="1200">
+        <a:solidFill>
+          <a:schemeClr val="tx1"/>
+        </a:solidFill>
+        <a:latin typeface="+mn-lt"/>
+        <a:ea typeface="+mn-ea"/>
+        <a:cs typeface="+mn-cs"/>
+      </a:defRPr>
+    </a:lvl3pPr>
+    <a:lvl4pPr marL="1371600" algn="l" defTabSz="914400" rtl="0" eaLnBrk="1" latinLnBrk="0" hangingPunct="1">
+      <a:defRPr sz="1200" kern="1200">
+        <a:solidFill>
+          <a:schemeClr val="tx1"/>
+        </a:solidFill>
+        <a:latin typeface="+mn-lt"/>
+        <a:ea typeface="+mn-ea"/>
+        <a:cs typeface="+mn-cs"/>
+      </a:defRPr>
+    </a:lvl4pPr>
+    <a:lvl5pPr marL="1828800" algn="l" defTabSz="914400" rtl="0" eaLnBrk="1" latinLnBrk="0" hangingPunct="1">
+      <a:defRPr sz="1200" kern="1200">
+        <a:solidFill>
+          <a:schemeClr val="tx1"/>
+        </a:solidFill>
+        <a:latin typeface="+mn-lt"/>
+        <a:ea typeface="+mn-ea"/>
+        <a:cs typeface="+mn-cs"/>
+      </a:defRPr>
+    </a:lvl5pPr>
+    <a:lvl6pPr marL="2286000" algn="l" defTabSz="914400" rtl="0" eaLnBrk="1" latinLnBrk="0" hangingPunct="1">
+      <a:defRPr sz="1200" kern="1200">
+        <a:solidFill>
+          <a:schemeClr val="tx1"/>
+        </a:solidFill>
+        <a:latin typeface="+mn-lt"/>
+        <a:ea typeface="+mn-ea"/>
+        <a:cs typeface="+mn-cs"/>
+      </a:defRPr>
+    </a:lvl6pPr>
+    <a:lvl7pPr marL="2743200" algn="l" defTabSz="914400" rtl="0" eaLnBrk="1" latinLnBrk="0" hangingPunct="1">
+      <a:defRPr sz="1200" kern="1200">
+        <a:solidFill>
+          <a:schemeClr val="tx1"/>
+        </a:solidFill>
+        <a:latin typeface="+mn-lt"/>
+        <a:ea typeface="+mn-ea"/>
+        <a:cs typeface="+mn-cs"/>
+      </a:defRPr>
+    </a:lvl7pPr>
+    <a:lvl8pPr marL="3200400" algn="l" defTabSz="914400" rtl="0" eaLnBrk="1" latinLnBrk="0" hangingPunct="1">
+      <a:defRPr sz="1200" kern="1200">
+        <a:solidFill>
+          <a:schemeClr val="tx1"/>
+        </a:solidFill>
+        <a:latin typeface="+mn-lt"/>
+        <a:ea typeface="+mn-ea"/>
+        <a:cs typeface="+mn-cs"/>
+      </a:defRPr>
+    </a:lvl8pPr>
+    <a:lvl9pPr marL="3657600" algn="l" defTabSz="914400" rtl="0" eaLnBrk="1" latinLnBrk="0" hangingPunct="1">
+      <a:defRPr sz="1200" kern="1200">
+        <a:solidFill>
+          <a:schemeClr val="tx1"/>
+        </a:solidFill>
+        <a:latin typeface="+mn-lt"/>
+        <a:ea typeface="+mn-ea"/>
+        <a:cs typeface="+mn-cs"/>
+      </a:defRPr>
+    </a:lvl9pPr>
+  </p:notesStyle>
+</p:notesMaster>
+</file>
+
+<file path=ppt/notesSlides/notesSlide1.xml><?xml version="1.0" encoding="utf-8"?>
+<p:notes xmlns:a="http://schemas.openxmlformats.org/drawingml/2006/main" xmlns:r="http://schemas.openxmlformats.org/officeDocument/2006/relationships" xmlns:p="http://schemas.openxmlformats.org/presentationml/2006/main">
+  <p:cSld>
+    <p:spTree>
+      <p:nvGrpSpPr>
+        <p:cNvPr id="1" name=""/>
+        <p:cNvGrpSpPr/>
+        <p:nvPr/>
+      </p:nvGrpSpPr>
+      <p:grpSpPr>
+        <a:xfrm>
+          <a:off x="0" y="0"/>
+          <a:ext cx="0" cy="0"/>
+          <a:chOff x="0" y="0"/>
+          <a:chExt cx="0" cy="0"/>
+        </a:xfrm>
+      </p:grpSpPr>
+      <p:sp>
+        <p:nvSpPr>
+          <p:cNvPr id="2" name="Slide Image Placeholder 1"/>
+          <p:cNvSpPr>
+            <a:spLocks noGrp="1" noRot="1" noChangeAspect="1"/>
+          </p:cNvSpPr>
+          <p:nvPr>
+            <p:ph type="sldImg"/>
+          </p:nvPr>
+        </p:nvSpPr>
+        <p:spPr/>
+      </p:sp>
+      <p:sp>
+        <p:nvSpPr>
+          <p:cNvPr id="3" name="Notes Placeholder 2"/>
+          <p:cNvSpPr>
+            <a:spLocks noGrp="1"/>
+          </p:cNvSpPr>
+          <p:nvPr>
+            <p:ph type="body" idx="1"/>
+          </p:nvPr>
+        </p:nvSpPr>
+        <p:spPr/>
+        <p:txBody>
+          <a:bodyPr/>
+          <a:lstStyle/>
+          <a:p>
+            <a:endParaRPr lang="en-US"/>
+          </a:p>
+        </p:txBody>
+      </p:sp>
+      <p:sp>
+        <p:nvSpPr>
+          <p:cNvPr id="4" name="Slide Number Placeholder 3"/>
+          <p:cNvSpPr>
+            <a:spLocks noGrp="1"/>
+          </p:cNvSpPr>
+          <p:nvPr>
+            <p:ph type="sldNum" sz="quarter" idx="10"/>
+          </p:nvPr>
+        </p:nvSpPr>
+        <p:spPr/>
+        <p:txBody>
+          <a:bodyPr/>
+          <a:lstStyle/>
+          <a:p>
+            <a:fld id="{1336E600-8600-4301-983C-CC92E7732E97}" type="slidenum">
+              <a:rPr lang="en-US"/>
+              <a:t>6</a:t>
+            </a:fld>
+            <a:endParaRPr lang="en-US"/>
+          </a:p>
+        </p:txBody>
+      </p:sp>
+    </p:spTree>
+    <p:extLst>
+      <p:ext uri="{BB962C8B-B14F-4D97-AF65-F5344CB8AC3E}">
+        <p14:creationId xmlns:p14="http://schemas.microsoft.com/office/powerpoint/2010/main" val="593738163"/>
+      </p:ext>
+    </p:extLst>
+  </p:cSld>
+  <p:clrMapOvr>
+    <a:masterClrMapping/>
+  </p:clrMapOvr>
+</p:notes>
 </file>
 
 <file path=ppt/slideLayouts/slideLayout1.xml><?xml version="1.0" encoding="utf-8"?>
@@ -9207,6 +9646,2721 @@
       </p:grpSpPr>
       <p:sp>
         <p:nvSpPr>
+          <p:cNvPr id="4" name="Rounded Rectangle 3"/>
+          <p:cNvSpPr/>
+          <p:nvPr/>
+        </p:nvSpPr>
+        <p:spPr>
+          <a:xfrm>
+            <a:off x="1251664" y="1752600"/>
+            <a:ext cx="2710736" cy="1676400"/>
+          </a:xfrm>
+          <a:prstGeom prst="roundRect">
+            <a:avLst/>
+          </a:prstGeom>
+        </p:spPr>
+        <p:style>
+          <a:lnRef idx="1">
+            <a:schemeClr val="accent5"/>
+          </a:lnRef>
+          <a:fillRef idx="3">
+            <a:schemeClr val="accent5"/>
+          </a:fillRef>
+          <a:effectRef idx="2">
+            <a:schemeClr val="accent5"/>
+          </a:effectRef>
+          <a:fontRef idx="minor">
+            <a:schemeClr val="lt1"/>
+          </a:fontRef>
+        </p:style>
+        <p:txBody>
+          <a:bodyPr rtlCol="0" anchor="ctr"/>
+          <a:lstStyle/>
+          <a:p>
+            <a:pPr algn="ctr"/>
+            <a:r>
+              <a:rPr lang="en-US" dirty="0" smtClean="0"/>
+              <a:t>Node 1</a:t>
+            </a:r>
+            <a:endParaRPr lang="en-US" dirty="0"/>
+          </a:p>
+          <a:p>
+            <a:pPr algn="ctr"/>
+            <a:endParaRPr lang="en-US" dirty="0"/>
+          </a:p>
+          <a:p>
+            <a:pPr algn="ctr"/>
+            <a:endParaRPr lang="en-US" dirty="0"/>
+          </a:p>
+          <a:p>
+            <a:pPr algn="ctr"/>
+            <a:endParaRPr lang="en-US" dirty="0"/>
+          </a:p>
+          <a:p>
+            <a:pPr algn="ctr"/>
+            <a:endParaRPr lang="en-US" dirty="0" smtClean="0"/>
+          </a:p>
+        </p:txBody>
+      </p:sp>
+      <p:grpSp>
+        <p:nvGrpSpPr>
+          <p:cNvPr id="3" name="Group 2"/>
+          <p:cNvGrpSpPr/>
+          <p:nvPr/>
+        </p:nvGrpSpPr>
+        <p:grpSpPr>
+          <a:xfrm>
+            <a:off x="2644675" y="2355276"/>
+            <a:ext cx="1174167" cy="905607"/>
+            <a:chOff x="1235168" y="3165098"/>
+            <a:chExt cx="1174167" cy="905607"/>
+          </a:xfrm>
+        </p:grpSpPr>
+        <p:sp>
+          <p:nvSpPr>
+            <p:cNvPr id="51" name="Rounded Rectangle 50"/>
+            <p:cNvSpPr/>
+            <p:nvPr/>
+          </p:nvSpPr>
+          <p:spPr>
+            <a:xfrm>
+              <a:off x="1235168" y="3165098"/>
+              <a:ext cx="1174167" cy="905607"/>
+            </a:xfrm>
+            <a:prstGeom prst="roundRect">
+              <a:avLst/>
+            </a:prstGeom>
+          </p:spPr>
+          <p:style>
+            <a:lnRef idx="1">
+              <a:schemeClr val="accent5"/>
+            </a:lnRef>
+            <a:fillRef idx="2">
+              <a:schemeClr val="accent5"/>
+            </a:fillRef>
+            <a:effectRef idx="1">
+              <a:schemeClr val="accent5"/>
+            </a:effectRef>
+            <a:fontRef idx="minor">
+              <a:schemeClr val="dk1"/>
+            </a:fontRef>
+          </p:style>
+          <p:txBody>
+            <a:bodyPr rtlCol="0" anchor="ctr"/>
+            <a:lstStyle/>
+            <a:p>
+              <a:pPr algn="ctr"/>
+              <a:r>
+                <a:rPr lang="en-US" sz="1400" dirty="0" smtClean="0"/>
+                <a:t>Source 1</a:t>
+              </a:r>
+            </a:p>
+            <a:p>
+              <a:pPr algn="ctr"/>
+              <a:endParaRPr lang="en-US" sz="1400" dirty="0"/>
+            </a:p>
+            <a:p>
+              <a:pPr algn="ctr"/>
+              <a:endParaRPr lang="en-US" sz="1400" dirty="0" smtClean="0"/>
+            </a:p>
+            <a:p>
+              <a:pPr algn="ctr"/>
+              <a:endParaRPr lang="en-US" sz="1400" dirty="0"/>
+            </a:p>
+          </p:txBody>
+        </p:sp>
+        <p:pic>
+          <p:nvPicPr>
+            <p:cNvPr id="1032" name="Picture 1031"/>
+            <p:cNvPicPr>
+              <a:picLocks noChangeAspect="1"/>
+            </p:cNvPicPr>
+            <p:nvPr/>
+          </p:nvPicPr>
+          <p:blipFill>
+            <a:blip r:embed="rId2" cstate="print">
+              <a:extLst>
+                <a:ext uri="{28A0092B-C50C-407E-A947-70E740481C1C}">
+                  <a14:useLocalDpi xmlns:a14="http://schemas.microsoft.com/office/drawing/2010/main" val="0"/>
+                </a:ext>
+              </a:extLst>
+            </a:blip>
+            <a:stretch>
+              <a:fillRect/>
+            </a:stretch>
+          </p:blipFill>
+          <p:spPr>
+            <a:xfrm>
+              <a:off x="1473443" y="3460051"/>
+              <a:ext cx="697615" cy="525788"/>
+            </a:xfrm>
+            <a:prstGeom prst="rect">
+              <a:avLst/>
+            </a:prstGeom>
+          </p:spPr>
+        </p:pic>
+      </p:grpSp>
+      <p:grpSp>
+        <p:nvGrpSpPr>
+          <p:cNvPr id="17" name="Group 16"/>
+          <p:cNvGrpSpPr/>
+          <p:nvPr/>
+        </p:nvGrpSpPr>
+        <p:grpSpPr>
+          <a:xfrm>
+            <a:off x="1845032" y="4524981"/>
+            <a:ext cx="1524000" cy="1676400"/>
+            <a:chOff x="1764909" y="4474343"/>
+            <a:chExt cx="1524000" cy="1676400"/>
+          </a:xfrm>
+        </p:grpSpPr>
+        <p:sp>
+          <p:nvSpPr>
+            <p:cNvPr id="35" name="Rounded Rectangle 34"/>
+            <p:cNvSpPr/>
+            <p:nvPr/>
+          </p:nvSpPr>
+          <p:spPr>
+            <a:xfrm>
+              <a:off x="1764909" y="4474343"/>
+              <a:ext cx="1524000" cy="1676400"/>
+            </a:xfrm>
+            <a:prstGeom prst="roundRect">
+              <a:avLst/>
+            </a:prstGeom>
+          </p:spPr>
+          <p:style>
+            <a:lnRef idx="1">
+              <a:schemeClr val="accent5"/>
+            </a:lnRef>
+            <a:fillRef idx="3">
+              <a:schemeClr val="accent5"/>
+            </a:fillRef>
+            <a:effectRef idx="2">
+              <a:schemeClr val="accent5"/>
+            </a:effectRef>
+            <a:fontRef idx="minor">
+              <a:schemeClr val="lt1"/>
+            </a:fontRef>
+          </p:style>
+          <p:txBody>
+            <a:bodyPr rtlCol="0" anchor="ctr"/>
+            <a:lstStyle/>
+            <a:p>
+              <a:pPr algn="ctr"/>
+              <a:r>
+                <a:rPr lang="en-US" dirty="0" smtClean="0"/>
+                <a:t>Node </a:t>
+              </a:r>
+              <a:r>
+                <a:rPr lang="en-US" dirty="0"/>
+                <a:t>3</a:t>
+              </a:r>
+            </a:p>
+            <a:p>
+              <a:pPr algn="ctr"/>
+              <a:endParaRPr lang="en-US" dirty="0"/>
+            </a:p>
+            <a:p>
+              <a:pPr algn="ctr"/>
+              <a:endParaRPr lang="en-US" dirty="0"/>
+            </a:p>
+            <a:p>
+              <a:pPr algn="ctr"/>
+              <a:endParaRPr lang="en-US" dirty="0"/>
+            </a:p>
+            <a:p>
+              <a:pPr algn="ctr"/>
+              <a:endParaRPr lang="en-US" dirty="0" smtClean="0"/>
+            </a:p>
+          </p:txBody>
+        </p:sp>
+        <p:grpSp>
+          <p:nvGrpSpPr>
+            <p:cNvPr id="7" name="Group 6"/>
+            <p:cNvGrpSpPr/>
+            <p:nvPr/>
+          </p:nvGrpSpPr>
+          <p:grpSpPr>
+            <a:xfrm>
+              <a:off x="1939826" y="5070603"/>
+              <a:ext cx="1174167" cy="905607"/>
+              <a:chOff x="1251665" y="5070603"/>
+              <a:chExt cx="1174167" cy="905607"/>
+            </a:xfrm>
+          </p:grpSpPr>
+          <p:sp>
+            <p:nvSpPr>
+              <p:cNvPr id="5" name="Rounded Rectangle 4"/>
+              <p:cNvSpPr/>
+              <p:nvPr/>
+            </p:nvSpPr>
+            <p:spPr>
+              <a:xfrm>
+                <a:off x="1251665" y="5070603"/>
+                <a:ext cx="1174167" cy="905607"/>
+              </a:xfrm>
+              <a:prstGeom prst="roundRect">
+                <a:avLst/>
+              </a:prstGeom>
+            </p:spPr>
+            <p:style>
+              <a:lnRef idx="1">
+                <a:schemeClr val="accent5"/>
+              </a:lnRef>
+              <a:fillRef idx="2">
+                <a:schemeClr val="accent5"/>
+              </a:fillRef>
+              <a:effectRef idx="1">
+                <a:schemeClr val="accent5"/>
+              </a:effectRef>
+              <a:fontRef idx="minor">
+                <a:schemeClr val="dk1"/>
+              </a:fontRef>
+            </p:style>
+            <p:txBody>
+              <a:bodyPr rtlCol="0" anchor="ctr"/>
+              <a:lstStyle/>
+              <a:p>
+                <a:pPr algn="ctr"/>
+                <a:r>
+                  <a:rPr lang="en-US" sz="1400" dirty="0" smtClean="0"/>
+                  <a:t>Source </a:t>
+                </a:r>
+                <a:r>
+                  <a:rPr lang="en-US" sz="1400" dirty="0" smtClean="0"/>
+                  <a:t>3</a:t>
+                </a:r>
+                <a:endParaRPr lang="en-US" sz="1400" dirty="0" smtClean="0"/>
+              </a:p>
+              <a:p>
+                <a:pPr algn="ctr"/>
+                <a:endParaRPr lang="en-US" sz="1400" dirty="0" smtClean="0"/>
+              </a:p>
+              <a:p>
+                <a:pPr algn="ctr"/>
+                <a:endParaRPr lang="en-US" sz="1400" dirty="0"/>
+              </a:p>
+              <a:p>
+                <a:pPr algn="ctr"/>
+                <a:endParaRPr lang="en-US" sz="1400" dirty="0"/>
+              </a:p>
+            </p:txBody>
+          </p:sp>
+          <p:pic>
+            <p:nvPicPr>
+              <p:cNvPr id="138" name="Picture 137"/>
+              <p:cNvPicPr>
+                <a:picLocks noChangeAspect="1"/>
+              </p:cNvPicPr>
+              <p:nvPr/>
+            </p:nvPicPr>
+            <p:blipFill>
+              <a:blip r:embed="rId2" cstate="print">
+                <a:extLst>
+                  <a:ext uri="{28A0092B-C50C-407E-A947-70E740481C1C}">
+                    <a14:useLocalDpi xmlns:a14="http://schemas.microsoft.com/office/drawing/2010/main" val="0"/>
+                  </a:ext>
+                </a:extLst>
+              </a:blip>
+              <a:stretch>
+                <a:fillRect/>
+              </a:stretch>
+            </p:blipFill>
+            <p:spPr>
+              <a:xfrm>
+                <a:off x="1489941" y="5361779"/>
+                <a:ext cx="697615" cy="525788"/>
+              </a:xfrm>
+              <a:prstGeom prst="rect">
+                <a:avLst/>
+              </a:prstGeom>
+            </p:spPr>
+          </p:pic>
+        </p:grpSp>
+      </p:grpSp>
+      <p:grpSp>
+        <p:nvGrpSpPr>
+          <p:cNvPr id="18" name="Group 17"/>
+          <p:cNvGrpSpPr/>
+          <p:nvPr/>
+        </p:nvGrpSpPr>
+        <p:grpSpPr>
+          <a:xfrm>
+            <a:off x="6099488" y="4524981"/>
+            <a:ext cx="1524000" cy="1676400"/>
+            <a:chOff x="6698668" y="4474343"/>
+            <a:chExt cx="1524000" cy="1676400"/>
+          </a:xfrm>
+        </p:grpSpPr>
+        <p:sp>
+          <p:nvSpPr>
+            <p:cNvPr id="36" name="Rounded Rectangle 35"/>
+            <p:cNvSpPr/>
+            <p:nvPr/>
+          </p:nvSpPr>
+          <p:spPr>
+            <a:xfrm>
+              <a:off x="6698668" y="4474343"/>
+              <a:ext cx="1524000" cy="1676400"/>
+            </a:xfrm>
+            <a:prstGeom prst="roundRect">
+              <a:avLst/>
+            </a:prstGeom>
+          </p:spPr>
+          <p:style>
+            <a:lnRef idx="1">
+              <a:schemeClr val="accent5"/>
+            </a:lnRef>
+            <a:fillRef idx="3">
+              <a:schemeClr val="accent5"/>
+            </a:fillRef>
+            <a:effectRef idx="2">
+              <a:schemeClr val="accent5"/>
+            </a:effectRef>
+            <a:fontRef idx="minor">
+              <a:schemeClr val="lt1"/>
+            </a:fontRef>
+          </p:style>
+          <p:txBody>
+            <a:bodyPr rtlCol="0" anchor="ctr"/>
+            <a:lstStyle/>
+            <a:p>
+              <a:pPr algn="ctr"/>
+              <a:r>
+                <a:rPr lang="en-US" dirty="0" smtClean="0"/>
+                <a:t>Node 4</a:t>
+              </a:r>
+              <a:endParaRPr lang="en-US" dirty="0"/>
+            </a:p>
+            <a:p>
+              <a:pPr algn="ctr"/>
+              <a:endParaRPr lang="en-US" dirty="0"/>
+            </a:p>
+            <a:p>
+              <a:pPr algn="ctr"/>
+              <a:endParaRPr lang="en-US" dirty="0"/>
+            </a:p>
+            <a:p>
+              <a:pPr algn="ctr"/>
+              <a:endParaRPr lang="en-US" dirty="0"/>
+            </a:p>
+            <a:p>
+              <a:pPr algn="ctr"/>
+              <a:endParaRPr lang="en-US" dirty="0" smtClean="0"/>
+            </a:p>
+          </p:txBody>
+        </p:sp>
+        <p:grpSp>
+          <p:nvGrpSpPr>
+            <p:cNvPr id="13" name="Group 12"/>
+            <p:cNvGrpSpPr/>
+            <p:nvPr/>
+          </p:nvGrpSpPr>
+          <p:grpSpPr>
+            <a:xfrm>
+              <a:off x="6886164" y="5060742"/>
+              <a:ext cx="1174167" cy="905607"/>
+              <a:chOff x="6886164" y="5060742"/>
+              <a:chExt cx="1174167" cy="905607"/>
+            </a:xfrm>
+          </p:grpSpPr>
+          <p:sp>
+            <p:nvSpPr>
+              <p:cNvPr id="50" name="Rounded Rectangle 49"/>
+              <p:cNvSpPr/>
+              <p:nvPr/>
+            </p:nvSpPr>
+            <p:spPr>
+              <a:xfrm>
+                <a:off x="6886164" y="5060742"/>
+                <a:ext cx="1174167" cy="905607"/>
+              </a:xfrm>
+              <a:prstGeom prst="roundRect">
+                <a:avLst/>
+              </a:prstGeom>
+            </p:spPr>
+            <p:style>
+              <a:lnRef idx="1">
+                <a:schemeClr val="accent5"/>
+              </a:lnRef>
+              <a:fillRef idx="2">
+                <a:schemeClr val="accent5"/>
+              </a:fillRef>
+              <a:effectRef idx="1">
+                <a:schemeClr val="accent5"/>
+              </a:effectRef>
+              <a:fontRef idx="minor">
+                <a:schemeClr val="dk1"/>
+              </a:fontRef>
+            </p:style>
+            <p:txBody>
+              <a:bodyPr rtlCol="0" anchor="ctr"/>
+              <a:lstStyle/>
+              <a:p>
+                <a:pPr algn="ctr"/>
+                <a:r>
+                  <a:rPr lang="en-US" sz="1400" dirty="0" smtClean="0"/>
+                  <a:t>Source 4</a:t>
+                </a:r>
+                <a:endParaRPr lang="en-US" sz="1400" dirty="0" smtClean="0"/>
+              </a:p>
+              <a:p>
+                <a:pPr algn="ctr"/>
+                <a:endParaRPr lang="en-US" sz="1400" dirty="0" smtClean="0"/>
+              </a:p>
+              <a:p>
+                <a:pPr algn="ctr"/>
+                <a:endParaRPr lang="en-US" sz="1400" dirty="0" smtClean="0"/>
+              </a:p>
+              <a:p>
+                <a:pPr algn="ctr"/>
+                <a:endParaRPr lang="en-US" sz="1400" dirty="0"/>
+              </a:p>
+            </p:txBody>
+          </p:sp>
+          <p:pic>
+            <p:nvPicPr>
+              <p:cNvPr id="1036" name="Picture 1035"/>
+              <p:cNvPicPr>
+                <a:picLocks noChangeAspect="1"/>
+              </p:cNvPicPr>
+              <p:nvPr/>
+            </p:nvPicPr>
+            <p:blipFill>
+              <a:blip r:embed="rId3" cstate="print">
+                <a:extLst>
+                  <a:ext uri="{28A0092B-C50C-407E-A947-70E740481C1C}">
+                    <a14:useLocalDpi xmlns:a14="http://schemas.microsoft.com/office/drawing/2010/main" val="0"/>
+                  </a:ext>
+                </a:extLst>
+              </a:blip>
+              <a:stretch>
+                <a:fillRect/>
+              </a:stretch>
+            </p:blipFill>
+            <p:spPr>
+              <a:xfrm>
+                <a:off x="7110744" y="5372045"/>
+                <a:ext cx="693562" cy="522734"/>
+              </a:xfrm>
+              <a:prstGeom prst="rect">
+                <a:avLst/>
+              </a:prstGeom>
+            </p:spPr>
+          </p:pic>
+        </p:grpSp>
+      </p:grpSp>
+      <p:grpSp>
+        <p:nvGrpSpPr>
+          <p:cNvPr id="38" name="Group 37"/>
+          <p:cNvGrpSpPr/>
+          <p:nvPr/>
+        </p:nvGrpSpPr>
+        <p:grpSpPr>
+          <a:xfrm>
+            <a:off x="1352742" y="2362066"/>
+            <a:ext cx="1174167" cy="905607"/>
+            <a:chOff x="6873584" y="3165097"/>
+            <a:chExt cx="1174167" cy="905607"/>
+          </a:xfrm>
+        </p:grpSpPr>
+        <p:sp>
+          <p:nvSpPr>
+            <p:cNvPr id="39" name="Rounded Rectangle 38"/>
+            <p:cNvSpPr/>
+            <p:nvPr/>
+          </p:nvSpPr>
+          <p:spPr>
+            <a:xfrm>
+              <a:off x="6873584" y="3165097"/>
+              <a:ext cx="1174167" cy="905607"/>
+            </a:xfrm>
+            <a:prstGeom prst="roundRect">
+              <a:avLst/>
+            </a:prstGeom>
+          </p:spPr>
+          <p:style>
+            <a:lnRef idx="1">
+              <a:schemeClr val="accent5"/>
+            </a:lnRef>
+            <a:fillRef idx="2">
+              <a:schemeClr val="accent5"/>
+            </a:fillRef>
+            <a:effectRef idx="1">
+              <a:schemeClr val="accent5"/>
+            </a:effectRef>
+            <a:fontRef idx="minor">
+              <a:schemeClr val="dk1"/>
+            </a:fontRef>
+          </p:style>
+          <p:txBody>
+            <a:bodyPr rtlCol="0" anchor="ctr"/>
+            <a:lstStyle/>
+            <a:p>
+              <a:pPr algn="ctr"/>
+              <a:r>
+                <a:rPr lang="en-US" sz="1400" dirty="0" smtClean="0"/>
+                <a:t>Sink 1</a:t>
+              </a:r>
+            </a:p>
+            <a:p>
+              <a:pPr algn="ctr"/>
+              <a:endParaRPr lang="en-US" sz="1400" dirty="0"/>
+            </a:p>
+            <a:p>
+              <a:pPr algn="ctr"/>
+              <a:endParaRPr lang="en-US" sz="1400" dirty="0" smtClean="0"/>
+            </a:p>
+            <a:p>
+              <a:pPr algn="ctr"/>
+              <a:endParaRPr lang="en-US" sz="1400" dirty="0"/>
+            </a:p>
+          </p:txBody>
+        </p:sp>
+        <p:pic>
+          <p:nvPicPr>
+            <p:cNvPr id="42" name="Picture 41"/>
+            <p:cNvPicPr>
+              <a:picLocks noChangeAspect="1"/>
+            </p:cNvPicPr>
+            <p:nvPr/>
+          </p:nvPicPr>
+          <p:blipFill>
+            <a:blip r:embed="rId4" cstate="print">
+              <a:extLst>
+                <a:ext uri="{28A0092B-C50C-407E-A947-70E740481C1C}">
+                  <a14:useLocalDpi xmlns:a14="http://schemas.microsoft.com/office/drawing/2010/main" val="0"/>
+                </a:ext>
+              </a:extLst>
+            </a:blip>
+            <a:stretch>
+              <a:fillRect/>
+            </a:stretch>
+          </p:blipFill>
+          <p:spPr>
+            <a:xfrm>
+              <a:off x="7108928" y="3460051"/>
+              <a:ext cx="703477" cy="530207"/>
+            </a:xfrm>
+            <a:prstGeom prst="rect">
+              <a:avLst/>
+            </a:prstGeom>
+          </p:spPr>
+        </p:pic>
+      </p:grpSp>
+      <p:sp>
+        <p:nvSpPr>
+          <p:cNvPr id="43" name="Rounded Rectangle 42"/>
+          <p:cNvSpPr/>
+          <p:nvPr/>
+        </p:nvSpPr>
+        <p:spPr>
+          <a:xfrm>
+            <a:off x="5506120" y="1752600"/>
+            <a:ext cx="2710736" cy="1676400"/>
+          </a:xfrm>
+          <a:prstGeom prst="roundRect">
+            <a:avLst/>
+          </a:prstGeom>
+        </p:spPr>
+        <p:style>
+          <a:lnRef idx="1">
+            <a:schemeClr val="accent5"/>
+          </a:lnRef>
+          <a:fillRef idx="3">
+            <a:schemeClr val="accent5"/>
+          </a:fillRef>
+          <a:effectRef idx="2">
+            <a:schemeClr val="accent5"/>
+          </a:effectRef>
+          <a:fontRef idx="minor">
+            <a:schemeClr val="lt1"/>
+          </a:fontRef>
+        </p:style>
+        <p:txBody>
+          <a:bodyPr rtlCol="0" anchor="ctr"/>
+          <a:lstStyle/>
+          <a:p>
+            <a:pPr algn="ctr"/>
+            <a:r>
+              <a:rPr lang="en-US" dirty="0" smtClean="0"/>
+              <a:t>Node </a:t>
+            </a:r>
+            <a:r>
+              <a:rPr lang="en-US" dirty="0" smtClean="0"/>
+              <a:t>2</a:t>
+            </a:r>
+            <a:endParaRPr lang="en-US" dirty="0"/>
+          </a:p>
+          <a:p>
+            <a:pPr algn="ctr"/>
+            <a:endParaRPr lang="en-US" dirty="0"/>
+          </a:p>
+          <a:p>
+            <a:pPr algn="ctr"/>
+            <a:endParaRPr lang="en-US" dirty="0"/>
+          </a:p>
+          <a:p>
+            <a:pPr algn="ctr"/>
+            <a:endParaRPr lang="en-US" dirty="0"/>
+          </a:p>
+          <a:p>
+            <a:pPr algn="ctr"/>
+            <a:endParaRPr lang="en-US" dirty="0" smtClean="0"/>
+          </a:p>
+        </p:txBody>
+      </p:sp>
+      <p:grpSp>
+        <p:nvGrpSpPr>
+          <p:cNvPr id="44" name="Group 43"/>
+          <p:cNvGrpSpPr/>
+          <p:nvPr/>
+        </p:nvGrpSpPr>
+        <p:grpSpPr>
+          <a:xfrm>
+            <a:off x="6899131" y="2355276"/>
+            <a:ext cx="1174167" cy="905607"/>
+            <a:chOff x="1235168" y="3165098"/>
+            <a:chExt cx="1174167" cy="905607"/>
+          </a:xfrm>
+        </p:grpSpPr>
+        <p:sp>
+          <p:nvSpPr>
+            <p:cNvPr id="45" name="Rounded Rectangle 44"/>
+            <p:cNvSpPr/>
+            <p:nvPr/>
+          </p:nvSpPr>
+          <p:spPr>
+            <a:xfrm>
+              <a:off x="1235168" y="3165098"/>
+              <a:ext cx="1174167" cy="905607"/>
+            </a:xfrm>
+            <a:prstGeom prst="roundRect">
+              <a:avLst/>
+            </a:prstGeom>
+          </p:spPr>
+          <p:style>
+            <a:lnRef idx="1">
+              <a:schemeClr val="accent5"/>
+            </a:lnRef>
+            <a:fillRef idx="2">
+              <a:schemeClr val="accent5"/>
+            </a:fillRef>
+            <a:effectRef idx="1">
+              <a:schemeClr val="accent5"/>
+            </a:effectRef>
+            <a:fontRef idx="minor">
+              <a:schemeClr val="dk1"/>
+            </a:fontRef>
+          </p:style>
+          <p:txBody>
+            <a:bodyPr rtlCol="0" anchor="ctr"/>
+            <a:lstStyle/>
+            <a:p>
+              <a:pPr algn="ctr"/>
+              <a:r>
+                <a:rPr lang="en-US" sz="1400" dirty="0" smtClean="0"/>
+                <a:t>Source </a:t>
+              </a:r>
+              <a:r>
+                <a:rPr lang="en-US" sz="1400" dirty="0" smtClean="0"/>
+                <a:t>2</a:t>
+              </a:r>
+              <a:endParaRPr lang="en-US" sz="1400" dirty="0" smtClean="0"/>
+            </a:p>
+            <a:p>
+              <a:pPr algn="ctr"/>
+              <a:endParaRPr lang="en-US" sz="1400" dirty="0"/>
+            </a:p>
+            <a:p>
+              <a:pPr algn="ctr"/>
+              <a:endParaRPr lang="en-US" sz="1400" dirty="0" smtClean="0"/>
+            </a:p>
+            <a:p>
+              <a:pPr algn="ctr"/>
+              <a:endParaRPr lang="en-US" sz="1400" dirty="0"/>
+            </a:p>
+          </p:txBody>
+        </p:sp>
+        <p:pic>
+          <p:nvPicPr>
+            <p:cNvPr id="46" name="Picture 45"/>
+            <p:cNvPicPr>
+              <a:picLocks noChangeAspect="1"/>
+            </p:cNvPicPr>
+            <p:nvPr/>
+          </p:nvPicPr>
+          <p:blipFill>
+            <a:blip r:embed="rId2" cstate="print">
+              <a:extLst>
+                <a:ext uri="{28A0092B-C50C-407E-A947-70E740481C1C}">
+                  <a14:useLocalDpi xmlns:a14="http://schemas.microsoft.com/office/drawing/2010/main" val="0"/>
+                </a:ext>
+              </a:extLst>
+            </a:blip>
+            <a:stretch>
+              <a:fillRect/>
+            </a:stretch>
+          </p:blipFill>
+          <p:spPr>
+            <a:xfrm>
+              <a:off x="1473443" y="3460051"/>
+              <a:ext cx="697615" cy="525788"/>
+            </a:xfrm>
+            <a:prstGeom prst="rect">
+              <a:avLst/>
+            </a:prstGeom>
+          </p:spPr>
+        </p:pic>
+      </p:grpSp>
+      <p:grpSp>
+        <p:nvGrpSpPr>
+          <p:cNvPr id="47" name="Group 46"/>
+          <p:cNvGrpSpPr/>
+          <p:nvPr/>
+        </p:nvGrpSpPr>
+        <p:grpSpPr>
+          <a:xfrm>
+            <a:off x="5607198" y="2362066"/>
+            <a:ext cx="1174167" cy="905607"/>
+            <a:chOff x="6873584" y="3165097"/>
+            <a:chExt cx="1174167" cy="905607"/>
+          </a:xfrm>
+        </p:grpSpPr>
+        <p:sp>
+          <p:nvSpPr>
+            <p:cNvPr id="48" name="Rounded Rectangle 47"/>
+            <p:cNvSpPr/>
+            <p:nvPr/>
+          </p:nvSpPr>
+          <p:spPr>
+            <a:xfrm>
+              <a:off x="6873584" y="3165097"/>
+              <a:ext cx="1174167" cy="905607"/>
+            </a:xfrm>
+            <a:prstGeom prst="roundRect">
+              <a:avLst/>
+            </a:prstGeom>
+          </p:spPr>
+          <p:style>
+            <a:lnRef idx="1">
+              <a:schemeClr val="accent5"/>
+            </a:lnRef>
+            <a:fillRef idx="2">
+              <a:schemeClr val="accent5"/>
+            </a:fillRef>
+            <a:effectRef idx="1">
+              <a:schemeClr val="accent5"/>
+            </a:effectRef>
+            <a:fontRef idx="minor">
+              <a:schemeClr val="dk1"/>
+            </a:fontRef>
+          </p:style>
+          <p:txBody>
+            <a:bodyPr rtlCol="0" anchor="ctr"/>
+            <a:lstStyle/>
+            <a:p>
+              <a:pPr algn="ctr"/>
+              <a:r>
+                <a:rPr lang="en-US" sz="1400" dirty="0" smtClean="0"/>
+                <a:t>Sink </a:t>
+              </a:r>
+              <a:r>
+                <a:rPr lang="en-US" sz="1400" dirty="0" smtClean="0"/>
+                <a:t>2</a:t>
+              </a:r>
+              <a:endParaRPr lang="en-US" sz="1400" dirty="0" smtClean="0"/>
+            </a:p>
+            <a:p>
+              <a:pPr algn="ctr"/>
+              <a:endParaRPr lang="en-US" sz="1400" dirty="0"/>
+            </a:p>
+            <a:p>
+              <a:pPr algn="ctr"/>
+              <a:endParaRPr lang="en-US" sz="1400" dirty="0" smtClean="0"/>
+            </a:p>
+            <a:p>
+              <a:pPr algn="ctr"/>
+              <a:endParaRPr lang="en-US" sz="1400" dirty="0"/>
+            </a:p>
+          </p:txBody>
+        </p:sp>
+        <p:pic>
+          <p:nvPicPr>
+            <p:cNvPr id="49" name="Picture 48"/>
+            <p:cNvPicPr>
+              <a:picLocks noChangeAspect="1"/>
+            </p:cNvPicPr>
+            <p:nvPr/>
+          </p:nvPicPr>
+          <p:blipFill>
+            <a:blip r:embed="rId4" cstate="print">
+              <a:extLst>
+                <a:ext uri="{28A0092B-C50C-407E-A947-70E740481C1C}">
+                  <a14:useLocalDpi xmlns:a14="http://schemas.microsoft.com/office/drawing/2010/main" val="0"/>
+                </a:ext>
+              </a:extLst>
+            </a:blip>
+            <a:stretch>
+              <a:fillRect/>
+            </a:stretch>
+          </p:blipFill>
+          <p:spPr>
+            <a:xfrm>
+              <a:off x="7108928" y="3460051"/>
+              <a:ext cx="703477" cy="530207"/>
+            </a:xfrm>
+            <a:prstGeom prst="rect">
+              <a:avLst/>
+            </a:prstGeom>
+          </p:spPr>
+        </p:pic>
+      </p:grpSp>
+      <p:sp>
+        <p:nvSpPr>
+          <p:cNvPr id="53" name="Pentagon 52"/>
+          <p:cNvSpPr/>
+          <p:nvPr/>
+        </p:nvSpPr>
+        <p:spPr>
+          <a:xfrm>
+            <a:off x="4189292" y="2695412"/>
+            <a:ext cx="280851" cy="225335"/>
+          </a:xfrm>
+          <a:prstGeom prst="homePlate">
+            <a:avLst/>
+          </a:prstGeom>
+        </p:spPr>
+        <p:style>
+          <a:lnRef idx="0">
+            <a:schemeClr val="accent4"/>
+          </a:lnRef>
+          <a:fillRef idx="3">
+            <a:schemeClr val="accent4"/>
+          </a:fillRef>
+          <a:effectRef idx="3">
+            <a:schemeClr val="accent4"/>
+          </a:effectRef>
+          <a:fontRef idx="minor">
+            <a:schemeClr val="lt1"/>
+          </a:fontRef>
+        </p:style>
+        <p:txBody>
+          <a:bodyPr rtlCol="0" anchor="ctr"/>
+          <a:lstStyle/>
+          <a:p>
+            <a:pPr algn="ctr"/>
+            <a:endParaRPr lang="en-US" sz="1350"/>
+          </a:p>
+        </p:txBody>
+      </p:sp>
+      <p:cxnSp>
+        <p:nvCxnSpPr>
+          <p:cNvPr id="54" name="Straight Connector 53"/>
+          <p:cNvCxnSpPr>
+            <a:stCxn id="51" idx="3"/>
+          </p:cNvCxnSpPr>
+          <p:nvPr/>
+        </p:nvCxnSpPr>
+        <p:spPr>
+          <a:xfrm flipV="1">
+            <a:off x="3818842" y="2808079"/>
+            <a:ext cx="370450" cy="1"/>
+          </a:xfrm>
+          <a:prstGeom prst="line">
+            <a:avLst/>
+          </a:prstGeom>
+          <a:ln w="38100"/>
+        </p:spPr>
+        <p:style>
+          <a:lnRef idx="1">
+            <a:schemeClr val="dk1"/>
+          </a:lnRef>
+          <a:fillRef idx="0">
+            <a:schemeClr val="dk1"/>
+          </a:fillRef>
+          <a:effectRef idx="0">
+            <a:schemeClr val="dk1"/>
+          </a:effectRef>
+          <a:fontRef idx="minor">
+            <a:schemeClr val="tx1"/>
+          </a:fontRef>
+        </p:style>
+      </p:cxnSp>
+      <p:sp>
+        <p:nvSpPr>
+          <p:cNvPr id="55" name="Pentagon 54"/>
+          <p:cNvSpPr/>
+          <p:nvPr/>
+        </p:nvSpPr>
+        <p:spPr>
+          <a:xfrm>
+            <a:off x="3556528" y="5451515"/>
+            <a:ext cx="280851" cy="225335"/>
+          </a:xfrm>
+          <a:prstGeom prst="homePlate">
+            <a:avLst/>
+          </a:prstGeom>
+        </p:spPr>
+        <p:style>
+          <a:lnRef idx="0">
+            <a:schemeClr val="accent4"/>
+          </a:lnRef>
+          <a:fillRef idx="3">
+            <a:schemeClr val="accent4"/>
+          </a:fillRef>
+          <a:effectRef idx="3">
+            <a:schemeClr val="accent4"/>
+          </a:effectRef>
+          <a:fontRef idx="minor">
+            <a:schemeClr val="lt1"/>
+          </a:fontRef>
+        </p:style>
+        <p:txBody>
+          <a:bodyPr rtlCol="0" anchor="ctr"/>
+          <a:lstStyle/>
+          <a:p>
+            <a:pPr algn="ctr"/>
+            <a:endParaRPr lang="en-US" sz="1350"/>
+          </a:p>
+        </p:txBody>
+      </p:sp>
+      <p:cxnSp>
+        <p:nvCxnSpPr>
+          <p:cNvPr id="56" name="Straight Connector 55"/>
+          <p:cNvCxnSpPr/>
+          <p:nvPr/>
+        </p:nvCxnSpPr>
+        <p:spPr>
+          <a:xfrm flipV="1">
+            <a:off x="3186078" y="5564182"/>
+            <a:ext cx="370450" cy="1"/>
+          </a:xfrm>
+          <a:prstGeom prst="line">
+            <a:avLst/>
+          </a:prstGeom>
+          <a:ln w="38100"/>
+        </p:spPr>
+        <p:style>
+          <a:lnRef idx="1">
+            <a:schemeClr val="dk1"/>
+          </a:lnRef>
+          <a:fillRef idx="0">
+            <a:schemeClr val="dk1"/>
+          </a:fillRef>
+          <a:effectRef idx="0">
+            <a:schemeClr val="dk1"/>
+          </a:effectRef>
+          <a:fontRef idx="minor">
+            <a:schemeClr val="tx1"/>
+          </a:fontRef>
+        </p:style>
+      </p:cxnSp>
+      <p:sp>
+        <p:nvSpPr>
+          <p:cNvPr id="57" name="Pentagon 56"/>
+          <p:cNvSpPr/>
+          <p:nvPr/>
+        </p:nvSpPr>
+        <p:spPr>
+          <a:xfrm>
+            <a:off x="7835021" y="5451515"/>
+            <a:ext cx="280851" cy="225335"/>
+          </a:xfrm>
+          <a:prstGeom prst="homePlate">
+            <a:avLst/>
+          </a:prstGeom>
+        </p:spPr>
+        <p:style>
+          <a:lnRef idx="0">
+            <a:schemeClr val="accent4"/>
+          </a:lnRef>
+          <a:fillRef idx="3">
+            <a:schemeClr val="accent4"/>
+          </a:fillRef>
+          <a:effectRef idx="3">
+            <a:schemeClr val="accent4"/>
+          </a:effectRef>
+          <a:fontRef idx="minor">
+            <a:schemeClr val="lt1"/>
+          </a:fontRef>
+        </p:style>
+        <p:txBody>
+          <a:bodyPr rtlCol="0" anchor="ctr"/>
+          <a:lstStyle/>
+          <a:p>
+            <a:pPr algn="ctr"/>
+            <a:endParaRPr lang="en-US" sz="1350"/>
+          </a:p>
+        </p:txBody>
+      </p:sp>
+      <p:cxnSp>
+        <p:nvCxnSpPr>
+          <p:cNvPr id="58" name="Straight Connector 57"/>
+          <p:cNvCxnSpPr/>
+          <p:nvPr/>
+        </p:nvCxnSpPr>
+        <p:spPr>
+          <a:xfrm flipV="1">
+            <a:off x="7464571" y="5564182"/>
+            <a:ext cx="370450" cy="1"/>
+          </a:xfrm>
+          <a:prstGeom prst="line">
+            <a:avLst/>
+          </a:prstGeom>
+          <a:ln w="38100"/>
+        </p:spPr>
+        <p:style>
+          <a:lnRef idx="1">
+            <a:schemeClr val="dk1"/>
+          </a:lnRef>
+          <a:fillRef idx="0">
+            <a:schemeClr val="dk1"/>
+          </a:fillRef>
+          <a:effectRef idx="0">
+            <a:schemeClr val="dk1"/>
+          </a:effectRef>
+          <a:fontRef idx="minor">
+            <a:schemeClr val="tx1"/>
+          </a:fontRef>
+        </p:style>
+      </p:cxnSp>
+      <p:sp>
+        <p:nvSpPr>
+          <p:cNvPr id="59" name="Pentagon 58"/>
+          <p:cNvSpPr/>
+          <p:nvPr/>
+        </p:nvSpPr>
+        <p:spPr>
+          <a:xfrm>
+            <a:off x="8429824" y="2695412"/>
+            <a:ext cx="280851" cy="225335"/>
+          </a:xfrm>
+          <a:prstGeom prst="homePlate">
+            <a:avLst/>
+          </a:prstGeom>
+        </p:spPr>
+        <p:style>
+          <a:lnRef idx="0">
+            <a:schemeClr val="accent4"/>
+          </a:lnRef>
+          <a:fillRef idx="3">
+            <a:schemeClr val="accent4"/>
+          </a:fillRef>
+          <a:effectRef idx="3">
+            <a:schemeClr val="accent4"/>
+          </a:effectRef>
+          <a:fontRef idx="minor">
+            <a:schemeClr val="lt1"/>
+          </a:fontRef>
+        </p:style>
+        <p:txBody>
+          <a:bodyPr rtlCol="0" anchor="ctr"/>
+          <a:lstStyle/>
+          <a:p>
+            <a:pPr algn="ctr"/>
+            <a:endParaRPr lang="en-US" sz="1350"/>
+          </a:p>
+        </p:txBody>
+      </p:sp>
+      <p:cxnSp>
+        <p:nvCxnSpPr>
+          <p:cNvPr id="60" name="Straight Connector 59"/>
+          <p:cNvCxnSpPr/>
+          <p:nvPr/>
+        </p:nvCxnSpPr>
+        <p:spPr>
+          <a:xfrm flipV="1">
+            <a:off x="8059374" y="2808079"/>
+            <a:ext cx="370450" cy="1"/>
+          </a:xfrm>
+          <a:prstGeom prst="line">
+            <a:avLst/>
+          </a:prstGeom>
+          <a:ln w="38100"/>
+        </p:spPr>
+        <p:style>
+          <a:lnRef idx="1">
+            <a:schemeClr val="dk1"/>
+          </a:lnRef>
+          <a:fillRef idx="0">
+            <a:schemeClr val="dk1"/>
+          </a:fillRef>
+          <a:effectRef idx="0">
+            <a:schemeClr val="dk1"/>
+          </a:effectRef>
+          <a:fontRef idx="minor">
+            <a:schemeClr val="tx1"/>
+          </a:fontRef>
+        </p:style>
+      </p:cxnSp>
+      <p:cxnSp>
+        <p:nvCxnSpPr>
+          <p:cNvPr id="61" name="Elbow Connector 60"/>
+          <p:cNvCxnSpPr>
+            <a:stCxn id="59" idx="3"/>
+            <a:endCxn id="66" idx="1"/>
+          </p:cNvCxnSpPr>
+          <p:nvPr/>
+        </p:nvCxnSpPr>
+        <p:spPr>
+          <a:xfrm flipH="1">
+            <a:off x="934197" y="2808080"/>
+            <a:ext cx="7776478" cy="12700"/>
+          </a:xfrm>
+          <a:prstGeom prst="bentConnector5">
+            <a:avLst>
+              <a:gd name="adj1" fmla="val -2940"/>
+              <a:gd name="adj2" fmla="val -14274394"/>
+              <a:gd name="adj3" fmla="val 103731"/>
+            </a:avLst>
+          </a:prstGeom>
+          <a:ln w="50800">
+            <a:tailEnd type="triangle"/>
+          </a:ln>
+        </p:spPr>
+        <p:style>
+          <a:lnRef idx="1">
+            <a:schemeClr val="dk1"/>
+          </a:lnRef>
+          <a:fillRef idx="0">
+            <a:schemeClr val="dk1"/>
+          </a:fillRef>
+          <a:effectRef idx="0">
+            <a:schemeClr val="dk1"/>
+          </a:effectRef>
+          <a:fontRef idx="minor">
+            <a:schemeClr val="tx1"/>
+          </a:fontRef>
+        </p:style>
+      </p:cxnSp>
+      <p:sp>
+        <p:nvSpPr>
+          <p:cNvPr id="66" name="Chevron 65"/>
+          <p:cNvSpPr/>
+          <p:nvPr/>
+        </p:nvSpPr>
+        <p:spPr>
+          <a:xfrm>
+            <a:off x="821529" y="2695412"/>
+            <a:ext cx="280851" cy="225335"/>
+          </a:xfrm>
+          <a:prstGeom prst="chevron">
+            <a:avLst/>
+          </a:prstGeom>
+        </p:spPr>
+        <p:style>
+          <a:lnRef idx="0">
+            <a:schemeClr val="accent3"/>
+          </a:lnRef>
+          <a:fillRef idx="3">
+            <a:schemeClr val="accent3"/>
+          </a:fillRef>
+          <a:effectRef idx="3">
+            <a:schemeClr val="accent3"/>
+          </a:effectRef>
+          <a:fontRef idx="minor">
+            <a:schemeClr val="lt1"/>
+          </a:fontRef>
+        </p:style>
+        <p:txBody>
+          <a:bodyPr rtlCol="0" anchor="ctr"/>
+          <a:lstStyle/>
+          <a:p>
+            <a:pPr algn="ctr"/>
+            <a:endParaRPr lang="en-US" sz="1350">
+              <a:solidFill>
+                <a:schemeClr val="tx1"/>
+              </a:solidFill>
+            </a:endParaRPr>
+          </a:p>
+        </p:txBody>
+      </p:sp>
+      <p:cxnSp>
+        <p:nvCxnSpPr>
+          <p:cNvPr id="67" name="Straight Connector 66"/>
+          <p:cNvCxnSpPr>
+            <a:stCxn id="66" idx="3"/>
+          </p:cNvCxnSpPr>
+          <p:nvPr/>
+        </p:nvCxnSpPr>
+        <p:spPr>
+          <a:xfrm>
+            <a:off x="1102379" y="2808079"/>
+            <a:ext cx="261257" cy="0"/>
+          </a:xfrm>
+          <a:prstGeom prst="line">
+            <a:avLst/>
+          </a:prstGeom>
+          <a:ln w="38100"/>
+        </p:spPr>
+        <p:style>
+          <a:lnRef idx="1">
+            <a:schemeClr val="dk1"/>
+          </a:lnRef>
+          <a:fillRef idx="0">
+            <a:schemeClr val="dk1"/>
+          </a:fillRef>
+          <a:effectRef idx="0">
+            <a:schemeClr val="dk1"/>
+          </a:effectRef>
+          <a:fontRef idx="minor">
+            <a:schemeClr val="tx1"/>
+          </a:fontRef>
+        </p:style>
+      </p:cxnSp>
+      <p:sp>
+        <p:nvSpPr>
+          <p:cNvPr id="68" name="Chevron 67"/>
+          <p:cNvSpPr/>
+          <p:nvPr/>
+        </p:nvSpPr>
+        <p:spPr>
+          <a:xfrm>
+            <a:off x="5071427" y="2695411"/>
+            <a:ext cx="280851" cy="225335"/>
+          </a:xfrm>
+          <a:prstGeom prst="chevron">
+            <a:avLst/>
+          </a:prstGeom>
+        </p:spPr>
+        <p:style>
+          <a:lnRef idx="0">
+            <a:schemeClr val="accent3"/>
+          </a:lnRef>
+          <a:fillRef idx="3">
+            <a:schemeClr val="accent3"/>
+          </a:fillRef>
+          <a:effectRef idx="3">
+            <a:schemeClr val="accent3"/>
+          </a:effectRef>
+          <a:fontRef idx="minor">
+            <a:schemeClr val="lt1"/>
+          </a:fontRef>
+        </p:style>
+        <p:txBody>
+          <a:bodyPr rtlCol="0" anchor="ctr"/>
+          <a:lstStyle/>
+          <a:p>
+            <a:pPr algn="ctr"/>
+            <a:endParaRPr lang="en-US" sz="1350">
+              <a:solidFill>
+                <a:schemeClr val="tx1"/>
+              </a:solidFill>
+            </a:endParaRPr>
+          </a:p>
+        </p:txBody>
+      </p:sp>
+      <p:cxnSp>
+        <p:nvCxnSpPr>
+          <p:cNvPr id="69" name="Straight Connector 68"/>
+          <p:cNvCxnSpPr>
+            <a:stCxn id="68" idx="3"/>
+          </p:cNvCxnSpPr>
+          <p:nvPr/>
+        </p:nvCxnSpPr>
+        <p:spPr>
+          <a:xfrm>
+            <a:off x="5352277" y="2808078"/>
+            <a:ext cx="261257" cy="0"/>
+          </a:xfrm>
+          <a:prstGeom prst="line">
+            <a:avLst/>
+          </a:prstGeom>
+          <a:ln w="38100"/>
+        </p:spPr>
+        <p:style>
+          <a:lnRef idx="1">
+            <a:schemeClr val="dk1"/>
+          </a:lnRef>
+          <a:fillRef idx="0">
+            <a:schemeClr val="dk1"/>
+          </a:fillRef>
+          <a:effectRef idx="0">
+            <a:schemeClr val="dk1"/>
+          </a:effectRef>
+          <a:fontRef idx="minor">
+            <a:schemeClr val="tx1"/>
+          </a:fontRef>
+        </p:style>
+      </p:cxnSp>
+      <p:cxnSp>
+        <p:nvCxnSpPr>
+          <p:cNvPr id="73" name="Elbow Connector 72"/>
+          <p:cNvCxnSpPr>
+            <a:stCxn id="57" idx="3"/>
+            <a:endCxn id="68" idx="1"/>
+          </p:cNvCxnSpPr>
+          <p:nvPr/>
+        </p:nvCxnSpPr>
+        <p:spPr>
+          <a:xfrm flipH="1" flipV="1">
+            <a:off x="5184095" y="2808079"/>
+            <a:ext cx="2931777" cy="2756104"/>
+          </a:xfrm>
+          <a:prstGeom prst="bentConnector5">
+            <a:avLst>
+              <a:gd name="adj1" fmla="val -7797"/>
+              <a:gd name="adj2" fmla="val 50000"/>
+              <a:gd name="adj3" fmla="val 109297"/>
+            </a:avLst>
+          </a:prstGeom>
+          <a:ln w="50800">
+            <a:tailEnd type="triangle"/>
+          </a:ln>
+        </p:spPr>
+        <p:style>
+          <a:lnRef idx="1">
+            <a:schemeClr val="dk1"/>
+          </a:lnRef>
+          <a:fillRef idx="0">
+            <a:schemeClr val="dk1"/>
+          </a:fillRef>
+          <a:effectRef idx="0">
+            <a:schemeClr val="dk1"/>
+          </a:effectRef>
+          <a:fontRef idx="minor">
+            <a:schemeClr val="tx1"/>
+          </a:fontRef>
+        </p:style>
+      </p:cxnSp>
+      <p:cxnSp>
+        <p:nvCxnSpPr>
+          <p:cNvPr id="76" name="Elbow Connector 75"/>
+          <p:cNvCxnSpPr>
+            <a:stCxn id="55" idx="3"/>
+            <a:endCxn id="68" idx="1"/>
+          </p:cNvCxnSpPr>
+          <p:nvPr/>
+        </p:nvCxnSpPr>
+        <p:spPr>
+          <a:xfrm flipV="1">
+            <a:off x="3837379" y="2808079"/>
+            <a:ext cx="1346716" cy="2756104"/>
+          </a:xfrm>
+          <a:prstGeom prst="bentConnector3">
+            <a:avLst>
+              <a:gd name="adj1" fmla="val 70892"/>
+            </a:avLst>
+          </a:prstGeom>
+          <a:ln w="50800">
+            <a:tailEnd type="triangle"/>
+          </a:ln>
+        </p:spPr>
+        <p:style>
+          <a:lnRef idx="1">
+            <a:schemeClr val="dk1"/>
+          </a:lnRef>
+          <a:fillRef idx="0">
+            <a:schemeClr val="dk1"/>
+          </a:fillRef>
+          <a:effectRef idx="0">
+            <a:schemeClr val="dk1"/>
+          </a:effectRef>
+          <a:fontRef idx="minor">
+            <a:schemeClr val="tx1"/>
+          </a:fontRef>
+        </p:style>
+      </p:cxnSp>
+      <p:cxnSp>
+        <p:nvCxnSpPr>
+          <p:cNvPr id="80" name="Elbow Connector 79"/>
+          <p:cNvCxnSpPr>
+            <a:stCxn id="53" idx="3"/>
+            <a:endCxn id="68" idx="1"/>
+          </p:cNvCxnSpPr>
+          <p:nvPr/>
+        </p:nvCxnSpPr>
+        <p:spPr>
+          <a:xfrm flipV="1">
+            <a:off x="4470143" y="2808079"/>
+            <a:ext cx="713952" cy="1"/>
+          </a:xfrm>
+          <a:prstGeom prst="bentConnector3">
+            <a:avLst>
+              <a:gd name="adj1" fmla="val 50000"/>
+            </a:avLst>
+          </a:prstGeom>
+          <a:ln w="50800">
+            <a:tailEnd type="triangle"/>
+          </a:ln>
+        </p:spPr>
+        <p:style>
+          <a:lnRef idx="1">
+            <a:schemeClr val="dk1"/>
+          </a:lnRef>
+          <a:fillRef idx="0">
+            <a:schemeClr val="dk1"/>
+          </a:fillRef>
+          <a:effectRef idx="0">
+            <a:schemeClr val="dk1"/>
+          </a:effectRef>
+          <a:fontRef idx="minor">
+            <a:schemeClr val="tx1"/>
+          </a:fontRef>
+        </p:style>
+      </p:cxnSp>
+      <p:cxnSp>
+        <p:nvCxnSpPr>
+          <p:cNvPr id="85" name="Elbow Connector 84"/>
+          <p:cNvCxnSpPr>
+            <a:stCxn id="39" idx="0"/>
+            <a:endCxn id="45" idx="0"/>
+          </p:cNvCxnSpPr>
+          <p:nvPr/>
+        </p:nvCxnSpPr>
+        <p:spPr>
+          <a:xfrm rot="5400000" flipH="1" flipV="1">
+            <a:off x="4709625" y="-414523"/>
+            <a:ext cx="6790" cy="5546389"/>
+          </a:xfrm>
+          <a:prstGeom prst="bentConnector3">
+            <a:avLst>
+              <a:gd name="adj1" fmla="val 14991252"/>
+            </a:avLst>
+          </a:prstGeom>
+          <a:ln w="50800">
+            <a:solidFill>
+              <a:srgbClr val="C00000"/>
+            </a:solidFill>
+            <a:prstDash val="sysDot"/>
+            <a:tailEnd type="triangle"/>
+          </a:ln>
+        </p:spPr>
+        <p:style>
+          <a:lnRef idx="1">
+            <a:schemeClr val="dk1"/>
+          </a:lnRef>
+          <a:fillRef idx="0">
+            <a:schemeClr val="dk1"/>
+          </a:fillRef>
+          <a:effectRef idx="0">
+            <a:schemeClr val="dk1"/>
+          </a:effectRef>
+          <a:fontRef idx="minor">
+            <a:schemeClr val="tx1"/>
+          </a:fontRef>
+        </p:style>
+      </p:cxnSp>
+      <p:cxnSp>
+        <p:nvCxnSpPr>
+          <p:cNvPr id="92" name="Elbow Connector 91"/>
+          <p:cNvCxnSpPr/>
+          <p:nvPr/>
+        </p:nvCxnSpPr>
+        <p:spPr>
+          <a:xfrm rot="16200000" flipV="1">
+            <a:off x="4439918" y="1809716"/>
+            <a:ext cx="6790" cy="2962523"/>
+          </a:xfrm>
+          <a:prstGeom prst="bentConnector3">
+            <a:avLst>
+              <a:gd name="adj1" fmla="val -16604168"/>
+            </a:avLst>
+          </a:prstGeom>
+          <a:ln w="50800">
+            <a:solidFill>
+              <a:srgbClr val="C00000"/>
+            </a:solidFill>
+            <a:prstDash val="sysDot"/>
+            <a:tailEnd type="triangle"/>
+          </a:ln>
+        </p:spPr>
+        <p:style>
+          <a:lnRef idx="1">
+            <a:schemeClr val="dk1"/>
+          </a:lnRef>
+          <a:fillRef idx="0">
+            <a:schemeClr val="dk1"/>
+          </a:fillRef>
+          <a:effectRef idx="0">
+            <a:schemeClr val="dk1"/>
+          </a:effectRef>
+          <a:fontRef idx="minor">
+            <a:schemeClr val="tx1"/>
+          </a:fontRef>
+        </p:style>
+      </p:cxnSp>
+      <p:cxnSp>
+        <p:nvCxnSpPr>
+          <p:cNvPr id="96" name="Elbow Connector 95"/>
+          <p:cNvCxnSpPr/>
+          <p:nvPr/>
+        </p:nvCxnSpPr>
+        <p:spPr>
+          <a:xfrm rot="5400000">
+            <a:off x="2765263" y="2883732"/>
+            <a:ext cx="2759175" cy="3587249"/>
+          </a:xfrm>
+          <a:prstGeom prst="bentConnector3">
+            <a:avLst>
+              <a:gd name="adj1" fmla="val 115933"/>
+            </a:avLst>
+          </a:prstGeom>
+          <a:ln w="50800">
+            <a:solidFill>
+              <a:srgbClr val="C00000"/>
+            </a:solidFill>
+            <a:prstDash val="sysDot"/>
+            <a:tailEnd type="triangle"/>
+          </a:ln>
+        </p:spPr>
+        <p:style>
+          <a:lnRef idx="1">
+            <a:schemeClr val="dk1"/>
+          </a:lnRef>
+          <a:fillRef idx="0">
+            <a:schemeClr val="dk1"/>
+          </a:fillRef>
+          <a:effectRef idx="0">
+            <a:schemeClr val="dk1"/>
+          </a:effectRef>
+          <a:fontRef idx="minor">
+            <a:schemeClr val="tx1"/>
+          </a:fontRef>
+        </p:style>
+      </p:cxnSp>
+      <p:cxnSp>
+        <p:nvCxnSpPr>
+          <p:cNvPr id="105" name="Elbow Connector 104"/>
+          <p:cNvCxnSpPr>
+            <a:endCxn id="50" idx="2"/>
+          </p:cNvCxnSpPr>
+          <p:nvPr/>
+        </p:nvCxnSpPr>
+        <p:spPr>
+          <a:xfrm rot="16200000" flipH="1">
+            <a:off x="5040776" y="4183694"/>
+            <a:ext cx="2717091" cy="949493"/>
+          </a:xfrm>
+          <a:prstGeom prst="bentConnector3">
+            <a:avLst>
+              <a:gd name="adj1" fmla="val 119739"/>
+            </a:avLst>
+          </a:prstGeom>
+          <a:ln w="50800">
+            <a:solidFill>
+              <a:srgbClr val="C00000"/>
+            </a:solidFill>
+            <a:prstDash val="sysDot"/>
+            <a:tailEnd type="triangle"/>
+          </a:ln>
+        </p:spPr>
+        <p:style>
+          <a:lnRef idx="1">
+            <a:schemeClr val="dk1"/>
+          </a:lnRef>
+          <a:fillRef idx="0">
+            <a:schemeClr val="dk1"/>
+          </a:fillRef>
+          <a:effectRef idx="0">
+            <a:schemeClr val="dk1"/>
+          </a:effectRef>
+          <a:fontRef idx="minor">
+            <a:schemeClr val="tx1"/>
+          </a:fontRef>
+        </p:style>
+      </p:cxnSp>
+      <p:sp>
+        <p:nvSpPr>
+          <p:cNvPr id="125" name="Rounded Rectangle 124"/>
+          <p:cNvSpPr/>
+          <p:nvPr/>
+        </p:nvSpPr>
+        <p:spPr>
+          <a:xfrm>
+            <a:off x="3194116" y="392130"/>
+            <a:ext cx="3001209" cy="503696"/>
+          </a:xfrm>
+          <a:prstGeom prst="roundRect">
+            <a:avLst/>
+          </a:prstGeom>
+        </p:spPr>
+        <p:style>
+          <a:lnRef idx="1">
+            <a:schemeClr val="accent1"/>
+          </a:lnRef>
+          <a:fillRef idx="2">
+            <a:schemeClr val="accent1"/>
+          </a:fillRef>
+          <a:effectRef idx="1">
+            <a:schemeClr val="accent1"/>
+          </a:effectRef>
+          <a:fontRef idx="minor">
+            <a:schemeClr val="dk1"/>
+          </a:fontRef>
+        </p:style>
+        <p:txBody>
+          <a:bodyPr rtlCol="0" anchor="ctr"/>
+          <a:lstStyle/>
+          <a:p>
+            <a:r>
+              <a:rPr lang="en-US" sz="1200" b="1" dirty="0">
+                <a:solidFill>
+                  <a:schemeClr val="tx1"/>
+                </a:solidFill>
+              </a:rPr>
+              <a:t>Application Data Communication </a:t>
+            </a:r>
+            <a:r>
+              <a:rPr lang="en-US" sz="1200" b="1" dirty="0" smtClean="0">
+                <a:solidFill>
+                  <a:schemeClr val="tx1"/>
+                </a:solidFill>
+              </a:rPr>
+              <a:t>Channel</a:t>
+            </a:r>
+            <a:endParaRPr lang="en-US" sz="1200" b="1" dirty="0" smtClean="0">
+              <a:solidFill>
+                <a:srgbClr val="C00000"/>
+              </a:solidFill>
+            </a:endParaRPr>
+          </a:p>
+          <a:p>
+            <a:r>
+              <a:rPr lang="en-US" sz="1200" b="1" dirty="0" smtClean="0">
+                <a:solidFill>
+                  <a:srgbClr val="C00000"/>
+                </a:solidFill>
+              </a:rPr>
+              <a:t>Out-of-Band Communication Channel</a:t>
+            </a:r>
+          </a:p>
+        </p:txBody>
+      </p:sp>
+    </p:spTree>
+    <p:extLst>
+      <p:ext uri="{BB962C8B-B14F-4D97-AF65-F5344CB8AC3E}">
+        <p14:creationId xmlns:p14="http://schemas.microsoft.com/office/powerpoint/2010/main" val="1992787393"/>
+      </p:ext>
+    </p:extLst>
+  </p:cSld>
+  <p:clrMapOvr>
+    <a:masterClrMapping/>
+  </p:clrMapOvr>
+  <p:timing>
+    <p:tnLst>
+      <p:par>
+        <p:cTn id="1" dur="indefinite" restart="never" nodeType="tmRoot"/>
+      </p:par>
+    </p:tnLst>
+  </p:timing>
+</p:sld>
+</file>
+
+<file path=ppt/slides/slide6.xml><?xml version="1.0" encoding="utf-8"?>
+<p:sld xmlns:a="http://schemas.openxmlformats.org/drawingml/2006/main" xmlns:r="http://schemas.openxmlformats.org/officeDocument/2006/relationships" xmlns:p="http://schemas.openxmlformats.org/presentationml/2006/main">
+  <p:cSld>
+    <p:spTree>
+      <p:nvGrpSpPr>
+        <p:cNvPr id="1" name=""/>
+        <p:cNvGrpSpPr/>
+        <p:nvPr/>
+      </p:nvGrpSpPr>
+      <p:grpSpPr>
+        <a:xfrm>
+          <a:off x="0" y="0"/>
+          <a:ext cx="0" cy="0"/>
+          <a:chOff x="0" y="0"/>
+          <a:chExt cx="0" cy="0"/>
+        </a:xfrm>
+      </p:grpSpPr>
+      <p:sp>
+        <p:nvSpPr>
+          <p:cNvPr id="4" name="Flowchart: Process 3"/>
+          <p:cNvSpPr/>
+          <p:nvPr/>
+        </p:nvSpPr>
+        <p:spPr>
+          <a:xfrm>
+            <a:off x="2331720" y="2261507"/>
+            <a:ext cx="1848395" cy="1169126"/>
+          </a:xfrm>
+          <a:prstGeom prst="flowChartProcess">
+            <a:avLst/>
+          </a:prstGeom>
+        </p:spPr>
+        <p:style>
+          <a:lnRef idx="0">
+            <a:schemeClr val="accent1"/>
+          </a:lnRef>
+          <a:fillRef idx="3">
+            <a:schemeClr val="accent1"/>
+          </a:fillRef>
+          <a:effectRef idx="3">
+            <a:schemeClr val="accent1"/>
+          </a:effectRef>
+          <a:fontRef idx="minor">
+            <a:schemeClr val="lt1"/>
+          </a:fontRef>
+        </p:style>
+        <p:txBody>
+          <a:bodyPr rtlCol="0" anchor="ctr"/>
+          <a:lstStyle/>
+          <a:p>
+            <a:pPr algn="ctr"/>
+            <a:r>
+              <a:rPr lang="en-US" sz="1350" dirty="0"/>
+              <a:t>Node 1</a:t>
+            </a:r>
+          </a:p>
+          <a:p>
+            <a:pPr algn="ctr"/>
+            <a:endParaRPr lang="en-US" sz="1350" dirty="0"/>
+          </a:p>
+          <a:p>
+            <a:pPr algn="ctr"/>
+            <a:endParaRPr lang="en-US" sz="1350" dirty="0"/>
+          </a:p>
+          <a:p>
+            <a:pPr algn="ctr"/>
+            <a:endParaRPr lang="en-US" sz="1350" dirty="0"/>
+          </a:p>
+          <a:p>
+            <a:pPr algn="ctr"/>
+            <a:endParaRPr lang="en-US" sz="1350" dirty="0"/>
+          </a:p>
+        </p:txBody>
+      </p:sp>
+      <p:sp>
+        <p:nvSpPr>
+          <p:cNvPr id="5" name="Pentagon 4"/>
+          <p:cNvSpPr/>
+          <p:nvPr/>
+        </p:nvSpPr>
+        <p:spPr>
+          <a:xfrm>
+            <a:off x="4402184" y="2733403"/>
+            <a:ext cx="280851" cy="225335"/>
+          </a:xfrm>
+          <a:prstGeom prst="homePlate">
+            <a:avLst/>
+          </a:prstGeom>
+        </p:spPr>
+        <p:style>
+          <a:lnRef idx="0">
+            <a:schemeClr val="accent4"/>
+          </a:lnRef>
+          <a:fillRef idx="3">
+            <a:schemeClr val="accent4"/>
+          </a:fillRef>
+          <a:effectRef idx="3">
+            <a:schemeClr val="accent4"/>
+          </a:effectRef>
+          <a:fontRef idx="minor">
+            <a:schemeClr val="lt1"/>
+          </a:fontRef>
+        </p:style>
+        <p:txBody>
+          <a:bodyPr rtlCol="0" anchor="ctr"/>
+          <a:lstStyle/>
+          <a:p>
+            <a:pPr algn="ctr"/>
+            <a:endParaRPr lang="en-US" sz="1350"/>
+          </a:p>
+        </p:txBody>
+      </p:sp>
+      <p:sp>
+        <p:nvSpPr>
+          <p:cNvPr id="6" name="Chevron 5"/>
+          <p:cNvSpPr/>
+          <p:nvPr/>
+        </p:nvSpPr>
+        <p:spPr>
+          <a:xfrm>
+            <a:off x="1789613" y="2733403"/>
+            <a:ext cx="280851" cy="225335"/>
+          </a:xfrm>
+          <a:prstGeom prst="chevron">
+            <a:avLst/>
+          </a:prstGeom>
+        </p:spPr>
+        <p:style>
+          <a:lnRef idx="0">
+            <a:schemeClr val="accent3"/>
+          </a:lnRef>
+          <a:fillRef idx="3">
+            <a:schemeClr val="accent3"/>
+          </a:fillRef>
+          <a:effectRef idx="3">
+            <a:schemeClr val="accent3"/>
+          </a:effectRef>
+          <a:fontRef idx="minor">
+            <a:schemeClr val="lt1"/>
+          </a:fontRef>
+        </p:style>
+        <p:txBody>
+          <a:bodyPr rtlCol="0" anchor="ctr"/>
+          <a:lstStyle/>
+          <a:p>
+            <a:pPr algn="ctr"/>
+            <a:endParaRPr lang="en-US" sz="1350">
+              <a:solidFill>
+                <a:schemeClr val="tx1"/>
+              </a:solidFill>
+            </a:endParaRPr>
+          </a:p>
+        </p:txBody>
+      </p:sp>
+      <p:cxnSp>
+        <p:nvCxnSpPr>
+          <p:cNvPr id="8" name="Straight Connector 7"/>
+          <p:cNvCxnSpPr>
+            <a:stCxn id="6" idx="3"/>
+            <a:endCxn id="4" idx="1"/>
+          </p:cNvCxnSpPr>
+          <p:nvPr/>
+        </p:nvCxnSpPr>
+        <p:spPr>
+          <a:xfrm>
+            <a:off x="2070463" y="2846070"/>
+            <a:ext cx="261257" cy="0"/>
+          </a:xfrm>
+          <a:prstGeom prst="line">
+            <a:avLst/>
+          </a:prstGeom>
+          <a:ln w="38100"/>
+        </p:spPr>
+        <p:style>
+          <a:lnRef idx="1">
+            <a:schemeClr val="dk1"/>
+          </a:lnRef>
+          <a:fillRef idx="0">
+            <a:schemeClr val="dk1"/>
+          </a:fillRef>
+          <a:effectRef idx="0">
+            <a:schemeClr val="dk1"/>
+          </a:effectRef>
+          <a:fontRef idx="minor">
+            <a:schemeClr val="tx1"/>
+          </a:fontRef>
+        </p:style>
+      </p:cxnSp>
+      <p:cxnSp>
+        <p:nvCxnSpPr>
+          <p:cNvPr id="9" name="Straight Connector 8"/>
+          <p:cNvCxnSpPr/>
+          <p:nvPr/>
+        </p:nvCxnSpPr>
+        <p:spPr>
+          <a:xfrm>
+            <a:off x="4180115" y="2846070"/>
+            <a:ext cx="222069" cy="0"/>
+          </a:xfrm>
+          <a:prstGeom prst="line">
+            <a:avLst/>
+          </a:prstGeom>
+          <a:ln w="38100"/>
+        </p:spPr>
+        <p:style>
+          <a:lnRef idx="1">
+            <a:schemeClr val="dk1"/>
+          </a:lnRef>
+          <a:fillRef idx="0">
+            <a:schemeClr val="dk1"/>
+          </a:fillRef>
+          <a:effectRef idx="0">
+            <a:schemeClr val="dk1"/>
+          </a:effectRef>
+          <a:fontRef idx="minor">
+            <a:schemeClr val="tx1"/>
+          </a:fontRef>
+        </p:style>
+      </p:cxnSp>
+      <p:sp>
+        <p:nvSpPr>
+          <p:cNvPr id="12" name="Flowchart: Process 11"/>
+          <p:cNvSpPr/>
+          <p:nvPr/>
+        </p:nvSpPr>
+        <p:spPr>
+          <a:xfrm>
+            <a:off x="5753576" y="2261507"/>
+            <a:ext cx="1848395" cy="1169126"/>
+          </a:xfrm>
+          <a:prstGeom prst="flowChartProcess">
+            <a:avLst/>
+          </a:prstGeom>
+        </p:spPr>
+        <p:style>
+          <a:lnRef idx="0">
+            <a:schemeClr val="accent1"/>
+          </a:lnRef>
+          <a:fillRef idx="3">
+            <a:schemeClr val="accent1"/>
+          </a:fillRef>
+          <a:effectRef idx="3">
+            <a:schemeClr val="accent1"/>
+          </a:effectRef>
+          <a:fontRef idx="minor">
+            <a:schemeClr val="lt1"/>
+          </a:fontRef>
+        </p:style>
+        <p:txBody>
+          <a:bodyPr rtlCol="0" anchor="ctr"/>
+          <a:lstStyle/>
+          <a:p>
+            <a:pPr algn="ctr"/>
+            <a:r>
+              <a:rPr lang="en-US" sz="1350" dirty="0"/>
+              <a:t>Node 2</a:t>
+            </a:r>
+          </a:p>
+          <a:p>
+            <a:pPr algn="ctr"/>
+            <a:endParaRPr lang="en-US" sz="1350" dirty="0"/>
+          </a:p>
+          <a:p>
+            <a:pPr algn="ctr"/>
+            <a:endParaRPr lang="en-US" sz="1350" dirty="0"/>
+          </a:p>
+          <a:p>
+            <a:pPr algn="ctr"/>
+            <a:endParaRPr lang="en-US" sz="1350" dirty="0"/>
+          </a:p>
+          <a:p>
+            <a:pPr algn="ctr"/>
+            <a:endParaRPr lang="en-US" sz="1350" dirty="0"/>
+          </a:p>
+        </p:txBody>
+      </p:sp>
+      <p:sp>
+        <p:nvSpPr>
+          <p:cNvPr id="13" name="Pentagon 12"/>
+          <p:cNvSpPr/>
+          <p:nvPr/>
+        </p:nvSpPr>
+        <p:spPr>
+          <a:xfrm>
+            <a:off x="7824040" y="2733403"/>
+            <a:ext cx="280851" cy="225335"/>
+          </a:xfrm>
+          <a:prstGeom prst="homePlate">
+            <a:avLst/>
+          </a:prstGeom>
+        </p:spPr>
+        <p:style>
+          <a:lnRef idx="0">
+            <a:schemeClr val="accent3"/>
+          </a:lnRef>
+          <a:fillRef idx="3">
+            <a:schemeClr val="accent3"/>
+          </a:fillRef>
+          <a:effectRef idx="3">
+            <a:schemeClr val="accent3"/>
+          </a:effectRef>
+          <a:fontRef idx="minor">
+            <a:schemeClr val="lt1"/>
+          </a:fontRef>
+        </p:style>
+        <p:txBody>
+          <a:bodyPr rtlCol="0" anchor="ctr"/>
+          <a:lstStyle/>
+          <a:p>
+            <a:pPr algn="ctr"/>
+            <a:endParaRPr lang="en-US" sz="1350"/>
+          </a:p>
+        </p:txBody>
+      </p:sp>
+      <p:sp>
+        <p:nvSpPr>
+          <p:cNvPr id="14" name="Chevron 13"/>
+          <p:cNvSpPr/>
+          <p:nvPr/>
+        </p:nvSpPr>
+        <p:spPr>
+          <a:xfrm>
+            <a:off x="5211469" y="2733403"/>
+            <a:ext cx="280851" cy="225335"/>
+          </a:xfrm>
+          <a:prstGeom prst="chevron">
+            <a:avLst/>
+          </a:prstGeom>
+        </p:spPr>
+        <p:style>
+          <a:lnRef idx="0">
+            <a:schemeClr val="accent4"/>
+          </a:lnRef>
+          <a:fillRef idx="3">
+            <a:schemeClr val="accent4"/>
+          </a:fillRef>
+          <a:effectRef idx="3">
+            <a:schemeClr val="accent4"/>
+          </a:effectRef>
+          <a:fontRef idx="minor">
+            <a:schemeClr val="lt1"/>
+          </a:fontRef>
+        </p:style>
+        <p:txBody>
+          <a:bodyPr rtlCol="0" anchor="ctr"/>
+          <a:lstStyle/>
+          <a:p>
+            <a:pPr algn="ctr"/>
+            <a:endParaRPr lang="en-US" sz="1350">
+              <a:solidFill>
+                <a:schemeClr val="tx1"/>
+              </a:solidFill>
+            </a:endParaRPr>
+          </a:p>
+        </p:txBody>
+      </p:sp>
+      <p:cxnSp>
+        <p:nvCxnSpPr>
+          <p:cNvPr id="15" name="Straight Connector 14"/>
+          <p:cNvCxnSpPr/>
+          <p:nvPr/>
+        </p:nvCxnSpPr>
+        <p:spPr>
+          <a:xfrm>
+            <a:off x="5492320" y="2846070"/>
+            <a:ext cx="261257" cy="0"/>
+          </a:xfrm>
+          <a:prstGeom prst="line">
+            <a:avLst/>
+          </a:prstGeom>
+          <a:ln w="38100"/>
+        </p:spPr>
+        <p:style>
+          <a:lnRef idx="1">
+            <a:schemeClr val="dk1"/>
+          </a:lnRef>
+          <a:fillRef idx="0">
+            <a:schemeClr val="dk1"/>
+          </a:fillRef>
+          <a:effectRef idx="0">
+            <a:schemeClr val="dk1"/>
+          </a:effectRef>
+          <a:fontRef idx="minor">
+            <a:schemeClr val="tx1"/>
+          </a:fontRef>
+        </p:style>
+      </p:cxnSp>
+      <p:cxnSp>
+        <p:nvCxnSpPr>
+          <p:cNvPr id="16" name="Straight Connector 15"/>
+          <p:cNvCxnSpPr>
+            <a:stCxn id="12" idx="3"/>
+            <a:endCxn id="13" idx="1"/>
+          </p:cNvCxnSpPr>
+          <p:nvPr/>
+        </p:nvCxnSpPr>
+        <p:spPr>
+          <a:xfrm>
+            <a:off x="7601971" y="2846070"/>
+            <a:ext cx="222069" cy="0"/>
+          </a:xfrm>
+          <a:prstGeom prst="line">
+            <a:avLst/>
+          </a:prstGeom>
+          <a:ln w="38100"/>
+        </p:spPr>
+        <p:style>
+          <a:lnRef idx="1">
+            <a:schemeClr val="dk1"/>
+          </a:lnRef>
+          <a:fillRef idx="0">
+            <a:schemeClr val="dk1"/>
+          </a:fillRef>
+          <a:effectRef idx="0">
+            <a:schemeClr val="dk1"/>
+          </a:effectRef>
+          <a:fontRef idx="minor">
+            <a:schemeClr val="tx1"/>
+          </a:fontRef>
+        </p:style>
+      </p:cxnSp>
+      <p:cxnSp>
+        <p:nvCxnSpPr>
+          <p:cNvPr id="18" name="Elbow Connector 17"/>
+          <p:cNvCxnSpPr>
+            <a:stCxn id="5" idx="3"/>
+            <a:endCxn id="14" idx="1"/>
+          </p:cNvCxnSpPr>
+          <p:nvPr/>
+        </p:nvCxnSpPr>
+        <p:spPr>
+          <a:xfrm>
+            <a:off x="4683034" y="2846070"/>
+            <a:ext cx="641102" cy="9525"/>
+          </a:xfrm>
+          <a:prstGeom prst="bentConnector3">
+            <a:avLst>
+              <a:gd name="adj1" fmla="val 50000"/>
+            </a:avLst>
+          </a:prstGeom>
+          <a:ln w="50800">
+            <a:tailEnd type="triangle"/>
+          </a:ln>
+        </p:spPr>
+        <p:style>
+          <a:lnRef idx="1">
+            <a:schemeClr val="dk1"/>
+          </a:lnRef>
+          <a:fillRef idx="0">
+            <a:schemeClr val="dk1"/>
+          </a:fillRef>
+          <a:effectRef idx="0">
+            <a:schemeClr val="dk1"/>
+          </a:effectRef>
+          <a:fontRef idx="minor">
+            <a:schemeClr val="tx1"/>
+          </a:fontRef>
+        </p:style>
+      </p:cxnSp>
+      <p:cxnSp>
+        <p:nvCxnSpPr>
+          <p:cNvPr id="20" name="Elbow Connector 19"/>
+          <p:cNvCxnSpPr>
+            <a:stCxn id="13" idx="3"/>
+            <a:endCxn id="6" idx="1"/>
+          </p:cNvCxnSpPr>
+          <p:nvPr/>
+        </p:nvCxnSpPr>
+        <p:spPr>
+          <a:xfrm flipH="1">
+            <a:off x="1902280" y="2846070"/>
+            <a:ext cx="6202611" cy="9525"/>
+          </a:xfrm>
+          <a:prstGeom prst="bentConnector5">
+            <a:avLst>
+              <a:gd name="adj1" fmla="val -2764"/>
+              <a:gd name="adj2" fmla="val -12392142"/>
+              <a:gd name="adj3" fmla="val 102764"/>
+            </a:avLst>
+          </a:prstGeom>
+          <a:ln w="50800">
+            <a:tailEnd type="triangle"/>
+          </a:ln>
+        </p:spPr>
+        <p:style>
+          <a:lnRef idx="1">
+            <a:schemeClr val="dk1"/>
+          </a:lnRef>
+          <a:fillRef idx="0">
+            <a:schemeClr val="dk1"/>
+          </a:fillRef>
+          <a:effectRef idx="0">
+            <a:schemeClr val="dk1"/>
+          </a:effectRef>
+          <a:fontRef idx="minor">
+            <a:schemeClr val="tx1"/>
+          </a:fontRef>
+        </p:style>
+      </p:cxnSp>
+      <p:sp>
+        <p:nvSpPr>
+          <p:cNvPr id="30" name="Flowchart: Process 29"/>
+          <p:cNvSpPr/>
+          <p:nvPr/>
+        </p:nvSpPr>
+        <p:spPr>
+          <a:xfrm>
+            <a:off x="2331720" y="4426063"/>
+            <a:ext cx="1848395" cy="1169126"/>
+          </a:xfrm>
+          <a:prstGeom prst="flowChartProcess">
+            <a:avLst/>
+          </a:prstGeom>
+        </p:spPr>
+        <p:style>
+          <a:lnRef idx="0">
+            <a:schemeClr val="accent1"/>
+          </a:lnRef>
+          <a:fillRef idx="3">
+            <a:schemeClr val="accent1"/>
+          </a:fillRef>
+          <a:effectRef idx="3">
+            <a:schemeClr val="accent1"/>
+          </a:effectRef>
+          <a:fontRef idx="minor">
+            <a:schemeClr val="lt1"/>
+          </a:fontRef>
+        </p:style>
+        <p:txBody>
+          <a:bodyPr rtlCol="0" anchor="ctr"/>
+          <a:lstStyle/>
+          <a:p>
+            <a:pPr algn="ctr"/>
+            <a:r>
+              <a:rPr lang="en-US" sz="1350" dirty="0"/>
+              <a:t>Node 3</a:t>
+            </a:r>
+          </a:p>
+          <a:p>
+            <a:pPr algn="ctr"/>
+            <a:endParaRPr lang="en-US" sz="1350" dirty="0"/>
+          </a:p>
+          <a:p>
+            <a:pPr algn="ctr"/>
+            <a:endParaRPr lang="en-US" sz="1350" dirty="0"/>
+          </a:p>
+          <a:p>
+            <a:pPr algn="ctr"/>
+            <a:endParaRPr lang="en-US" sz="1350" dirty="0"/>
+          </a:p>
+          <a:p>
+            <a:pPr algn="ctr"/>
+            <a:endParaRPr lang="en-US" sz="1350" dirty="0"/>
+          </a:p>
+        </p:txBody>
+      </p:sp>
+      <p:sp>
+        <p:nvSpPr>
+          <p:cNvPr id="31" name="Pentagon 30"/>
+          <p:cNvSpPr/>
+          <p:nvPr/>
+        </p:nvSpPr>
+        <p:spPr>
+          <a:xfrm>
+            <a:off x="4402184" y="4897959"/>
+            <a:ext cx="280851" cy="225335"/>
+          </a:xfrm>
+          <a:prstGeom prst="homePlate">
+            <a:avLst/>
+          </a:prstGeom>
+        </p:spPr>
+        <p:style>
+          <a:lnRef idx="0">
+            <a:schemeClr val="accent4"/>
+          </a:lnRef>
+          <a:fillRef idx="3">
+            <a:schemeClr val="accent4"/>
+          </a:fillRef>
+          <a:effectRef idx="3">
+            <a:schemeClr val="accent4"/>
+          </a:effectRef>
+          <a:fontRef idx="minor">
+            <a:schemeClr val="lt1"/>
+          </a:fontRef>
+        </p:style>
+        <p:txBody>
+          <a:bodyPr rtlCol="0" anchor="ctr"/>
+          <a:lstStyle/>
+          <a:p>
+            <a:pPr algn="ctr"/>
+            <a:endParaRPr lang="en-US" sz="1350"/>
+          </a:p>
+        </p:txBody>
+      </p:sp>
+      <p:cxnSp>
+        <p:nvCxnSpPr>
+          <p:cNvPr id="32" name="Straight Connector 31"/>
+          <p:cNvCxnSpPr>
+            <a:stCxn id="30" idx="3"/>
+            <a:endCxn id="31" idx="1"/>
+          </p:cNvCxnSpPr>
+          <p:nvPr/>
+        </p:nvCxnSpPr>
+        <p:spPr>
+          <a:xfrm>
+            <a:off x="4180115" y="5010626"/>
+            <a:ext cx="222069" cy="0"/>
+          </a:xfrm>
+          <a:prstGeom prst="line">
+            <a:avLst/>
+          </a:prstGeom>
+          <a:ln w="38100"/>
+        </p:spPr>
+        <p:style>
+          <a:lnRef idx="1">
+            <a:schemeClr val="dk1"/>
+          </a:lnRef>
+          <a:fillRef idx="0">
+            <a:schemeClr val="dk1"/>
+          </a:fillRef>
+          <a:effectRef idx="0">
+            <a:schemeClr val="dk1"/>
+          </a:effectRef>
+          <a:fontRef idx="minor">
+            <a:schemeClr val="tx1"/>
+          </a:fontRef>
+        </p:style>
+      </p:cxnSp>
+      <p:sp>
+        <p:nvSpPr>
+          <p:cNvPr id="33" name="Flowchart: Process 32"/>
+          <p:cNvSpPr/>
+          <p:nvPr/>
+        </p:nvSpPr>
+        <p:spPr>
+          <a:xfrm>
+            <a:off x="5753576" y="4426063"/>
+            <a:ext cx="1848395" cy="1169126"/>
+          </a:xfrm>
+          <a:prstGeom prst="flowChartProcess">
+            <a:avLst/>
+          </a:prstGeom>
+        </p:spPr>
+        <p:style>
+          <a:lnRef idx="0">
+            <a:schemeClr val="accent1"/>
+          </a:lnRef>
+          <a:fillRef idx="3">
+            <a:schemeClr val="accent1"/>
+          </a:fillRef>
+          <a:effectRef idx="3">
+            <a:schemeClr val="accent1"/>
+          </a:effectRef>
+          <a:fontRef idx="minor">
+            <a:schemeClr val="lt1"/>
+          </a:fontRef>
+        </p:style>
+        <p:txBody>
+          <a:bodyPr rtlCol="0" anchor="ctr"/>
+          <a:lstStyle/>
+          <a:p>
+            <a:pPr algn="ctr"/>
+            <a:r>
+              <a:rPr lang="en-US" sz="1350"/>
+              <a:t>Node 4</a:t>
+            </a:r>
+            <a:endParaRPr lang="en-US" sz="1350" dirty="0"/>
+          </a:p>
+          <a:p>
+            <a:pPr algn="ctr"/>
+            <a:endParaRPr lang="en-US" sz="1350" dirty="0"/>
+          </a:p>
+          <a:p>
+            <a:pPr algn="ctr"/>
+            <a:endParaRPr lang="en-US" sz="1350" dirty="0"/>
+          </a:p>
+          <a:p>
+            <a:pPr algn="ctr"/>
+            <a:endParaRPr lang="en-US" sz="1350" dirty="0"/>
+          </a:p>
+          <a:p>
+            <a:pPr algn="ctr"/>
+            <a:endParaRPr lang="en-US" sz="1350" dirty="0"/>
+          </a:p>
+        </p:txBody>
+      </p:sp>
+      <p:sp>
+        <p:nvSpPr>
+          <p:cNvPr id="34" name="Pentagon 33"/>
+          <p:cNvSpPr/>
+          <p:nvPr/>
+        </p:nvSpPr>
+        <p:spPr>
+          <a:xfrm>
+            <a:off x="7824040" y="4897959"/>
+            <a:ext cx="280851" cy="225335"/>
+          </a:xfrm>
+          <a:prstGeom prst="homePlate">
+            <a:avLst/>
+          </a:prstGeom>
+        </p:spPr>
+        <p:style>
+          <a:lnRef idx="0">
+            <a:schemeClr val="accent4"/>
+          </a:lnRef>
+          <a:fillRef idx="3">
+            <a:schemeClr val="accent4"/>
+          </a:fillRef>
+          <a:effectRef idx="3">
+            <a:schemeClr val="accent4"/>
+          </a:effectRef>
+          <a:fontRef idx="minor">
+            <a:schemeClr val="lt1"/>
+          </a:fontRef>
+        </p:style>
+        <p:txBody>
+          <a:bodyPr rtlCol="0" anchor="ctr"/>
+          <a:lstStyle/>
+          <a:p>
+            <a:pPr algn="ctr"/>
+            <a:endParaRPr lang="en-US" sz="1350"/>
+          </a:p>
+        </p:txBody>
+      </p:sp>
+      <p:cxnSp>
+        <p:nvCxnSpPr>
+          <p:cNvPr id="35" name="Straight Connector 34"/>
+          <p:cNvCxnSpPr>
+            <a:stCxn id="33" idx="3"/>
+            <a:endCxn id="34" idx="1"/>
+          </p:cNvCxnSpPr>
+          <p:nvPr/>
+        </p:nvCxnSpPr>
+        <p:spPr>
+          <a:xfrm>
+            <a:off x="7601971" y="5010626"/>
+            <a:ext cx="222069" cy="0"/>
+          </a:xfrm>
+          <a:prstGeom prst="line">
+            <a:avLst/>
+          </a:prstGeom>
+          <a:ln w="38100"/>
+        </p:spPr>
+        <p:style>
+          <a:lnRef idx="1">
+            <a:schemeClr val="dk1"/>
+          </a:lnRef>
+          <a:fillRef idx="0">
+            <a:schemeClr val="dk1"/>
+          </a:fillRef>
+          <a:effectRef idx="0">
+            <a:schemeClr val="dk1"/>
+          </a:effectRef>
+          <a:fontRef idx="minor">
+            <a:schemeClr val="tx1"/>
+          </a:fontRef>
+        </p:style>
+      </p:cxnSp>
+      <p:cxnSp>
+        <p:nvCxnSpPr>
+          <p:cNvPr id="46" name="Elbow Connector 45"/>
+          <p:cNvCxnSpPr>
+            <a:stCxn id="31" idx="3"/>
+            <a:endCxn id="14" idx="1"/>
+          </p:cNvCxnSpPr>
+          <p:nvPr/>
+        </p:nvCxnSpPr>
+        <p:spPr>
+          <a:xfrm flipV="1">
+            <a:off x="4683034" y="2846071"/>
+            <a:ext cx="641102" cy="2164556"/>
+          </a:xfrm>
+          <a:prstGeom prst="bentConnector3">
+            <a:avLst>
+              <a:gd name="adj1" fmla="val 50000"/>
+            </a:avLst>
+          </a:prstGeom>
+          <a:ln w="50800">
+            <a:tailEnd type="triangle"/>
+          </a:ln>
+        </p:spPr>
+        <p:style>
+          <a:lnRef idx="1">
+            <a:schemeClr val="dk1"/>
+          </a:lnRef>
+          <a:fillRef idx="0">
+            <a:schemeClr val="dk1"/>
+          </a:fillRef>
+          <a:effectRef idx="0">
+            <a:schemeClr val="dk1"/>
+          </a:effectRef>
+          <a:fontRef idx="minor">
+            <a:schemeClr val="tx1"/>
+          </a:fontRef>
+        </p:style>
+      </p:cxnSp>
+      <p:cxnSp>
+        <p:nvCxnSpPr>
+          <p:cNvPr id="49" name="Elbow Connector 48"/>
+          <p:cNvCxnSpPr>
+            <a:stCxn id="34" idx="3"/>
+            <a:endCxn id="14" idx="1"/>
+          </p:cNvCxnSpPr>
+          <p:nvPr/>
+        </p:nvCxnSpPr>
+        <p:spPr>
+          <a:xfrm flipH="1" flipV="1">
+            <a:off x="5324136" y="2846071"/>
+            <a:ext cx="2780755" cy="2164556"/>
+          </a:xfrm>
+          <a:prstGeom prst="bentConnector5">
+            <a:avLst>
+              <a:gd name="adj1" fmla="val -6166"/>
+              <a:gd name="adj2" fmla="val 50000"/>
+              <a:gd name="adj3" fmla="val 106166"/>
+            </a:avLst>
+          </a:prstGeom>
+          <a:ln w="50800">
+            <a:tailEnd type="triangle"/>
+          </a:ln>
+        </p:spPr>
+        <p:style>
+          <a:lnRef idx="1">
+            <a:schemeClr val="dk1"/>
+          </a:lnRef>
+          <a:fillRef idx="0">
+            <a:schemeClr val="dk1"/>
+          </a:fillRef>
+          <a:effectRef idx="0">
+            <a:schemeClr val="dk1"/>
+          </a:effectRef>
+          <a:fontRef idx="minor">
+            <a:schemeClr val="tx1"/>
+          </a:fontRef>
+        </p:style>
+      </p:cxnSp>
+      <p:pic>
+        <p:nvPicPr>
+          <p:cNvPr id="2" name="Picture 1" descr="ddos_receiver_1.png"/>
+          <p:cNvPicPr>
+            <a:picLocks noChangeAspect="1"/>
+          </p:cNvPicPr>
+          <p:nvPr/>
+        </p:nvPicPr>
+        <p:blipFill>
+          <a:blip r:embed="rId3"/>
+          <a:stretch>
+            <a:fillRect/>
+          </a:stretch>
+        </p:blipFill>
+        <p:spPr>
+          <a:xfrm>
+            <a:off x="5808916" y="2578816"/>
+            <a:ext cx="710204" cy="532745"/>
+          </a:xfrm>
+          <a:prstGeom prst="rect">
+            <a:avLst/>
+          </a:prstGeom>
+        </p:spPr>
+      </p:pic>
+      <p:pic>
+        <p:nvPicPr>
+          <p:cNvPr id="3" name="Picture 2" descr="ddos_sender_1.png"/>
+          <p:cNvPicPr>
+            <a:picLocks noChangeAspect="1"/>
+          </p:cNvPicPr>
+          <p:nvPr/>
+        </p:nvPicPr>
+        <p:blipFill>
+          <a:blip r:embed="rId4"/>
+          <a:stretch>
+            <a:fillRect/>
+          </a:stretch>
+        </p:blipFill>
+        <p:spPr>
+          <a:xfrm>
+            <a:off x="3427603" y="2571790"/>
+            <a:ext cx="719003" cy="538202"/>
+          </a:xfrm>
+          <a:prstGeom prst="rect">
+            <a:avLst/>
+          </a:prstGeom>
+        </p:spPr>
+      </p:pic>
+      <p:pic>
+        <p:nvPicPr>
+          <p:cNvPr id="7" name="Picture 6" descr="ddos_sender_2.png"/>
+          <p:cNvPicPr>
+            <a:picLocks noChangeAspect="1"/>
+          </p:cNvPicPr>
+          <p:nvPr/>
+        </p:nvPicPr>
+        <p:blipFill>
+          <a:blip r:embed="rId4"/>
+          <a:stretch>
+            <a:fillRect/>
+          </a:stretch>
+        </p:blipFill>
+        <p:spPr>
+          <a:xfrm>
+            <a:off x="6834983" y="2578817"/>
+            <a:ext cx="734648" cy="548799"/>
+          </a:xfrm>
+          <a:prstGeom prst="rect">
+            <a:avLst/>
+          </a:prstGeom>
+        </p:spPr>
+      </p:pic>
+      <p:pic>
+        <p:nvPicPr>
+          <p:cNvPr id="25" name="Picture 24" descr="ddos_receiver_1.png"/>
+          <p:cNvPicPr>
+            <a:picLocks noChangeAspect="1"/>
+          </p:cNvPicPr>
+          <p:nvPr/>
+        </p:nvPicPr>
+        <p:blipFill>
+          <a:blip r:embed="rId3"/>
+          <a:stretch>
+            <a:fillRect/>
+          </a:stretch>
+        </p:blipFill>
+        <p:spPr>
+          <a:xfrm>
+            <a:off x="2360762" y="2571790"/>
+            <a:ext cx="710204" cy="532745"/>
+          </a:xfrm>
+          <a:prstGeom prst="rect">
+            <a:avLst/>
+          </a:prstGeom>
+        </p:spPr>
+      </p:pic>
+      <p:pic>
+        <p:nvPicPr>
+          <p:cNvPr id="10" name="Picture 9" descr="ddos_sender_2.png"/>
+          <p:cNvPicPr>
+            <a:picLocks noChangeAspect="1"/>
+          </p:cNvPicPr>
+          <p:nvPr/>
+        </p:nvPicPr>
+        <p:blipFill>
+          <a:blip r:embed="rId4"/>
+          <a:stretch>
+            <a:fillRect/>
+          </a:stretch>
+        </p:blipFill>
+        <p:spPr>
+          <a:xfrm>
+            <a:off x="2686439" y="4691880"/>
+            <a:ext cx="1144139" cy="859170"/>
+          </a:xfrm>
+          <a:prstGeom prst="rect">
+            <a:avLst/>
+          </a:prstGeom>
+        </p:spPr>
+      </p:pic>
+      <p:pic>
+        <p:nvPicPr>
+          <p:cNvPr id="11" name="Picture 10" descr="ddos_sender_2_hop_2.png"/>
+          <p:cNvPicPr>
+            <a:picLocks noChangeAspect="1"/>
+          </p:cNvPicPr>
+          <p:nvPr/>
+        </p:nvPicPr>
+        <p:blipFill>
+          <a:blip r:embed="rId5"/>
+          <a:stretch>
+            <a:fillRect/>
+          </a:stretch>
+        </p:blipFill>
+        <p:spPr>
+          <a:xfrm>
+            <a:off x="6086475" y="4692254"/>
+            <a:ext cx="1160321" cy="869506"/>
+          </a:xfrm>
+          <a:prstGeom prst="rect">
+            <a:avLst/>
+          </a:prstGeom>
+        </p:spPr>
+      </p:pic>
+    </p:spTree>
+    <p:extLst>
+      <p:ext uri="{BB962C8B-B14F-4D97-AF65-F5344CB8AC3E}">
+        <p14:creationId xmlns:p14="http://schemas.microsoft.com/office/powerpoint/2010/main" val="1962527239"/>
+      </p:ext>
+    </p:extLst>
+  </p:cSld>
+  <p:clrMapOvr>
+    <a:masterClrMapping/>
+  </p:clrMapOvr>
+</p:sld>
+</file>
+
+<file path=ppt/slides/slide7.xml><?xml version="1.0" encoding="utf-8"?>
+<p:sld xmlns:a="http://schemas.openxmlformats.org/drawingml/2006/main" xmlns:r="http://schemas.openxmlformats.org/officeDocument/2006/relationships" xmlns:p="http://schemas.openxmlformats.org/presentationml/2006/main">
+  <p:cSld>
+    <p:spTree>
+      <p:nvGrpSpPr>
+        <p:cNvPr id="1" name=""/>
+        <p:cNvGrpSpPr/>
+        <p:nvPr/>
+      </p:nvGrpSpPr>
+      <p:grpSpPr>
+        <a:xfrm>
+          <a:off x="0" y="0"/>
+          <a:ext cx="0" cy="0"/>
+          <a:chOff x="0" y="0"/>
+          <a:chExt cx="0" cy="0"/>
+        </a:xfrm>
+      </p:grpSpPr>
+      <p:sp>
+        <p:nvSpPr>
           <p:cNvPr id="2" name="Rounded Rectangle 1"/>
           <p:cNvSpPr/>
           <p:nvPr/>
@@ -10512,7 +13666,7 @@
 </p:sld>
 </file>
 
-<file path=ppt/slides/slide6.xml><?xml version="1.0" encoding="utf-8"?>
+<file path=ppt/slides/slide8.xml><?xml version="1.0" encoding="utf-8"?>
 <p:sld xmlns:a="http://schemas.openxmlformats.org/drawingml/2006/main" xmlns:r="http://schemas.openxmlformats.org/officeDocument/2006/relationships" xmlns:p="http://schemas.openxmlformats.org/presentationml/2006/main">
   <p:cSld>
     <p:spTree>
@@ -10531,13 +13685,66 @@
       </p:grpSpPr>
       <p:sp>
         <p:nvSpPr>
+          <p:cNvPr id="31" name="Rounded Rectangle 30"/>
+          <p:cNvSpPr/>
+          <p:nvPr/>
+        </p:nvSpPr>
+        <p:spPr>
+          <a:xfrm>
+            <a:off x="6297297" y="2016157"/>
+            <a:ext cx="679512" cy="2612349"/>
+          </a:xfrm>
+          <a:prstGeom prst="roundRect">
+            <a:avLst/>
+          </a:prstGeom>
+          <a:solidFill>
+            <a:schemeClr val="accent2">
+              <a:lumMod val="40000"/>
+              <a:lumOff val="60000"/>
+            </a:schemeClr>
+          </a:solidFill>
+          <a:ln w="38100" cap="flat" cmpd="sng" algn="ctr">
+            <a:solidFill>
+              <a:schemeClr val="accent2"/>
+            </a:solidFill>
+            <a:prstDash val="lgDash"/>
+            <a:round/>
+            <a:headEnd type="none" w="med" len="med"/>
+            <a:tailEnd type="none" w="med" len="med"/>
+          </a:ln>
+        </p:spPr>
+        <p:style>
+          <a:lnRef idx="0">
+            <a:scrgbClr r="0" g="0" b="0"/>
+          </a:lnRef>
+          <a:fillRef idx="0">
+            <a:scrgbClr r="0" g="0" b="0"/>
+          </a:fillRef>
+          <a:effectRef idx="0">
+            <a:scrgbClr r="0" g="0" b="0"/>
+          </a:effectRef>
+          <a:fontRef idx="minor">
+            <a:schemeClr val="accent2"/>
+          </a:fontRef>
+        </p:style>
+        <p:txBody>
+          <a:bodyPr rtlCol="0" anchor="ctr"/>
+          <a:lstStyle/>
+          <a:p>
+            <a:pPr algn="ctr"/>
+            <a:endParaRPr lang="en-US"/>
+          </a:p>
+        </p:txBody>
+      </p:sp>
+      <p:sp>
+        <p:nvSpPr>
           <p:cNvPr id="2" name="Rounded Rectangle 1"/>
           <p:cNvSpPr/>
           <p:nvPr/>
         </p:nvSpPr>
         <p:spPr>
           <a:xfrm>
-            <a:off x="5029200" y="5948248"/>
+            <a:off x="6564075" y="5831182"/>
             <a:ext cx="1288125" cy="648526"/>
           </a:xfrm>
           <a:prstGeom prst="roundRect">
@@ -10627,7 +13834,7 @@
         </p:nvSpPr>
         <p:spPr>
           <a:xfrm>
-            <a:off x="6553200" y="3505200"/>
+            <a:off x="7852200" y="3526958"/>
             <a:ext cx="1031477" cy="614281"/>
           </a:xfrm>
           <a:prstGeom prst="roundRect">
@@ -10668,7 +13875,7 @@
         </p:nvSpPr>
         <p:spPr>
           <a:xfrm>
-            <a:off x="6659650" y="4478781"/>
+            <a:off x="7958650" y="4500539"/>
             <a:ext cx="818579" cy="596970"/>
           </a:xfrm>
           <a:prstGeom prst="roundRect">
@@ -10704,13 +13911,15 @@
       <p:cxnSp>
         <p:nvCxnSpPr>
           <p:cNvPr id="15" name="Elbow Connector 14"/>
-          <p:cNvCxnSpPr/>
+          <p:cNvCxnSpPr>
+            <a:endCxn id="5" idx="0"/>
+          </p:cNvCxnSpPr>
           <p:nvPr/>
         </p:nvCxnSpPr>
         <p:spPr>
           <a:xfrm>
-            <a:off x="5076130" y="3322332"/>
-            <a:ext cx="1734940" cy="182868"/>
+            <a:off x="5613130" y="3325040"/>
+            <a:ext cx="2754809" cy="201918"/>
           </a:xfrm>
           <a:prstGeom prst="bentConnector2">
             <a:avLst/>
@@ -10739,17 +13948,18 @@
           <p:cNvPr id="19" name="Elbow Connector 18"/>
           <p:cNvCxnSpPr>
             <a:stCxn id="3" idx="3"/>
-            <a:endCxn id="5" idx="0"/>
           </p:cNvCxnSpPr>
           <p:nvPr/>
         </p:nvCxnSpPr>
         <p:spPr>
           <a:xfrm>
-            <a:off x="5333999" y="2350224"/>
-            <a:ext cx="1734940" cy="1154976"/>
-          </a:xfrm>
-          <a:prstGeom prst="bentConnector2">
-            <a:avLst/>
+            <a:off x="6037463" y="2350224"/>
+            <a:ext cx="2590310" cy="1173110"/>
+          </a:xfrm>
+          <a:prstGeom prst="bentConnector3">
+            <a:avLst>
+              <a:gd name="adj1" fmla="val 99896"/>
+            </a:avLst>
           </a:prstGeom>
           <a:ln>
             <a:tailEnd type="triangle"/>
@@ -10823,7 +14033,7 @@
         </p:nvCxnSpPr>
         <p:spPr>
           <a:xfrm>
-            <a:off x="7068939" y="4119481"/>
+            <a:off x="8367939" y="4141239"/>
             <a:ext cx="1" cy="359300"/>
           </a:xfrm>
           <a:prstGeom prst="straightConnector1">
@@ -10857,7 +14067,7 @@
         <p:grpSpPr>
           <a:xfrm>
             <a:off x="3959970" y="2016157"/>
-            <a:ext cx="1374029" cy="2612349"/>
+            <a:ext cx="2077493" cy="2612349"/>
             <a:chOff x="4038599" y="1731051"/>
             <a:chExt cx="1374029" cy="2612349"/>
           </a:xfrm>
@@ -10898,15 +14108,12 @@
               <a:pPr algn="ctr"/>
               <a:r>
                 <a:rPr lang="en-US" dirty="0" smtClean="0"/>
-                <a:t>High </a:t>
+                <a:t>High Priority</a:t>
               </a:r>
             </a:p>
             <a:p>
               <a:pPr algn="ctr"/>
-              <a:r>
-                <a:rPr lang="en-US" dirty="0" smtClean="0"/>
-                <a:t>priority</a:t>
-              </a:r>
+              <a:endParaRPr lang="en-US" dirty="0" smtClean="0"/>
             </a:p>
           </p:txBody>
         </p:sp>
@@ -10951,13 +14158,14 @@
                 <a:rPr lang="en-US" dirty="0" smtClean="0"/>
                 <a:t>Medium </a:t>
               </a:r>
+              <a:r>
+                <a:rPr lang="en-US" dirty="0" smtClean="0"/>
+                <a:t>Priority</a:t>
+              </a:r>
             </a:p>
             <a:p>
               <a:pPr algn="ctr"/>
-              <a:r>
-                <a:rPr lang="en-US" dirty="0" smtClean="0"/>
-                <a:t>priority</a:t>
-              </a:r>
+              <a:endParaRPr lang="en-US" dirty="0" smtClean="0"/>
             </a:p>
           </p:txBody>
         </p:sp>
@@ -10976,9 +14184,8 @@
               <a:avLst/>
             </a:prstGeom>
             <a:solidFill>
-              <a:schemeClr val="tx2">
-                <a:lumMod val="60000"/>
-                <a:lumOff val="40000"/>
+              <a:schemeClr val="accent5">
+                <a:lumMod val="50000"/>
               </a:schemeClr>
             </a:solidFill>
           </p:spPr>
@@ -11003,8 +14210,16 @@
               <a:pPr algn="ctr"/>
               <a:r>
                 <a:rPr lang="en-US" dirty="0" smtClean="0"/>
-                <a:t>Non Application</a:t>
+                <a:t>Non </a:t>
               </a:r>
+              <a:r>
+                <a:rPr lang="en-US" dirty="0" smtClean="0"/>
+                <a:t>Application</a:t>
+              </a:r>
+            </a:p>
+            <a:p>
+              <a:pPr algn="ctr"/>
+              <a:endParaRPr lang="en-US" dirty="0" smtClean="0"/>
             </a:p>
           </p:txBody>
         </p:sp>
@@ -11095,7 +14310,7 @@
         <p:spPr>
           <a:xfrm flipV="1">
             <a:off x="3268526" y="2350224"/>
-            <a:ext cx="691445" cy="972109"/>
+            <a:ext cx="691446" cy="972109"/>
           </a:xfrm>
           <a:prstGeom prst="bentConnector3">
             <a:avLst>
@@ -11133,7 +14348,7 @@
         <p:spPr>
           <a:xfrm flipV="1">
             <a:off x="3268526" y="3322332"/>
-            <a:ext cx="691445" cy="1"/>
+            <a:ext cx="691446" cy="1"/>
           </a:xfrm>
           <a:prstGeom prst="straightConnector1">
             <a:avLst/>
@@ -11168,8 +14383,8 @@
         </p:nvCxnSpPr>
         <p:spPr>
           <a:xfrm>
-            <a:off x="5333999" y="4294440"/>
-            <a:ext cx="339264" cy="1653808"/>
+            <a:off x="6037463" y="4294440"/>
+            <a:ext cx="1170675" cy="1536742"/>
           </a:xfrm>
           <a:prstGeom prst="bentConnector2">
             <a:avLst/>
@@ -11204,8 +14419,8 @@
         </p:nvCxnSpPr>
         <p:spPr>
           <a:xfrm rot="5400000">
-            <a:off x="5934854" y="4814161"/>
-            <a:ext cx="872497" cy="1395677"/>
+            <a:off x="7421203" y="4884444"/>
+            <a:ext cx="733673" cy="1159802"/>
           </a:xfrm>
           <a:prstGeom prst="bentConnector3">
             <a:avLst>
@@ -11279,6 +14494,1167 @@
               <a:t>Outbound traffic destined for the network interface is first filtered into three queues.  Application traffic is filtered by priority into the high and medium priority queues, where it will be shaped and delayed according to the link profile.  Non application traffic is sent to the lowest priority queue and not shaped.</a:t>
             </a:r>
             <a:endParaRPr lang="en-US" sz="1200" dirty="0"/>
+          </a:p>
+        </p:txBody>
+      </p:sp>
+      <p:grpSp>
+        <p:nvGrpSpPr>
+          <p:cNvPr id="16" name="Group 15"/>
+          <p:cNvGrpSpPr/>
+          <p:nvPr/>
+        </p:nvGrpSpPr>
+        <p:grpSpPr>
+          <a:xfrm>
+            <a:off x="4039922" y="2348157"/>
+            <a:ext cx="1917586" cy="266441"/>
+            <a:chOff x="4039922" y="2348157"/>
+            <a:chExt cx="1917586" cy="266441"/>
+          </a:xfrm>
+        </p:grpSpPr>
+        <p:grpSp>
+          <p:nvGrpSpPr>
+            <p:cNvPr id="37" name="Group 36"/>
+            <p:cNvGrpSpPr/>
+            <p:nvPr/>
+          </p:nvGrpSpPr>
+          <p:grpSpPr>
+            <a:xfrm>
+              <a:off x="4272676" y="2348157"/>
+              <a:ext cx="1452080" cy="266441"/>
+              <a:chOff x="3683543" y="2951814"/>
+              <a:chExt cx="1778820" cy="363978"/>
+            </a:xfrm>
+          </p:grpSpPr>
+          <p:cxnSp>
+            <p:nvCxnSpPr>
+              <p:cNvPr id="40" name="Straight Connector 39"/>
+              <p:cNvCxnSpPr/>
+              <p:nvPr/>
+            </p:nvCxnSpPr>
+            <p:spPr>
+              <a:xfrm flipH="1">
+                <a:off x="3683543" y="2951814"/>
+                <a:ext cx="1778820" cy="0"/>
+              </a:xfrm>
+              <a:prstGeom prst="line">
+                <a:avLst/>
+              </a:prstGeom>
+            </p:spPr>
+            <p:style>
+              <a:lnRef idx="2">
+                <a:schemeClr val="accent1"/>
+              </a:lnRef>
+              <a:fillRef idx="0">
+                <a:schemeClr val="accent1"/>
+              </a:fillRef>
+              <a:effectRef idx="1">
+                <a:schemeClr val="accent1"/>
+              </a:effectRef>
+              <a:fontRef idx="minor">
+                <a:schemeClr val="tx1"/>
+              </a:fontRef>
+            </p:style>
+          </p:cxnSp>
+          <p:cxnSp>
+            <p:nvCxnSpPr>
+              <p:cNvPr id="42" name="Straight Connector 41"/>
+              <p:cNvCxnSpPr/>
+              <p:nvPr/>
+            </p:nvCxnSpPr>
+            <p:spPr>
+              <a:xfrm flipH="1">
+                <a:off x="3683543" y="3315792"/>
+                <a:ext cx="1778820" cy="0"/>
+              </a:xfrm>
+              <a:prstGeom prst="line">
+                <a:avLst/>
+              </a:prstGeom>
+            </p:spPr>
+            <p:style>
+              <a:lnRef idx="2">
+                <a:schemeClr val="accent1"/>
+              </a:lnRef>
+              <a:fillRef idx="0">
+                <a:schemeClr val="accent1"/>
+              </a:fillRef>
+              <a:effectRef idx="1">
+                <a:schemeClr val="accent1"/>
+              </a:effectRef>
+              <a:fontRef idx="minor">
+                <a:schemeClr val="tx1"/>
+              </a:fontRef>
+            </p:style>
+          </p:cxnSp>
+          <p:grpSp>
+            <p:nvGrpSpPr>
+              <p:cNvPr id="45" name="Group 44"/>
+              <p:cNvGrpSpPr/>
+              <p:nvPr/>
+            </p:nvGrpSpPr>
+            <p:grpSpPr>
+              <a:xfrm>
+                <a:off x="3849907" y="2969641"/>
+                <a:ext cx="1446091" cy="338515"/>
+                <a:chOff x="3867326" y="2964620"/>
+                <a:chExt cx="1446091" cy="338515"/>
+              </a:xfrm>
+            </p:grpSpPr>
+            <p:sp>
+              <p:nvSpPr>
+                <p:cNvPr id="46" name="Rectangle 45"/>
+                <p:cNvSpPr/>
+                <p:nvPr/>
+              </p:nvSpPr>
+              <p:spPr>
+                <a:xfrm>
+                  <a:off x="3867326" y="2964620"/>
+                  <a:ext cx="291371" cy="338515"/>
+                </a:xfrm>
+                <a:prstGeom prst="rect">
+                  <a:avLst/>
+                </a:prstGeom>
+              </p:spPr>
+              <p:style>
+                <a:lnRef idx="0">
+                  <a:schemeClr val="accent5"/>
+                </a:lnRef>
+                <a:fillRef idx="3">
+                  <a:schemeClr val="accent5"/>
+                </a:fillRef>
+                <a:effectRef idx="3">
+                  <a:schemeClr val="accent5"/>
+                </a:effectRef>
+                <a:fontRef idx="minor">
+                  <a:schemeClr val="lt1"/>
+                </a:fontRef>
+              </p:style>
+              <p:txBody>
+                <a:bodyPr rtlCol="0" anchor="ctr"/>
+                <a:lstStyle/>
+                <a:p>
+                  <a:pPr algn="ctr"/>
+                  <a:endParaRPr lang="en-US"/>
+                </a:p>
+              </p:txBody>
+            </p:sp>
+            <p:sp>
+              <p:nvSpPr>
+                <p:cNvPr id="47" name="Rectangle 46"/>
+                <p:cNvSpPr/>
+                <p:nvPr/>
+              </p:nvSpPr>
+              <p:spPr>
+                <a:xfrm>
+                  <a:off x="4156006" y="2964620"/>
+                  <a:ext cx="291371" cy="338515"/>
+                </a:xfrm>
+                <a:prstGeom prst="rect">
+                  <a:avLst/>
+                </a:prstGeom>
+              </p:spPr>
+              <p:style>
+                <a:lnRef idx="0">
+                  <a:schemeClr val="accent5"/>
+                </a:lnRef>
+                <a:fillRef idx="3">
+                  <a:schemeClr val="accent5"/>
+                </a:fillRef>
+                <a:effectRef idx="3">
+                  <a:schemeClr val="accent5"/>
+                </a:effectRef>
+                <a:fontRef idx="minor">
+                  <a:schemeClr val="lt1"/>
+                </a:fontRef>
+              </p:style>
+              <p:txBody>
+                <a:bodyPr rtlCol="0" anchor="ctr"/>
+                <a:lstStyle/>
+                <a:p>
+                  <a:pPr algn="ctr"/>
+                  <a:endParaRPr lang="en-US"/>
+                </a:p>
+              </p:txBody>
+            </p:sp>
+            <p:sp>
+              <p:nvSpPr>
+                <p:cNvPr id="48" name="Rectangle 47"/>
+                <p:cNvSpPr/>
+                <p:nvPr/>
+              </p:nvSpPr>
+              <p:spPr>
+                <a:xfrm>
+                  <a:off x="4444686" y="2964620"/>
+                  <a:ext cx="291371" cy="338515"/>
+                </a:xfrm>
+                <a:prstGeom prst="rect">
+                  <a:avLst/>
+                </a:prstGeom>
+              </p:spPr>
+              <p:style>
+                <a:lnRef idx="0">
+                  <a:schemeClr val="accent5"/>
+                </a:lnRef>
+                <a:fillRef idx="3">
+                  <a:schemeClr val="accent5"/>
+                </a:fillRef>
+                <a:effectRef idx="3">
+                  <a:schemeClr val="accent5"/>
+                </a:effectRef>
+                <a:fontRef idx="minor">
+                  <a:schemeClr val="lt1"/>
+                </a:fontRef>
+              </p:style>
+              <p:txBody>
+                <a:bodyPr rtlCol="0" anchor="ctr"/>
+                <a:lstStyle/>
+                <a:p>
+                  <a:pPr algn="ctr"/>
+                  <a:endParaRPr lang="en-US"/>
+                </a:p>
+              </p:txBody>
+            </p:sp>
+            <p:sp>
+              <p:nvSpPr>
+                <p:cNvPr id="49" name="Rectangle 48"/>
+                <p:cNvSpPr/>
+                <p:nvPr/>
+              </p:nvSpPr>
+              <p:spPr>
+                <a:xfrm>
+                  <a:off x="4733366" y="2964620"/>
+                  <a:ext cx="291371" cy="338515"/>
+                </a:xfrm>
+                <a:prstGeom prst="rect">
+                  <a:avLst/>
+                </a:prstGeom>
+              </p:spPr>
+              <p:style>
+                <a:lnRef idx="0">
+                  <a:schemeClr val="accent5"/>
+                </a:lnRef>
+                <a:fillRef idx="3">
+                  <a:schemeClr val="accent5"/>
+                </a:fillRef>
+                <a:effectRef idx="3">
+                  <a:schemeClr val="accent5"/>
+                </a:effectRef>
+                <a:fontRef idx="minor">
+                  <a:schemeClr val="lt1"/>
+                </a:fontRef>
+              </p:style>
+              <p:txBody>
+                <a:bodyPr rtlCol="0" anchor="ctr"/>
+                <a:lstStyle/>
+                <a:p>
+                  <a:pPr algn="ctr"/>
+                  <a:endParaRPr lang="en-US"/>
+                </a:p>
+              </p:txBody>
+            </p:sp>
+            <p:sp>
+              <p:nvSpPr>
+                <p:cNvPr id="51" name="Rectangle 50"/>
+                <p:cNvSpPr/>
+                <p:nvPr/>
+              </p:nvSpPr>
+              <p:spPr>
+                <a:xfrm>
+                  <a:off x="5022046" y="2964620"/>
+                  <a:ext cx="291371" cy="338515"/>
+                </a:xfrm>
+                <a:prstGeom prst="rect">
+                  <a:avLst/>
+                </a:prstGeom>
+              </p:spPr>
+              <p:style>
+                <a:lnRef idx="0">
+                  <a:schemeClr val="accent5"/>
+                </a:lnRef>
+                <a:fillRef idx="3">
+                  <a:schemeClr val="accent5"/>
+                </a:fillRef>
+                <a:effectRef idx="3">
+                  <a:schemeClr val="accent5"/>
+                </a:effectRef>
+                <a:fontRef idx="minor">
+                  <a:schemeClr val="lt1"/>
+                </a:fontRef>
+              </p:style>
+              <p:txBody>
+                <a:bodyPr rtlCol="0" anchor="ctr"/>
+                <a:lstStyle/>
+                <a:p>
+                  <a:pPr algn="ctr"/>
+                  <a:endParaRPr lang="en-US"/>
+                </a:p>
+              </p:txBody>
+            </p:sp>
+          </p:grpSp>
+        </p:grpSp>
+        <p:sp>
+          <p:nvSpPr>
+            <p:cNvPr id="61" name="Right Arrow 60"/>
+            <p:cNvSpPr/>
+            <p:nvPr/>
+          </p:nvSpPr>
+          <p:spPr>
+            <a:xfrm>
+              <a:off x="4039922" y="2416621"/>
+              <a:ext cx="232753" cy="129512"/>
+            </a:xfrm>
+            <a:prstGeom prst="rightArrow">
+              <a:avLst/>
+            </a:prstGeom>
+          </p:spPr>
+          <p:style>
+            <a:lnRef idx="2">
+              <a:schemeClr val="dk1">
+                <a:shade val="50000"/>
+              </a:schemeClr>
+            </a:lnRef>
+            <a:fillRef idx="1">
+              <a:schemeClr val="dk1"/>
+            </a:fillRef>
+            <a:effectRef idx="0">
+              <a:schemeClr val="dk1"/>
+            </a:effectRef>
+            <a:fontRef idx="minor">
+              <a:schemeClr val="lt1"/>
+            </a:fontRef>
+          </p:style>
+          <p:txBody>
+            <a:bodyPr rtlCol="0" anchor="ctr"/>
+            <a:lstStyle/>
+            <a:p>
+              <a:pPr algn="ctr"/>
+              <a:endParaRPr lang="en-US"/>
+            </a:p>
+          </p:txBody>
+        </p:sp>
+        <p:sp>
+          <p:nvSpPr>
+            <p:cNvPr id="64" name="Right Arrow 63"/>
+            <p:cNvSpPr/>
+            <p:nvPr/>
+          </p:nvSpPr>
+          <p:spPr>
+            <a:xfrm>
+              <a:off x="5724755" y="2416621"/>
+              <a:ext cx="232753" cy="129512"/>
+            </a:xfrm>
+            <a:prstGeom prst="rightArrow">
+              <a:avLst/>
+            </a:prstGeom>
+          </p:spPr>
+          <p:style>
+            <a:lnRef idx="2">
+              <a:schemeClr val="dk1">
+                <a:shade val="50000"/>
+              </a:schemeClr>
+            </a:lnRef>
+            <a:fillRef idx="1">
+              <a:schemeClr val="dk1"/>
+            </a:fillRef>
+            <a:effectRef idx="0">
+              <a:schemeClr val="dk1"/>
+            </a:effectRef>
+            <a:fontRef idx="minor">
+              <a:schemeClr val="lt1"/>
+            </a:fontRef>
+          </p:style>
+          <p:txBody>
+            <a:bodyPr rtlCol="0" anchor="ctr"/>
+            <a:lstStyle/>
+            <a:p>
+              <a:pPr algn="ctr"/>
+              <a:endParaRPr lang="en-US"/>
+            </a:p>
+          </p:txBody>
+        </p:sp>
+      </p:grpSp>
+      <p:grpSp>
+        <p:nvGrpSpPr>
+          <p:cNvPr id="65" name="Group 64"/>
+          <p:cNvGrpSpPr/>
+          <p:nvPr/>
+        </p:nvGrpSpPr>
+        <p:grpSpPr>
+          <a:xfrm>
+            <a:off x="4039922" y="3321205"/>
+            <a:ext cx="1917586" cy="266441"/>
+            <a:chOff x="4039922" y="2348157"/>
+            <a:chExt cx="1917586" cy="266441"/>
+          </a:xfrm>
+        </p:grpSpPr>
+        <p:grpSp>
+          <p:nvGrpSpPr>
+            <p:cNvPr id="66" name="Group 65"/>
+            <p:cNvGrpSpPr/>
+            <p:nvPr/>
+          </p:nvGrpSpPr>
+          <p:grpSpPr>
+            <a:xfrm>
+              <a:off x="4272676" y="2348157"/>
+              <a:ext cx="1452080" cy="266441"/>
+              <a:chOff x="3683543" y="2951814"/>
+              <a:chExt cx="1778820" cy="363978"/>
+            </a:xfrm>
+          </p:grpSpPr>
+          <p:cxnSp>
+            <p:nvCxnSpPr>
+              <p:cNvPr id="73" name="Straight Connector 72"/>
+              <p:cNvCxnSpPr/>
+              <p:nvPr/>
+            </p:nvCxnSpPr>
+            <p:spPr>
+              <a:xfrm flipH="1">
+                <a:off x="3683543" y="2951814"/>
+                <a:ext cx="1778820" cy="0"/>
+              </a:xfrm>
+              <a:prstGeom prst="line">
+                <a:avLst/>
+              </a:prstGeom>
+            </p:spPr>
+            <p:style>
+              <a:lnRef idx="2">
+                <a:schemeClr val="accent1"/>
+              </a:lnRef>
+              <a:fillRef idx="0">
+                <a:schemeClr val="accent1"/>
+              </a:fillRef>
+              <a:effectRef idx="1">
+                <a:schemeClr val="accent1"/>
+              </a:effectRef>
+              <a:fontRef idx="minor">
+                <a:schemeClr val="tx1"/>
+              </a:fontRef>
+            </p:style>
+          </p:cxnSp>
+          <p:cxnSp>
+            <p:nvCxnSpPr>
+              <p:cNvPr id="74" name="Straight Connector 73"/>
+              <p:cNvCxnSpPr/>
+              <p:nvPr/>
+            </p:nvCxnSpPr>
+            <p:spPr>
+              <a:xfrm flipH="1">
+                <a:off x="3683543" y="3315792"/>
+                <a:ext cx="1778820" cy="0"/>
+              </a:xfrm>
+              <a:prstGeom prst="line">
+                <a:avLst/>
+              </a:prstGeom>
+            </p:spPr>
+            <p:style>
+              <a:lnRef idx="2">
+                <a:schemeClr val="accent1"/>
+              </a:lnRef>
+              <a:fillRef idx="0">
+                <a:schemeClr val="accent1"/>
+              </a:fillRef>
+              <a:effectRef idx="1">
+                <a:schemeClr val="accent1"/>
+              </a:effectRef>
+              <a:fontRef idx="minor">
+                <a:schemeClr val="tx1"/>
+              </a:fontRef>
+            </p:style>
+          </p:cxnSp>
+          <p:grpSp>
+            <p:nvGrpSpPr>
+              <p:cNvPr id="75" name="Group 74"/>
+              <p:cNvGrpSpPr/>
+              <p:nvPr/>
+            </p:nvGrpSpPr>
+            <p:grpSpPr>
+              <a:xfrm>
+                <a:off x="3849907" y="2969641"/>
+                <a:ext cx="1446091" cy="338515"/>
+                <a:chOff x="3867326" y="2964620"/>
+                <a:chExt cx="1446091" cy="338515"/>
+              </a:xfrm>
+            </p:grpSpPr>
+            <p:sp>
+              <p:nvSpPr>
+                <p:cNvPr id="76" name="Rectangle 75"/>
+                <p:cNvSpPr/>
+                <p:nvPr/>
+              </p:nvSpPr>
+              <p:spPr>
+                <a:xfrm>
+                  <a:off x="3867326" y="2964620"/>
+                  <a:ext cx="291371" cy="338515"/>
+                </a:xfrm>
+                <a:prstGeom prst="rect">
+                  <a:avLst/>
+                </a:prstGeom>
+              </p:spPr>
+              <p:style>
+                <a:lnRef idx="0">
+                  <a:schemeClr val="accent5"/>
+                </a:lnRef>
+                <a:fillRef idx="3">
+                  <a:schemeClr val="accent5"/>
+                </a:fillRef>
+                <a:effectRef idx="3">
+                  <a:schemeClr val="accent5"/>
+                </a:effectRef>
+                <a:fontRef idx="minor">
+                  <a:schemeClr val="lt1"/>
+                </a:fontRef>
+              </p:style>
+              <p:txBody>
+                <a:bodyPr rtlCol="0" anchor="ctr"/>
+                <a:lstStyle/>
+                <a:p>
+                  <a:pPr algn="ctr"/>
+                  <a:endParaRPr lang="en-US"/>
+                </a:p>
+              </p:txBody>
+            </p:sp>
+            <p:sp>
+              <p:nvSpPr>
+                <p:cNvPr id="77" name="Rectangle 76"/>
+                <p:cNvSpPr/>
+                <p:nvPr/>
+              </p:nvSpPr>
+              <p:spPr>
+                <a:xfrm>
+                  <a:off x="4156006" y="2964620"/>
+                  <a:ext cx="291371" cy="338515"/>
+                </a:xfrm>
+                <a:prstGeom prst="rect">
+                  <a:avLst/>
+                </a:prstGeom>
+              </p:spPr>
+              <p:style>
+                <a:lnRef idx="0">
+                  <a:schemeClr val="accent5"/>
+                </a:lnRef>
+                <a:fillRef idx="3">
+                  <a:schemeClr val="accent5"/>
+                </a:fillRef>
+                <a:effectRef idx="3">
+                  <a:schemeClr val="accent5"/>
+                </a:effectRef>
+                <a:fontRef idx="minor">
+                  <a:schemeClr val="lt1"/>
+                </a:fontRef>
+              </p:style>
+              <p:txBody>
+                <a:bodyPr rtlCol="0" anchor="ctr"/>
+                <a:lstStyle/>
+                <a:p>
+                  <a:pPr algn="ctr"/>
+                  <a:endParaRPr lang="en-US"/>
+                </a:p>
+              </p:txBody>
+            </p:sp>
+            <p:sp>
+              <p:nvSpPr>
+                <p:cNvPr id="78" name="Rectangle 77"/>
+                <p:cNvSpPr/>
+                <p:nvPr/>
+              </p:nvSpPr>
+              <p:spPr>
+                <a:xfrm>
+                  <a:off x="4444686" y="2964620"/>
+                  <a:ext cx="291371" cy="338515"/>
+                </a:xfrm>
+                <a:prstGeom prst="rect">
+                  <a:avLst/>
+                </a:prstGeom>
+              </p:spPr>
+              <p:style>
+                <a:lnRef idx="0">
+                  <a:schemeClr val="accent5"/>
+                </a:lnRef>
+                <a:fillRef idx="3">
+                  <a:schemeClr val="accent5"/>
+                </a:fillRef>
+                <a:effectRef idx="3">
+                  <a:schemeClr val="accent5"/>
+                </a:effectRef>
+                <a:fontRef idx="minor">
+                  <a:schemeClr val="lt1"/>
+                </a:fontRef>
+              </p:style>
+              <p:txBody>
+                <a:bodyPr rtlCol="0" anchor="ctr"/>
+                <a:lstStyle/>
+                <a:p>
+                  <a:pPr algn="ctr"/>
+                  <a:endParaRPr lang="en-US"/>
+                </a:p>
+              </p:txBody>
+            </p:sp>
+            <p:sp>
+              <p:nvSpPr>
+                <p:cNvPr id="79" name="Rectangle 78"/>
+                <p:cNvSpPr/>
+                <p:nvPr/>
+              </p:nvSpPr>
+              <p:spPr>
+                <a:xfrm>
+                  <a:off x="4733366" y="2964620"/>
+                  <a:ext cx="291371" cy="338515"/>
+                </a:xfrm>
+                <a:prstGeom prst="rect">
+                  <a:avLst/>
+                </a:prstGeom>
+              </p:spPr>
+              <p:style>
+                <a:lnRef idx="0">
+                  <a:schemeClr val="accent5"/>
+                </a:lnRef>
+                <a:fillRef idx="3">
+                  <a:schemeClr val="accent5"/>
+                </a:fillRef>
+                <a:effectRef idx="3">
+                  <a:schemeClr val="accent5"/>
+                </a:effectRef>
+                <a:fontRef idx="minor">
+                  <a:schemeClr val="lt1"/>
+                </a:fontRef>
+              </p:style>
+              <p:txBody>
+                <a:bodyPr rtlCol="0" anchor="ctr"/>
+                <a:lstStyle/>
+                <a:p>
+                  <a:pPr algn="ctr"/>
+                  <a:endParaRPr lang="en-US"/>
+                </a:p>
+              </p:txBody>
+            </p:sp>
+            <p:sp>
+              <p:nvSpPr>
+                <p:cNvPr id="80" name="Rectangle 79"/>
+                <p:cNvSpPr/>
+                <p:nvPr/>
+              </p:nvSpPr>
+              <p:spPr>
+                <a:xfrm>
+                  <a:off x="5022046" y="2964620"/>
+                  <a:ext cx="291371" cy="338515"/>
+                </a:xfrm>
+                <a:prstGeom prst="rect">
+                  <a:avLst/>
+                </a:prstGeom>
+              </p:spPr>
+              <p:style>
+                <a:lnRef idx="0">
+                  <a:schemeClr val="accent5"/>
+                </a:lnRef>
+                <a:fillRef idx="3">
+                  <a:schemeClr val="accent5"/>
+                </a:fillRef>
+                <a:effectRef idx="3">
+                  <a:schemeClr val="accent5"/>
+                </a:effectRef>
+                <a:fontRef idx="minor">
+                  <a:schemeClr val="lt1"/>
+                </a:fontRef>
+              </p:style>
+              <p:txBody>
+                <a:bodyPr rtlCol="0" anchor="ctr"/>
+                <a:lstStyle/>
+                <a:p>
+                  <a:pPr algn="ctr"/>
+                  <a:endParaRPr lang="en-US"/>
+                </a:p>
+              </p:txBody>
+            </p:sp>
+          </p:grpSp>
+        </p:grpSp>
+        <p:sp>
+          <p:nvSpPr>
+            <p:cNvPr id="69" name="Right Arrow 68"/>
+            <p:cNvSpPr/>
+            <p:nvPr/>
+          </p:nvSpPr>
+          <p:spPr>
+            <a:xfrm>
+              <a:off x="4039922" y="2416621"/>
+              <a:ext cx="232753" cy="129512"/>
+            </a:xfrm>
+            <a:prstGeom prst="rightArrow">
+              <a:avLst/>
+            </a:prstGeom>
+          </p:spPr>
+          <p:style>
+            <a:lnRef idx="2">
+              <a:schemeClr val="dk1">
+                <a:shade val="50000"/>
+              </a:schemeClr>
+            </a:lnRef>
+            <a:fillRef idx="1">
+              <a:schemeClr val="dk1"/>
+            </a:fillRef>
+            <a:effectRef idx="0">
+              <a:schemeClr val="dk1"/>
+            </a:effectRef>
+            <a:fontRef idx="minor">
+              <a:schemeClr val="lt1"/>
+            </a:fontRef>
+          </p:style>
+          <p:txBody>
+            <a:bodyPr rtlCol="0" anchor="ctr"/>
+            <a:lstStyle/>
+            <a:p>
+              <a:pPr algn="ctr"/>
+              <a:endParaRPr lang="en-US"/>
+            </a:p>
+          </p:txBody>
+        </p:sp>
+        <p:sp>
+          <p:nvSpPr>
+            <p:cNvPr id="71" name="Right Arrow 70"/>
+            <p:cNvSpPr/>
+            <p:nvPr/>
+          </p:nvSpPr>
+          <p:spPr>
+            <a:xfrm>
+              <a:off x="5724755" y="2416621"/>
+              <a:ext cx="232753" cy="129512"/>
+            </a:xfrm>
+            <a:prstGeom prst="rightArrow">
+              <a:avLst/>
+            </a:prstGeom>
+          </p:spPr>
+          <p:style>
+            <a:lnRef idx="2">
+              <a:schemeClr val="dk1">
+                <a:shade val="50000"/>
+              </a:schemeClr>
+            </a:lnRef>
+            <a:fillRef idx="1">
+              <a:schemeClr val="dk1"/>
+            </a:fillRef>
+            <a:effectRef idx="0">
+              <a:schemeClr val="dk1"/>
+            </a:effectRef>
+            <a:fontRef idx="minor">
+              <a:schemeClr val="lt1"/>
+            </a:fontRef>
+          </p:style>
+          <p:txBody>
+            <a:bodyPr rtlCol="0" anchor="ctr"/>
+            <a:lstStyle/>
+            <a:p>
+              <a:pPr algn="ctr"/>
+              <a:endParaRPr lang="en-US"/>
+            </a:p>
+          </p:txBody>
+        </p:sp>
+      </p:grpSp>
+      <p:grpSp>
+        <p:nvGrpSpPr>
+          <p:cNvPr id="81" name="Group 80"/>
+          <p:cNvGrpSpPr/>
+          <p:nvPr/>
+        </p:nvGrpSpPr>
+        <p:grpSpPr>
+          <a:xfrm>
+            <a:off x="4039922" y="4293314"/>
+            <a:ext cx="1917586" cy="266441"/>
+            <a:chOff x="4039922" y="2348157"/>
+            <a:chExt cx="1917586" cy="266441"/>
+          </a:xfrm>
+        </p:grpSpPr>
+        <p:grpSp>
+          <p:nvGrpSpPr>
+            <p:cNvPr id="82" name="Group 81"/>
+            <p:cNvGrpSpPr/>
+            <p:nvPr/>
+          </p:nvGrpSpPr>
+          <p:grpSpPr>
+            <a:xfrm>
+              <a:off x="4272676" y="2348157"/>
+              <a:ext cx="1452080" cy="266441"/>
+              <a:chOff x="3683543" y="2951814"/>
+              <a:chExt cx="1778820" cy="363978"/>
+            </a:xfrm>
+          </p:grpSpPr>
+          <p:cxnSp>
+            <p:nvCxnSpPr>
+              <p:cNvPr id="85" name="Straight Connector 84"/>
+              <p:cNvCxnSpPr/>
+              <p:nvPr/>
+            </p:nvCxnSpPr>
+            <p:spPr>
+              <a:xfrm flipH="1">
+                <a:off x="3683543" y="2951814"/>
+                <a:ext cx="1778820" cy="0"/>
+              </a:xfrm>
+              <a:prstGeom prst="line">
+                <a:avLst/>
+              </a:prstGeom>
+            </p:spPr>
+            <p:style>
+              <a:lnRef idx="2">
+                <a:schemeClr val="accent1"/>
+              </a:lnRef>
+              <a:fillRef idx="0">
+                <a:schemeClr val="accent1"/>
+              </a:fillRef>
+              <a:effectRef idx="1">
+                <a:schemeClr val="accent1"/>
+              </a:effectRef>
+              <a:fontRef idx="minor">
+                <a:schemeClr val="tx1"/>
+              </a:fontRef>
+            </p:style>
+          </p:cxnSp>
+          <p:cxnSp>
+            <p:nvCxnSpPr>
+              <p:cNvPr id="86" name="Straight Connector 85"/>
+              <p:cNvCxnSpPr/>
+              <p:nvPr/>
+            </p:nvCxnSpPr>
+            <p:spPr>
+              <a:xfrm flipH="1">
+                <a:off x="3683543" y="3315792"/>
+                <a:ext cx="1778820" cy="0"/>
+              </a:xfrm>
+              <a:prstGeom prst="line">
+                <a:avLst/>
+              </a:prstGeom>
+            </p:spPr>
+            <p:style>
+              <a:lnRef idx="2">
+                <a:schemeClr val="accent1"/>
+              </a:lnRef>
+              <a:fillRef idx="0">
+                <a:schemeClr val="accent1"/>
+              </a:fillRef>
+              <a:effectRef idx="1">
+                <a:schemeClr val="accent1"/>
+              </a:effectRef>
+              <a:fontRef idx="minor">
+                <a:schemeClr val="tx1"/>
+              </a:fontRef>
+            </p:style>
+          </p:cxnSp>
+          <p:grpSp>
+            <p:nvGrpSpPr>
+              <p:cNvPr id="87" name="Group 86"/>
+              <p:cNvGrpSpPr/>
+              <p:nvPr/>
+            </p:nvGrpSpPr>
+            <p:grpSpPr>
+              <a:xfrm>
+                <a:off x="3849907" y="2969641"/>
+                <a:ext cx="1446091" cy="338515"/>
+                <a:chOff x="3867326" y="2964620"/>
+                <a:chExt cx="1446091" cy="338515"/>
+              </a:xfrm>
+            </p:grpSpPr>
+            <p:sp>
+              <p:nvSpPr>
+                <p:cNvPr id="88" name="Rectangle 87"/>
+                <p:cNvSpPr/>
+                <p:nvPr/>
+              </p:nvSpPr>
+              <p:spPr>
+                <a:xfrm>
+                  <a:off x="3867326" y="2964620"/>
+                  <a:ext cx="291371" cy="338515"/>
+                </a:xfrm>
+                <a:prstGeom prst="rect">
+                  <a:avLst/>
+                </a:prstGeom>
+              </p:spPr>
+              <p:style>
+                <a:lnRef idx="0">
+                  <a:schemeClr val="accent5"/>
+                </a:lnRef>
+                <a:fillRef idx="3">
+                  <a:schemeClr val="accent5"/>
+                </a:fillRef>
+                <a:effectRef idx="3">
+                  <a:schemeClr val="accent5"/>
+                </a:effectRef>
+                <a:fontRef idx="minor">
+                  <a:schemeClr val="lt1"/>
+                </a:fontRef>
+              </p:style>
+              <p:txBody>
+                <a:bodyPr rtlCol="0" anchor="ctr"/>
+                <a:lstStyle/>
+                <a:p>
+                  <a:pPr algn="ctr"/>
+                  <a:endParaRPr lang="en-US"/>
+                </a:p>
+              </p:txBody>
+            </p:sp>
+            <p:sp>
+              <p:nvSpPr>
+                <p:cNvPr id="89" name="Rectangle 88"/>
+                <p:cNvSpPr/>
+                <p:nvPr/>
+              </p:nvSpPr>
+              <p:spPr>
+                <a:xfrm>
+                  <a:off x="4156006" y="2964620"/>
+                  <a:ext cx="291371" cy="338515"/>
+                </a:xfrm>
+                <a:prstGeom prst="rect">
+                  <a:avLst/>
+                </a:prstGeom>
+              </p:spPr>
+              <p:style>
+                <a:lnRef idx="0">
+                  <a:schemeClr val="accent5"/>
+                </a:lnRef>
+                <a:fillRef idx="3">
+                  <a:schemeClr val="accent5"/>
+                </a:fillRef>
+                <a:effectRef idx="3">
+                  <a:schemeClr val="accent5"/>
+                </a:effectRef>
+                <a:fontRef idx="minor">
+                  <a:schemeClr val="lt1"/>
+                </a:fontRef>
+              </p:style>
+              <p:txBody>
+                <a:bodyPr rtlCol="0" anchor="ctr"/>
+                <a:lstStyle/>
+                <a:p>
+                  <a:pPr algn="ctr"/>
+                  <a:endParaRPr lang="en-US"/>
+                </a:p>
+              </p:txBody>
+            </p:sp>
+            <p:sp>
+              <p:nvSpPr>
+                <p:cNvPr id="90" name="Rectangle 89"/>
+                <p:cNvSpPr/>
+                <p:nvPr/>
+              </p:nvSpPr>
+              <p:spPr>
+                <a:xfrm>
+                  <a:off x="4444686" y="2964620"/>
+                  <a:ext cx="291371" cy="338515"/>
+                </a:xfrm>
+                <a:prstGeom prst="rect">
+                  <a:avLst/>
+                </a:prstGeom>
+              </p:spPr>
+              <p:style>
+                <a:lnRef idx="0">
+                  <a:schemeClr val="accent5"/>
+                </a:lnRef>
+                <a:fillRef idx="3">
+                  <a:schemeClr val="accent5"/>
+                </a:fillRef>
+                <a:effectRef idx="3">
+                  <a:schemeClr val="accent5"/>
+                </a:effectRef>
+                <a:fontRef idx="minor">
+                  <a:schemeClr val="lt1"/>
+                </a:fontRef>
+              </p:style>
+              <p:txBody>
+                <a:bodyPr rtlCol="0" anchor="ctr"/>
+                <a:lstStyle/>
+                <a:p>
+                  <a:pPr algn="ctr"/>
+                  <a:endParaRPr lang="en-US"/>
+                </a:p>
+              </p:txBody>
+            </p:sp>
+            <p:sp>
+              <p:nvSpPr>
+                <p:cNvPr id="91" name="Rectangle 90"/>
+                <p:cNvSpPr/>
+                <p:nvPr/>
+              </p:nvSpPr>
+              <p:spPr>
+                <a:xfrm>
+                  <a:off x="4733366" y="2964620"/>
+                  <a:ext cx="291371" cy="338515"/>
+                </a:xfrm>
+                <a:prstGeom prst="rect">
+                  <a:avLst/>
+                </a:prstGeom>
+              </p:spPr>
+              <p:style>
+                <a:lnRef idx="0">
+                  <a:schemeClr val="accent5"/>
+                </a:lnRef>
+                <a:fillRef idx="3">
+                  <a:schemeClr val="accent5"/>
+                </a:fillRef>
+                <a:effectRef idx="3">
+                  <a:schemeClr val="accent5"/>
+                </a:effectRef>
+                <a:fontRef idx="minor">
+                  <a:schemeClr val="lt1"/>
+                </a:fontRef>
+              </p:style>
+              <p:txBody>
+                <a:bodyPr rtlCol="0" anchor="ctr"/>
+                <a:lstStyle/>
+                <a:p>
+                  <a:pPr algn="ctr"/>
+                  <a:endParaRPr lang="en-US"/>
+                </a:p>
+              </p:txBody>
+            </p:sp>
+            <p:sp>
+              <p:nvSpPr>
+                <p:cNvPr id="92" name="Rectangle 91"/>
+                <p:cNvSpPr/>
+                <p:nvPr/>
+              </p:nvSpPr>
+              <p:spPr>
+                <a:xfrm>
+                  <a:off x="5022046" y="2964620"/>
+                  <a:ext cx="291371" cy="338515"/>
+                </a:xfrm>
+                <a:prstGeom prst="rect">
+                  <a:avLst/>
+                </a:prstGeom>
+              </p:spPr>
+              <p:style>
+                <a:lnRef idx="0">
+                  <a:schemeClr val="accent5"/>
+                </a:lnRef>
+                <a:fillRef idx="3">
+                  <a:schemeClr val="accent5"/>
+                </a:fillRef>
+                <a:effectRef idx="3">
+                  <a:schemeClr val="accent5"/>
+                </a:effectRef>
+                <a:fontRef idx="minor">
+                  <a:schemeClr val="lt1"/>
+                </a:fontRef>
+              </p:style>
+              <p:txBody>
+                <a:bodyPr rtlCol="0" anchor="ctr"/>
+                <a:lstStyle/>
+                <a:p>
+                  <a:pPr algn="ctr"/>
+                  <a:endParaRPr lang="en-US"/>
+                </a:p>
+              </p:txBody>
+            </p:sp>
+          </p:grpSp>
+        </p:grpSp>
+        <p:sp>
+          <p:nvSpPr>
+            <p:cNvPr id="83" name="Right Arrow 82"/>
+            <p:cNvSpPr/>
+            <p:nvPr/>
+          </p:nvSpPr>
+          <p:spPr>
+            <a:xfrm>
+              <a:off x="4039922" y="2416621"/>
+              <a:ext cx="232753" cy="129512"/>
+            </a:xfrm>
+            <a:prstGeom prst="rightArrow">
+              <a:avLst/>
+            </a:prstGeom>
+          </p:spPr>
+          <p:style>
+            <a:lnRef idx="2">
+              <a:schemeClr val="dk1">
+                <a:shade val="50000"/>
+              </a:schemeClr>
+            </a:lnRef>
+            <a:fillRef idx="1">
+              <a:schemeClr val="dk1"/>
+            </a:fillRef>
+            <a:effectRef idx="0">
+              <a:schemeClr val="dk1"/>
+            </a:effectRef>
+            <a:fontRef idx="minor">
+              <a:schemeClr val="lt1"/>
+            </a:fontRef>
+          </p:style>
+          <p:txBody>
+            <a:bodyPr rtlCol="0" anchor="ctr"/>
+            <a:lstStyle/>
+            <a:p>
+              <a:pPr algn="ctr"/>
+              <a:endParaRPr lang="en-US"/>
+            </a:p>
+          </p:txBody>
+        </p:sp>
+        <p:sp>
+          <p:nvSpPr>
+            <p:cNvPr id="84" name="Right Arrow 83"/>
+            <p:cNvSpPr/>
+            <p:nvPr/>
+          </p:nvSpPr>
+          <p:spPr>
+            <a:xfrm>
+              <a:off x="5724755" y="2416621"/>
+              <a:ext cx="232753" cy="129512"/>
+            </a:xfrm>
+            <a:prstGeom prst="rightArrow">
+              <a:avLst/>
+            </a:prstGeom>
+          </p:spPr>
+          <p:style>
+            <a:lnRef idx="2">
+              <a:schemeClr val="dk1">
+                <a:shade val="50000"/>
+              </a:schemeClr>
+            </a:lnRef>
+            <a:fillRef idx="1">
+              <a:schemeClr val="dk1"/>
+            </a:fillRef>
+            <a:effectRef idx="0">
+              <a:schemeClr val="dk1"/>
+            </a:effectRef>
+            <a:fontRef idx="minor">
+              <a:schemeClr val="lt1"/>
+            </a:fontRef>
+          </p:style>
+          <p:txBody>
+            <a:bodyPr rtlCol="0" anchor="ctr"/>
+            <a:lstStyle/>
+            <a:p>
+              <a:pPr algn="ctr"/>
+              <a:endParaRPr lang="en-US"/>
+            </a:p>
+          </p:txBody>
+        </p:sp>
+      </p:grpSp>
+      <p:sp>
+        <p:nvSpPr>
+          <p:cNvPr id="32" name="TextBox 31"/>
+          <p:cNvSpPr txBox="1"/>
+          <p:nvPr/>
+        </p:nvSpPr>
+        <p:spPr>
+          <a:xfrm>
+            <a:off x="6171220" y="1378811"/>
+            <a:ext cx="931665" cy="646331"/>
+          </a:xfrm>
+          <a:prstGeom prst="rect">
+            <a:avLst/>
+          </a:prstGeom>
+          <a:noFill/>
+        </p:spPr>
+        <p:txBody>
+          <a:bodyPr wrap="none" rtlCol="0">
+            <a:spAutoFit/>
+          </a:bodyPr>
+          <a:lstStyle/>
+          <a:p>
+            <a:r>
+              <a:rPr lang="en-US" dirty="0" smtClean="0"/>
+              <a:t>Priority</a:t>
+            </a:r>
+          </a:p>
+          <a:p>
+            <a:r>
+              <a:rPr lang="en-US" dirty="0" smtClean="0"/>
+              <a:t>Handler</a:t>
+            </a:r>
+            <a:endParaRPr lang="en-US" dirty="0"/>
           </a:p>
         </p:txBody>
       </p:sp>
@@ -11585,4 +15961,265 @@
   <a:objectDefaults/>
   <a:extraClrSchemeLst/>
 </a:theme>
+</file>
+
+<file path=ppt/theme/theme2.xml><?xml version="1.0" encoding="utf-8"?>
+<a:theme xmlns:a="http://schemas.openxmlformats.org/drawingml/2006/main" name="Office Theme">
+  <a:themeElements>
+    <a:clrScheme name="Office">
+      <a:dk1>
+        <a:sysClr val="windowText" lastClr="000000"/>
+      </a:dk1>
+      <a:lt1>
+        <a:sysClr val="window" lastClr="FFFFFF"/>
+      </a:lt1>
+      <a:dk2>
+        <a:srgbClr val="44546A"/>
+      </a:dk2>
+      <a:lt2>
+        <a:srgbClr val="E7E6E6"/>
+      </a:lt2>
+      <a:accent1>
+        <a:srgbClr val="5B9BD5"/>
+      </a:accent1>
+      <a:accent2>
+        <a:srgbClr val="ED7D31"/>
+      </a:accent2>
+      <a:accent3>
+        <a:srgbClr val="A5A5A5"/>
+      </a:accent3>
+      <a:accent4>
+        <a:srgbClr val="FFC000"/>
+      </a:accent4>
+      <a:accent5>
+        <a:srgbClr val="4472C4"/>
+      </a:accent5>
+      <a:accent6>
+        <a:srgbClr val="70AD47"/>
+      </a:accent6>
+      <a:hlink>
+        <a:srgbClr val="0563C1"/>
+      </a:hlink>
+      <a:folHlink>
+        <a:srgbClr val="954F72"/>
+      </a:folHlink>
+    </a:clrScheme>
+    <a:fontScheme name="Office">
+      <a:majorFont>
+        <a:latin typeface="Calibri Light" panose="020F0302020204030204"/>
+        <a:ea typeface=""/>
+        <a:cs typeface=""/>
+        <a:font script="Jpan" typeface="游ゴシック Light"/>
+        <a:font script="Hang" typeface="맑은 고딕"/>
+        <a:font script="Hans" typeface="等线 Light"/>
+        <a:font script="Hant" typeface="新細明體"/>
+        <a:font script="Arab" typeface="Times New Roman"/>
+        <a:font script="Hebr" typeface="Times New Roman"/>
+        <a:font script="Thai" typeface="Angsana New"/>
+        <a:font script="Ethi" typeface="Nyala"/>
+        <a:font script="Beng" typeface="Vrinda"/>
+        <a:font script="Gujr" typeface="Shruti"/>
+        <a:font script="Khmr" typeface="MoolBoran"/>
+        <a:font script="Knda" typeface="Tunga"/>
+        <a:font script="Guru" typeface="Raavi"/>
+        <a:font script="Cans" typeface="Euphemia"/>
+        <a:font script="Cher" typeface="Plantagenet Cherokee"/>
+        <a:font script="Yiii" typeface="Microsoft Yi Baiti"/>
+        <a:font script="Tibt" typeface="Microsoft Himalaya"/>
+        <a:font script="Thaa" typeface="MV Boli"/>
+        <a:font script="Deva" typeface="Mangal"/>
+        <a:font script="Telu" typeface="Gautami"/>
+        <a:font script="Taml" typeface="Latha"/>
+        <a:font script="Syrc" typeface="Estrangelo Edessa"/>
+        <a:font script="Orya" typeface="Kalinga"/>
+        <a:font script="Mlym" typeface="Kartika"/>
+        <a:font script="Laoo" typeface="DokChampa"/>
+        <a:font script="Sinh" typeface="Iskoola Pota"/>
+        <a:font script="Mong" typeface="Mongolian Baiti"/>
+        <a:font script="Viet" typeface="Times New Roman"/>
+        <a:font script="Uigh" typeface="Microsoft Uighur"/>
+        <a:font script="Geor" typeface="Sylfaen"/>
+      </a:majorFont>
+      <a:minorFont>
+        <a:latin typeface="Calibri" panose="020F0502020204030204"/>
+        <a:ea typeface=""/>
+        <a:cs typeface=""/>
+        <a:font script="Jpan" typeface="游ゴシック"/>
+        <a:font script="Hang" typeface="맑은 고딕"/>
+        <a:font script="Hans" typeface="等线"/>
+        <a:font script="Hant" typeface="新細明體"/>
+        <a:font script="Arab" typeface="Arial"/>
+        <a:font script="Hebr" typeface="Arial"/>
+        <a:font script="Thai" typeface="Cordia New"/>
+        <a:font script="Ethi" typeface="Nyala"/>
+        <a:font script="Beng" typeface="Vrinda"/>
+        <a:font script="Gujr" typeface="Shruti"/>
+        <a:font script="Khmr" typeface="DaunPenh"/>
+        <a:font script="Knda" typeface="Tunga"/>
+        <a:font script="Guru" typeface="Raavi"/>
+        <a:font script="Cans" typeface="Euphemia"/>
+        <a:font script="Cher" typeface="Plantagenet Cherokee"/>
+        <a:font script="Yiii" typeface="Microsoft Yi Baiti"/>
+        <a:font script="Tibt" typeface="Microsoft Himalaya"/>
+        <a:font script="Thaa" typeface="MV Boli"/>
+        <a:font script="Deva" typeface="Mangal"/>
+        <a:font script="Telu" typeface="Gautami"/>
+        <a:font script="Taml" typeface="Latha"/>
+        <a:font script="Syrc" typeface="Estrangelo Edessa"/>
+        <a:font script="Orya" typeface="Kalinga"/>
+        <a:font script="Mlym" typeface="Kartika"/>
+        <a:font script="Laoo" typeface="DokChampa"/>
+        <a:font script="Sinh" typeface="Iskoola Pota"/>
+        <a:font script="Mong" typeface="Mongolian Baiti"/>
+        <a:font script="Viet" typeface="Arial"/>
+        <a:font script="Uigh" typeface="Microsoft Uighur"/>
+        <a:font script="Geor" typeface="Sylfaen"/>
+      </a:minorFont>
+    </a:fontScheme>
+    <a:fmtScheme name="Office">
+      <a:fillStyleLst>
+        <a:solidFill>
+          <a:schemeClr val="phClr"/>
+        </a:solidFill>
+        <a:gradFill rotWithShape="1">
+          <a:gsLst>
+            <a:gs pos="0">
+              <a:schemeClr val="phClr">
+                <a:lumMod val="110000"/>
+                <a:satMod val="105000"/>
+                <a:tint val="67000"/>
+              </a:schemeClr>
+            </a:gs>
+            <a:gs pos="50000">
+              <a:schemeClr val="phClr">
+                <a:lumMod val="105000"/>
+                <a:satMod val="103000"/>
+                <a:tint val="73000"/>
+              </a:schemeClr>
+            </a:gs>
+            <a:gs pos="100000">
+              <a:schemeClr val="phClr">
+                <a:lumMod val="105000"/>
+                <a:satMod val="109000"/>
+                <a:tint val="81000"/>
+              </a:schemeClr>
+            </a:gs>
+          </a:gsLst>
+          <a:lin ang="5400000" scaled="0"/>
+        </a:gradFill>
+        <a:gradFill rotWithShape="1">
+          <a:gsLst>
+            <a:gs pos="0">
+              <a:schemeClr val="phClr">
+                <a:satMod val="103000"/>
+                <a:lumMod val="102000"/>
+                <a:tint val="94000"/>
+              </a:schemeClr>
+            </a:gs>
+            <a:gs pos="50000">
+              <a:schemeClr val="phClr">
+                <a:satMod val="110000"/>
+                <a:lumMod val="100000"/>
+                <a:shade val="100000"/>
+              </a:schemeClr>
+            </a:gs>
+            <a:gs pos="100000">
+              <a:schemeClr val="phClr">
+                <a:lumMod val="99000"/>
+                <a:satMod val="120000"/>
+                <a:shade val="78000"/>
+              </a:schemeClr>
+            </a:gs>
+          </a:gsLst>
+          <a:lin ang="5400000" scaled="0"/>
+        </a:gradFill>
+      </a:fillStyleLst>
+      <a:lnStyleLst>
+        <a:ln w="6350" cap="flat" cmpd="sng" algn="ctr">
+          <a:solidFill>
+            <a:schemeClr val="phClr"/>
+          </a:solidFill>
+          <a:prstDash val="solid"/>
+          <a:miter lim="800000"/>
+        </a:ln>
+        <a:ln w="12700" cap="flat" cmpd="sng" algn="ctr">
+          <a:solidFill>
+            <a:schemeClr val="phClr"/>
+          </a:solidFill>
+          <a:prstDash val="solid"/>
+          <a:miter lim="800000"/>
+        </a:ln>
+        <a:ln w="19050" cap="flat" cmpd="sng" algn="ctr">
+          <a:solidFill>
+            <a:schemeClr val="phClr"/>
+          </a:solidFill>
+          <a:prstDash val="solid"/>
+          <a:miter lim="800000"/>
+        </a:ln>
+      </a:lnStyleLst>
+      <a:effectStyleLst>
+        <a:effectStyle>
+          <a:effectLst/>
+        </a:effectStyle>
+        <a:effectStyle>
+          <a:effectLst/>
+        </a:effectStyle>
+        <a:effectStyle>
+          <a:effectLst>
+            <a:outerShdw blurRad="57150" dist="19050" dir="5400000" algn="ctr" rotWithShape="0">
+              <a:srgbClr val="000000">
+                <a:alpha val="63000"/>
+              </a:srgbClr>
+            </a:outerShdw>
+          </a:effectLst>
+        </a:effectStyle>
+      </a:effectStyleLst>
+      <a:bgFillStyleLst>
+        <a:solidFill>
+          <a:schemeClr val="phClr"/>
+        </a:solidFill>
+        <a:solidFill>
+          <a:schemeClr val="phClr">
+            <a:tint val="95000"/>
+            <a:satMod val="170000"/>
+          </a:schemeClr>
+        </a:solidFill>
+        <a:gradFill rotWithShape="1">
+          <a:gsLst>
+            <a:gs pos="0">
+              <a:schemeClr val="phClr">
+                <a:tint val="93000"/>
+                <a:satMod val="150000"/>
+                <a:shade val="98000"/>
+                <a:lumMod val="102000"/>
+              </a:schemeClr>
+            </a:gs>
+            <a:gs pos="50000">
+              <a:schemeClr val="phClr">
+                <a:tint val="98000"/>
+                <a:satMod val="130000"/>
+                <a:shade val="90000"/>
+                <a:lumMod val="103000"/>
+              </a:schemeClr>
+            </a:gs>
+            <a:gs pos="100000">
+              <a:schemeClr val="phClr">
+                <a:shade val="63000"/>
+                <a:satMod val="120000"/>
+              </a:schemeClr>
+            </a:gs>
+          </a:gsLst>
+          <a:lin ang="5400000" scaled="0"/>
+        </a:gradFill>
+      </a:bgFillStyleLst>
+    </a:fmtScheme>
+  </a:themeElements>
+  <a:objectDefaults/>
+  <a:extraClrSchemeLst/>
+  <a:extLst>
+    <a:ext uri="{05A4C25C-085E-4340-85A3-A5531E510DB2}">
+      <thm15:themeFamily xmlns:thm15="http://schemas.microsoft.com/office/thememl/2012/main" name="Office Theme" id="{62F939B6-93AF-4DB8-9C6B-D6C7DFDC589F}" vid="{4A3C46E8-61CC-4603-A589-7422A47A8E4A}"/>
+    </a:ext>
+  </a:extLst>
+</a:theme>
 </file>
</xml_diff>

<commit_message>
minor update to delay figure
</commit_message>
<xml_diff>
--- a/thesis/figs/ros_component.pptx
+++ b/thesis/figs/ros_component.pptx
@@ -16877,13 +16877,13 @@
           <a:p>
             <a:r>
               <a:rPr lang="en-US" sz="1200" dirty="0" smtClean="0"/>
-              <a:t>The </a:t>
-            </a:r>
-            <a:r>
-              <a:rPr lang="en-US" sz="1200" dirty="0" smtClean="0"/>
-              <a:t>arrival time between packets on node 2 is the inter-arrival time (IAT)</a:t>
-            </a:r>
-            <a:endParaRPr lang="en-US" sz="1200" dirty="0"/>
+              <a:t>The arrival time between packets on node 2 is the </a:t>
+            </a:r>
+            <a:r>
+              <a:rPr lang="en-US" sz="1200" b="1" dirty="0" smtClean="0"/>
+              <a:t>inter-arrival time (IAT)</a:t>
+            </a:r>
+            <a:endParaRPr lang="en-US" sz="1200" b="1" dirty="0"/>
           </a:p>
         </p:txBody>
       </p:sp>

</xml_diff>